<commit_message>
add some formulas of controllability and observability
</commit_message>
<xml_diff>
--- a/materials.pptx
+++ b/materials.pptx
@@ -6,6 +6,8 @@
   </p:sldMasterIdLst>
   <p:sldIdLst>
     <p:sldId id="256" r:id="rId2"/>
+    <p:sldId id="257" r:id="rId3"/>
+    <p:sldId id="258" r:id="rId4"/>
   </p:sldIdLst>
   <p:sldSz cx="12192000" cy="6858000"/>
   <p:notesSz cx="6858000" cy="9144000"/>
@@ -104,6 +106,11 @@
       </a:defRPr>
     </a:lvl9pPr>
   </p:defaultTextStyle>
+  <p:extLst>
+    <p:ext uri="{EFAFB233-063F-42B5-8137-9DF3F51BA10A}">
+      <p15:sldGuideLst xmlns:p15="http://schemas.microsoft.com/office/powerpoint/2012/main"/>
+    </p:ext>
+  </p:extLst>
 </p:presentation>
 </file>
 
@@ -254,7 +261,7 @@
           <a:p>
             <a:fld id="{2FD84066-1B35-4AB8-92BE-780EAC268AC3}" type="datetimeFigureOut">
               <a:rPr kumimoji="1" lang="ja-JP" altLang="en-US" smtClean="0"/>
-              <a:t>2020/4/5</a:t>
+              <a:t>2020/4/18</a:t>
             </a:fld>
             <a:endParaRPr kumimoji="1" lang="ja-JP" altLang="en-US"/>
           </a:p>
@@ -484,7 +491,7 @@
           <a:p>
             <a:fld id="{2FD84066-1B35-4AB8-92BE-780EAC268AC3}" type="datetimeFigureOut">
               <a:rPr kumimoji="1" lang="ja-JP" altLang="en-US" smtClean="0"/>
-              <a:t>2020/4/5</a:t>
+              <a:t>2020/4/18</a:t>
             </a:fld>
             <a:endParaRPr kumimoji="1" lang="ja-JP" altLang="en-US"/>
           </a:p>
@@ -724,7 +731,7 @@
           <a:p>
             <a:fld id="{2FD84066-1B35-4AB8-92BE-780EAC268AC3}" type="datetimeFigureOut">
               <a:rPr kumimoji="1" lang="ja-JP" altLang="en-US" smtClean="0"/>
-              <a:t>2020/4/5</a:t>
+              <a:t>2020/4/18</a:t>
             </a:fld>
             <a:endParaRPr kumimoji="1" lang="ja-JP" altLang="en-US"/>
           </a:p>
@@ -954,7 +961,7 @@
           <a:p>
             <a:fld id="{2FD84066-1B35-4AB8-92BE-780EAC268AC3}" type="datetimeFigureOut">
               <a:rPr kumimoji="1" lang="ja-JP" altLang="en-US" smtClean="0"/>
-              <a:t>2020/4/5</a:t>
+              <a:t>2020/4/18</a:t>
             </a:fld>
             <a:endParaRPr kumimoji="1" lang="ja-JP" altLang="en-US"/>
           </a:p>
@@ -1229,7 +1236,7 @@
           <a:p>
             <a:fld id="{2FD84066-1B35-4AB8-92BE-780EAC268AC3}" type="datetimeFigureOut">
               <a:rPr kumimoji="1" lang="ja-JP" altLang="en-US" smtClean="0"/>
-              <a:t>2020/4/5</a:t>
+              <a:t>2020/4/18</a:t>
             </a:fld>
             <a:endParaRPr kumimoji="1" lang="ja-JP" altLang="en-US"/>
           </a:p>
@@ -1558,7 +1565,7 @@
           <a:p>
             <a:fld id="{2FD84066-1B35-4AB8-92BE-780EAC268AC3}" type="datetimeFigureOut">
               <a:rPr kumimoji="1" lang="ja-JP" altLang="en-US" smtClean="0"/>
-              <a:t>2020/4/5</a:t>
+              <a:t>2020/4/18</a:t>
             </a:fld>
             <a:endParaRPr kumimoji="1" lang="ja-JP" altLang="en-US"/>
           </a:p>
@@ -2034,7 +2041,7 @@
           <a:p>
             <a:fld id="{2FD84066-1B35-4AB8-92BE-780EAC268AC3}" type="datetimeFigureOut">
               <a:rPr kumimoji="1" lang="ja-JP" altLang="en-US" smtClean="0"/>
-              <a:t>2020/4/5</a:t>
+              <a:t>2020/4/18</a:t>
             </a:fld>
             <a:endParaRPr kumimoji="1" lang="ja-JP" altLang="en-US"/>
           </a:p>
@@ -2175,7 +2182,7 @@
           <a:p>
             <a:fld id="{2FD84066-1B35-4AB8-92BE-780EAC268AC3}" type="datetimeFigureOut">
               <a:rPr kumimoji="1" lang="ja-JP" altLang="en-US" smtClean="0"/>
-              <a:t>2020/4/5</a:t>
+              <a:t>2020/4/18</a:t>
             </a:fld>
             <a:endParaRPr kumimoji="1" lang="ja-JP" altLang="en-US"/>
           </a:p>
@@ -2288,7 +2295,7 @@
           <a:p>
             <a:fld id="{2FD84066-1B35-4AB8-92BE-780EAC268AC3}" type="datetimeFigureOut">
               <a:rPr kumimoji="1" lang="ja-JP" altLang="en-US" smtClean="0"/>
-              <a:t>2020/4/5</a:t>
+              <a:t>2020/4/18</a:t>
             </a:fld>
             <a:endParaRPr kumimoji="1" lang="ja-JP" altLang="en-US"/>
           </a:p>
@@ -2631,7 +2638,7 @@
           <a:p>
             <a:fld id="{2FD84066-1B35-4AB8-92BE-780EAC268AC3}" type="datetimeFigureOut">
               <a:rPr kumimoji="1" lang="ja-JP" altLang="en-US" smtClean="0"/>
-              <a:t>2020/4/5</a:t>
+              <a:t>2020/4/18</a:t>
             </a:fld>
             <a:endParaRPr kumimoji="1" lang="ja-JP" altLang="en-US"/>
           </a:p>
@@ -2919,7 +2926,7 @@
           <a:p>
             <a:fld id="{2FD84066-1B35-4AB8-92BE-780EAC268AC3}" type="datetimeFigureOut">
               <a:rPr kumimoji="1" lang="ja-JP" altLang="en-US" smtClean="0"/>
-              <a:t>2020/4/5</a:t>
+              <a:t>2020/4/18</a:t>
             </a:fld>
             <a:endParaRPr kumimoji="1" lang="ja-JP" altLang="en-US"/>
           </a:p>
@@ -3192,7 +3199,7 @@
           <a:p>
             <a:fld id="{2FD84066-1B35-4AB8-92BE-780EAC268AC3}" type="datetimeFigureOut">
               <a:rPr kumimoji="1" lang="ja-JP" altLang="en-US" smtClean="0"/>
-              <a:t>2020/4/5</a:t>
+              <a:t>2020/4/18</a:t>
             </a:fld>
             <a:endParaRPr kumimoji="1" lang="ja-JP" altLang="en-US"/>
           </a:p>
@@ -4188,8 +4195,8 @@
           </a:p>
         </p:txBody>
       </p:sp>
-      <mc:AlternateContent xmlns:mc="http://schemas.openxmlformats.org/markup-compatibility/2006">
-        <mc:Choice xmlns:a14="http://schemas.microsoft.com/office/drawing/2010/main" Requires="a14">
+      <mc:AlternateContent xmlns:mc="http://schemas.openxmlformats.org/markup-compatibility/2006" xmlns:a14="http://schemas.microsoft.com/office/drawing/2010/main">
+        <mc:Choice Requires="a14">
           <p:sp>
             <p:nvSpPr>
               <p:cNvPr id="40" name="テキスト ボックス 39">
@@ -4239,7 +4246,7 @@
             </p:txBody>
           </p:sp>
         </mc:Choice>
-        <mc:Fallback>
+        <mc:Fallback xmlns="">
           <p:sp>
             <p:nvSpPr>
               <p:cNvPr id="40" name="テキスト ボックス 39">
@@ -4284,8 +4291,8 @@
           </p:sp>
         </mc:Fallback>
       </mc:AlternateContent>
-      <mc:AlternateContent xmlns:mc="http://schemas.openxmlformats.org/markup-compatibility/2006">
-        <mc:Choice xmlns:a14="http://schemas.microsoft.com/office/drawing/2010/main" Requires="a14">
+      <mc:AlternateContent xmlns:mc="http://schemas.openxmlformats.org/markup-compatibility/2006" xmlns:a14="http://schemas.microsoft.com/office/drawing/2010/main">
+        <mc:Choice Requires="a14">
           <p:sp>
             <p:nvSpPr>
               <p:cNvPr id="41" name="テキスト ボックス 40">
@@ -4335,7 +4342,7 @@
             </p:txBody>
           </p:sp>
         </mc:Choice>
-        <mc:Fallback>
+        <mc:Fallback xmlns="">
           <p:sp>
             <p:nvSpPr>
               <p:cNvPr id="41" name="テキスト ボックス 40">
@@ -4380,8 +4387,8 @@
           </p:sp>
         </mc:Fallback>
       </mc:AlternateContent>
-      <mc:AlternateContent xmlns:mc="http://schemas.openxmlformats.org/markup-compatibility/2006">
-        <mc:Choice xmlns:a14="http://schemas.microsoft.com/office/drawing/2010/main" Requires="a14">
+      <mc:AlternateContent xmlns:mc="http://schemas.openxmlformats.org/markup-compatibility/2006" xmlns:a14="http://schemas.microsoft.com/office/drawing/2010/main">
+        <mc:Choice Requires="a14">
           <p:sp>
             <p:nvSpPr>
               <p:cNvPr id="42" name="テキスト ボックス 41">
@@ -4487,7 +4494,7 @@
             </p:txBody>
           </p:sp>
         </mc:Choice>
-        <mc:Fallback>
+        <mc:Fallback xmlns="">
           <p:sp>
             <p:nvSpPr>
               <p:cNvPr id="42" name="テキスト ボックス 41">
@@ -4532,8 +4539,8 @@
           </p:sp>
         </mc:Fallback>
       </mc:AlternateContent>
-      <mc:AlternateContent xmlns:mc="http://schemas.openxmlformats.org/markup-compatibility/2006">
-        <mc:Choice xmlns:a14="http://schemas.microsoft.com/office/drawing/2010/main" Requires="a14">
+      <mc:AlternateContent xmlns:mc="http://schemas.openxmlformats.org/markup-compatibility/2006" xmlns:a14="http://schemas.microsoft.com/office/drawing/2010/main">
+        <mc:Choice Requires="a14">
           <p:sp>
             <p:nvSpPr>
               <p:cNvPr id="43" name="テキスト ボックス 42">
@@ -4639,7 +4646,7 @@
             </p:txBody>
           </p:sp>
         </mc:Choice>
-        <mc:Fallback>
+        <mc:Fallback xmlns="">
           <p:sp>
             <p:nvSpPr>
               <p:cNvPr id="43" name="テキスト ボックス 42">
@@ -4684,8 +4691,8 @@
           </p:sp>
         </mc:Fallback>
       </mc:AlternateContent>
-      <mc:AlternateContent xmlns:mc="http://schemas.openxmlformats.org/markup-compatibility/2006">
-        <mc:Choice xmlns:a14="http://schemas.microsoft.com/office/drawing/2010/main" Requires="a14">
+      <mc:AlternateContent xmlns:mc="http://schemas.openxmlformats.org/markup-compatibility/2006" xmlns:a14="http://schemas.microsoft.com/office/drawing/2010/main">
+        <mc:Choice Requires="a14">
           <p:sp>
             <p:nvSpPr>
               <p:cNvPr id="44" name="テキスト ボックス 43">
@@ -4735,7 +4742,7 @@
             </p:txBody>
           </p:sp>
         </mc:Choice>
-        <mc:Fallback>
+        <mc:Fallback xmlns="">
           <p:sp>
             <p:nvSpPr>
               <p:cNvPr id="44" name="テキスト ボックス 43">
@@ -4780,8 +4787,8 @@
           </p:sp>
         </mc:Fallback>
       </mc:AlternateContent>
-      <mc:AlternateContent xmlns:mc="http://schemas.openxmlformats.org/markup-compatibility/2006">
-        <mc:Choice xmlns:a14="http://schemas.microsoft.com/office/drawing/2010/main" Requires="a14">
+      <mc:AlternateContent xmlns:mc="http://schemas.openxmlformats.org/markup-compatibility/2006" xmlns:a14="http://schemas.microsoft.com/office/drawing/2010/main">
+        <mc:Choice Requires="a14">
           <p:sp>
             <p:nvSpPr>
               <p:cNvPr id="45" name="テキスト ボックス 44">
@@ -4831,7 +4838,7 @@
             </p:txBody>
           </p:sp>
         </mc:Choice>
-        <mc:Fallback>
+        <mc:Fallback xmlns="">
           <p:sp>
             <p:nvSpPr>
               <p:cNvPr id="45" name="テキスト ボックス 44">
@@ -4876,8 +4883,8 @@
           </p:sp>
         </mc:Fallback>
       </mc:AlternateContent>
-      <mc:AlternateContent xmlns:mc="http://schemas.openxmlformats.org/markup-compatibility/2006">
-        <mc:Choice xmlns:a14="http://schemas.microsoft.com/office/drawing/2010/main" Requires="a14">
+      <mc:AlternateContent xmlns:mc="http://schemas.openxmlformats.org/markup-compatibility/2006" xmlns:a14="http://schemas.microsoft.com/office/drawing/2010/main">
+        <mc:Choice Requires="a14">
           <p:sp>
             <p:nvSpPr>
               <p:cNvPr id="46" name="テキスト ボックス 45">
@@ -4927,7 +4934,7 @@
             </p:txBody>
           </p:sp>
         </mc:Choice>
-        <mc:Fallback>
+        <mc:Fallback xmlns="">
           <p:sp>
             <p:nvSpPr>
               <p:cNvPr id="46" name="テキスト ボックス 45">
@@ -5054,8 +5061,8 @@
           </a:fontRef>
         </p:style>
       </p:cxnSp>
-      <mc:AlternateContent xmlns:mc="http://schemas.openxmlformats.org/markup-compatibility/2006">
-        <mc:Choice xmlns:a14="http://schemas.microsoft.com/office/drawing/2010/main" Requires="a14">
+      <mc:AlternateContent xmlns:mc="http://schemas.openxmlformats.org/markup-compatibility/2006" xmlns:a14="http://schemas.microsoft.com/office/drawing/2010/main">
+        <mc:Choice Requires="a14">
           <p:sp>
             <p:nvSpPr>
               <p:cNvPr id="53" name="テキスト ボックス 52">
@@ -5105,7 +5112,7 @@
             </p:txBody>
           </p:sp>
         </mc:Choice>
-        <mc:Fallback>
+        <mc:Fallback xmlns="">
           <p:sp>
             <p:nvSpPr>
               <p:cNvPr id="53" name="テキスト ボックス 52">
@@ -5150,8 +5157,8 @@
           </p:sp>
         </mc:Fallback>
       </mc:AlternateContent>
-      <mc:AlternateContent xmlns:mc="http://schemas.openxmlformats.org/markup-compatibility/2006">
-        <mc:Choice xmlns:a14="http://schemas.microsoft.com/office/drawing/2010/main" Requires="a14">
+      <mc:AlternateContent xmlns:mc="http://schemas.openxmlformats.org/markup-compatibility/2006" xmlns:a14="http://schemas.microsoft.com/office/drawing/2010/main">
+        <mc:Choice Requires="a14">
           <p:sp>
             <p:nvSpPr>
               <p:cNvPr id="54" name="テキスト ボックス 53">
@@ -5201,7 +5208,7 @@
             </p:txBody>
           </p:sp>
         </mc:Choice>
-        <mc:Fallback>
+        <mc:Fallback xmlns="">
           <p:sp>
             <p:nvSpPr>
               <p:cNvPr id="54" name="テキスト ボックス 53">
@@ -5246,8 +5253,8 @@
           </p:sp>
         </mc:Fallback>
       </mc:AlternateContent>
-      <mc:AlternateContent xmlns:mc="http://schemas.openxmlformats.org/markup-compatibility/2006">
-        <mc:Choice xmlns:a14="http://schemas.microsoft.com/office/drawing/2010/main" Requires="a14">
+      <mc:AlternateContent xmlns:mc="http://schemas.openxmlformats.org/markup-compatibility/2006" xmlns:a14="http://schemas.microsoft.com/office/drawing/2010/main">
+        <mc:Choice Requires="a14">
           <p:sp>
             <p:nvSpPr>
               <p:cNvPr id="60" name="テキスト ボックス 59">
@@ -5521,13 +5528,7 @@
                       <a:rPr lang="ja-JP" altLang="en-US" i="1">
                         <a:latin typeface="Cambria Math" panose="02040503050406030204" pitchFamily="18" charset="0"/>
                       </a:rPr>
-                      <m:t>左</m:t>
-                    </m:r>
-                    <m:r>
-                      <a:rPr lang="ja-JP" altLang="en-US" i="1">
-                        <a:latin typeface="Cambria Math" panose="02040503050406030204" pitchFamily="18" charset="0"/>
-                      </a:rPr>
-                      <m:t>車輪</m:t>
+                      <m:t>左車輪</m:t>
                     </m:r>
                   </m:oMath>
                 </a14:m>
@@ -5722,7 +5723,7 @@
             </p:txBody>
           </p:sp>
         </mc:Choice>
-        <mc:Fallback>
+        <mc:Fallback xmlns="">
           <p:sp>
             <p:nvSpPr>
               <p:cNvPr id="60" name="テキスト ボックス 59">
@@ -5807,8 +5808,8 @@
           </a:fontRef>
         </p:style>
       </p:cxnSp>
-      <mc:AlternateContent xmlns:mc="http://schemas.openxmlformats.org/markup-compatibility/2006">
-        <mc:Choice xmlns:a14="http://schemas.microsoft.com/office/drawing/2010/main" Requires="a14">
+      <mc:AlternateContent xmlns:mc="http://schemas.openxmlformats.org/markup-compatibility/2006" xmlns:a14="http://schemas.microsoft.com/office/drawing/2010/main">
+        <mc:Choice Requires="a14">
           <p:sp>
             <p:nvSpPr>
               <p:cNvPr id="63" name="テキスト ボックス 62">
@@ -5858,7 +5859,7 @@
             </p:txBody>
           </p:sp>
         </mc:Choice>
-        <mc:Fallback>
+        <mc:Fallback xmlns="">
           <p:sp>
             <p:nvSpPr>
               <p:cNvPr id="63" name="テキスト ボックス 62">
@@ -5903,8 +5904,8 @@
           </p:sp>
         </mc:Fallback>
       </mc:AlternateContent>
-      <mc:AlternateContent xmlns:mc="http://schemas.openxmlformats.org/markup-compatibility/2006">
-        <mc:Choice xmlns:a14="http://schemas.microsoft.com/office/drawing/2010/main" Requires="a14">
+      <mc:AlternateContent xmlns:mc="http://schemas.openxmlformats.org/markup-compatibility/2006" xmlns:a14="http://schemas.microsoft.com/office/drawing/2010/main">
+        <mc:Choice Requires="a14">
           <p:sp>
             <p:nvSpPr>
               <p:cNvPr id="65" name="テキスト ボックス 64">
@@ -6026,7 +6027,7 @@
             </p:txBody>
           </p:sp>
         </mc:Choice>
-        <mc:Fallback>
+        <mc:Fallback xmlns="">
           <p:sp>
             <p:nvSpPr>
               <p:cNvPr id="65" name="テキスト ボックス 64">
@@ -6071,8 +6072,8 @@
           </p:sp>
         </mc:Fallback>
       </mc:AlternateContent>
-      <mc:AlternateContent xmlns:mc="http://schemas.openxmlformats.org/markup-compatibility/2006">
-        <mc:Choice xmlns:a14="http://schemas.microsoft.com/office/drawing/2010/main" Requires="a14">
+      <mc:AlternateContent xmlns:mc="http://schemas.openxmlformats.org/markup-compatibility/2006" xmlns:a14="http://schemas.microsoft.com/office/drawing/2010/main">
+        <mc:Choice Requires="a14">
           <p:sp>
             <p:nvSpPr>
               <p:cNvPr id="66" name="テキスト ボックス 65">
@@ -6415,7 +6416,7 @@
             </p:txBody>
           </p:sp>
         </mc:Choice>
-        <mc:Fallback>
+        <mc:Fallback xmlns="">
           <p:sp>
             <p:nvSpPr>
               <p:cNvPr id="66" name="テキスト ボックス 65">
@@ -6460,8 +6461,8 @@
           </p:sp>
         </mc:Fallback>
       </mc:AlternateContent>
-      <mc:AlternateContent xmlns:mc="http://schemas.openxmlformats.org/markup-compatibility/2006">
-        <mc:Choice xmlns:a14="http://schemas.microsoft.com/office/drawing/2010/main" Requires="a14">
+      <mc:AlternateContent xmlns:mc="http://schemas.openxmlformats.org/markup-compatibility/2006" xmlns:a14="http://schemas.microsoft.com/office/drawing/2010/main">
+        <mc:Choice Requires="a14">
           <p:sp>
             <p:nvSpPr>
               <p:cNvPr id="67" name="テキスト ボックス 66">
@@ -6553,13 +6554,7 @@
                                       <a:rPr kumimoji="1" lang="en-US" altLang="ja-JP" b="0" i="1" smtClean="0">
                                         <a:latin typeface="Cambria Math" panose="02040503050406030204" pitchFamily="18" charset="0"/>
                                       </a:rPr>
-                                      <m:t>+</m:t>
-                                    </m:r>
-                                    <m:r>
-                                      <a:rPr kumimoji="1" lang="en-US" altLang="ja-JP" b="0" i="1" smtClean="0">
-                                        <a:latin typeface="Cambria Math" panose="02040503050406030204" pitchFamily="18" charset="0"/>
-                                      </a:rPr>
-                                      <m:t>1</m:t>
+                                      <m:t>+1</m:t>
                                     </m:r>
                                   </m:sub>
                                 </m:sSub>
@@ -6594,13 +6589,7 @@
                                       <a:rPr kumimoji="1" lang="en-US" altLang="ja-JP" b="0" i="1" smtClean="0">
                                         <a:latin typeface="Cambria Math" panose="02040503050406030204" pitchFamily="18" charset="0"/>
                                       </a:rPr>
-                                      <m:t>+</m:t>
-                                    </m:r>
-                                    <m:r>
-                                      <a:rPr kumimoji="1" lang="en-US" altLang="ja-JP" b="0" i="1" smtClean="0">
-                                        <a:latin typeface="Cambria Math" panose="02040503050406030204" pitchFamily="18" charset="0"/>
-                                      </a:rPr>
-                                      <m:t>1</m:t>
+                                      <m:t>+1</m:t>
                                     </m:r>
                                   </m:sub>
                                 </m:sSub>
@@ -6635,13 +6624,7 @@
                                       <a:rPr kumimoji="1" lang="en-US" altLang="ja-JP" b="0" i="1" smtClean="0">
                                         <a:latin typeface="Cambria Math" panose="02040503050406030204" pitchFamily="18" charset="0"/>
                                       </a:rPr>
-                                      <m:t>+</m:t>
-                                    </m:r>
-                                    <m:r>
-                                      <a:rPr kumimoji="1" lang="en-US" altLang="ja-JP" b="0" i="1" smtClean="0">
-                                        <a:latin typeface="Cambria Math" panose="02040503050406030204" pitchFamily="18" charset="0"/>
-                                      </a:rPr>
-                                      <m:t>1</m:t>
+                                      <m:t>+1</m:t>
                                     </m:r>
                                   </m:sub>
                                 </m:sSub>
@@ -6936,7 +6919,16 @@
                                       <a:rPr kumimoji="1" lang="en-US" altLang="ja-JP" b="0" i="0" smtClean="0">
                                         <a:latin typeface="Cambria Math" panose="02040503050406030204" pitchFamily="18" charset="0"/>
                                       </a:rPr>
-                                      <m:t>cos</m:t>
+                                      <m:t>c</m:t>
+                                    </m:r>
+                                    <m:r>
+                                      <m:rPr>
+                                        <m:sty m:val="p"/>
+                                      </m:rPr>
+                                      <a:rPr kumimoji="1" lang="en-US" altLang="ja-JP" b="0" i="0" smtClean="0">
+                                        <a:latin typeface="Cambria Math" panose="02040503050406030204" pitchFamily="18" charset="0"/>
+                                      </a:rPr>
+                                      <m:t>os</m:t>
                                     </m:r>
                                   </m:fName>
                                   <m:e>
@@ -7189,7 +7181,7 @@
             </p:txBody>
           </p:sp>
         </mc:Choice>
-        <mc:Fallback>
+        <mc:Fallback xmlns="">
           <p:sp>
             <p:nvSpPr>
               <p:cNvPr id="67" name="テキスト ボックス 66">
@@ -7234,8 +7226,8 @@
           </p:sp>
         </mc:Fallback>
       </mc:AlternateContent>
-      <mc:AlternateContent xmlns:mc="http://schemas.openxmlformats.org/markup-compatibility/2006">
-        <mc:Choice xmlns:a14="http://schemas.microsoft.com/office/drawing/2010/main" Requires="a14">
+      <mc:AlternateContent xmlns:mc="http://schemas.openxmlformats.org/markup-compatibility/2006" xmlns:a14="http://schemas.microsoft.com/office/drawing/2010/main">
+        <mc:Choice Requires="a14">
           <p:sp>
             <p:nvSpPr>
               <p:cNvPr id="68" name="正方形/長方形 67">
@@ -7263,6 +7255,7 @@
               </a:bodyPr>
               <a:lstStyle/>
               <a:p>
+                <a:pPr/>
                 <a14:m>
                   <m:oMathPara xmlns:m="http://schemas.openxmlformats.org/officeDocument/2006/math">
                     <m:oMathParaPr>
@@ -7558,7 +7551,7 @@
             </p:txBody>
           </p:sp>
         </mc:Choice>
-        <mc:Fallback>
+        <mc:Fallback xmlns="">
           <p:sp>
             <p:nvSpPr>
               <p:cNvPr id="68" name="正方形/長方形 67">
@@ -7607,6 +7600,2944 @@
     <p:extLst>
       <p:ext uri="{BB962C8B-B14F-4D97-AF65-F5344CB8AC3E}">
         <p14:creationId xmlns:p14="http://schemas.microsoft.com/office/powerpoint/2010/main" val="2621959235"/>
+      </p:ext>
+    </p:extLst>
+  </p:cSld>
+  <p:clrMapOvr>
+    <a:masterClrMapping/>
+  </p:clrMapOvr>
+</p:sld>
+</file>
+
+<file path=ppt/slides/slide2.xml><?xml version="1.0" encoding="utf-8"?>
+<p:sld xmlns:a="http://schemas.openxmlformats.org/drawingml/2006/main" xmlns:r="http://schemas.openxmlformats.org/officeDocument/2006/relationships" xmlns:p="http://schemas.openxmlformats.org/presentationml/2006/main">
+  <p:cSld>
+    <p:spTree>
+      <p:nvGrpSpPr>
+        <p:cNvPr id="1" name=""/>
+        <p:cNvGrpSpPr/>
+        <p:nvPr/>
+      </p:nvGrpSpPr>
+      <p:grpSpPr>
+        <a:xfrm>
+          <a:off x="0" y="0"/>
+          <a:ext cx="0" cy="0"/>
+          <a:chOff x="0" y="0"/>
+          <a:chExt cx="0" cy="0"/>
+        </a:xfrm>
+      </p:grpSpPr>
+      <mc:AlternateContent xmlns:mc="http://schemas.openxmlformats.org/markup-compatibility/2006">
+        <mc:Choice xmlns:a14="http://schemas.microsoft.com/office/drawing/2010/main" Requires="a14">
+          <p:sp>
+            <p:nvSpPr>
+              <p:cNvPr id="2" name="テキスト ボックス 1">
+                <a:extLst>
+                  <a:ext uri="{FF2B5EF4-FFF2-40B4-BE49-F238E27FC236}">
+                    <a16:creationId xmlns:a16="http://schemas.microsoft.com/office/drawing/2014/main" id="{92C5B413-9B08-43B0-8F08-443BAFDB6F92}"/>
+                  </a:ext>
+                </a:extLst>
+              </p:cNvPr>
+              <p:cNvSpPr txBox="1"/>
+              <p:nvPr/>
+            </p:nvSpPr>
+            <p:spPr>
+              <a:xfrm>
+                <a:off x="697877" y="716712"/>
+                <a:ext cx="4996432" cy="830548"/>
+              </a:xfrm>
+              <a:prstGeom prst="rect">
+                <a:avLst/>
+              </a:prstGeom>
+              <a:noFill/>
+            </p:spPr>
+            <p:txBody>
+              <a:bodyPr wrap="none" rtlCol="0">
+                <a:spAutoFit/>
+              </a:bodyPr>
+              <a:lstStyle/>
+              <a:p>
+                <a:pPr algn="ctr"/>
+                <a14:m>
+                  <m:oMathPara xmlns:m="http://schemas.openxmlformats.org/officeDocument/2006/math">
+                    <m:oMathParaPr>
+                      <m:jc m:val="centerGroup"/>
+                    </m:oMathParaPr>
+                    <m:oMath xmlns:m="http://schemas.openxmlformats.org/officeDocument/2006/math">
+                      <m:r>
+                        <a:rPr kumimoji="1" lang="en-US" altLang="ja-JP" b="0" i="1" smtClean="0">
+                          <a:latin typeface="Cambria Math" panose="02040503050406030204" pitchFamily="18" charset="0"/>
+                        </a:rPr>
+                        <m:t>𝑥</m:t>
+                      </m:r>
+                      <m:r>
+                        <a:rPr kumimoji="1" lang="en-US" altLang="ja-JP" b="0" i="1" smtClean="0">
+                          <a:latin typeface="Cambria Math" panose="02040503050406030204" pitchFamily="18" charset="0"/>
+                        </a:rPr>
+                        <m:t>(</m:t>
+                      </m:r>
+                      <m:r>
+                        <a:rPr kumimoji="1" lang="en-US" altLang="ja-JP" b="0" i="1" smtClean="0">
+                          <a:latin typeface="Cambria Math" panose="02040503050406030204" pitchFamily="18" charset="0"/>
+                        </a:rPr>
+                        <m:t>𝑘</m:t>
+                      </m:r>
+                      <m:r>
+                        <a:rPr kumimoji="1" lang="en-US" altLang="ja-JP" b="0" i="1" smtClean="0">
+                          <a:latin typeface="Cambria Math" panose="02040503050406030204" pitchFamily="18" charset="0"/>
+                        </a:rPr>
+                        <m:t>+1)=</m:t>
+                      </m:r>
+                      <m:d>
+                        <m:dPr>
+                          <m:begChr m:val="["/>
+                          <m:endChr m:val="]"/>
+                          <m:ctrlPr>
+                            <a:rPr kumimoji="1" lang="en-US" altLang="ja-JP" b="0" i="1" smtClean="0">
+                              <a:latin typeface="Cambria Math" panose="02040503050406030204" pitchFamily="18" charset="0"/>
+                            </a:rPr>
+                          </m:ctrlPr>
+                        </m:dPr>
+                        <m:e>
+                          <m:m>
+                            <m:mPr>
+                              <m:mcs>
+                                <m:mc>
+                                  <m:mcPr>
+                                    <m:count m:val="3"/>
+                                    <m:mcJc m:val="center"/>
+                                  </m:mcPr>
+                                </m:mc>
+                              </m:mcs>
+                              <m:ctrlPr>
+                                <a:rPr kumimoji="1" lang="en-US" altLang="ja-JP" b="0" i="1" smtClean="0">
+                                  <a:latin typeface="Cambria Math" panose="02040503050406030204" pitchFamily="18" charset="0"/>
+                                </a:rPr>
+                              </m:ctrlPr>
+                            </m:mPr>
+                            <m:mr>
+                              <m:e>
+                                <m:r>
+                                  <m:rPr>
+                                    <m:brk m:alnAt="7"/>
+                                  </m:rPr>
+                                  <a:rPr kumimoji="1" lang="en-US" altLang="ja-JP" b="0" i="1" smtClean="0">
+                                    <a:latin typeface="Cambria Math" panose="02040503050406030204" pitchFamily="18" charset="0"/>
+                                  </a:rPr>
+                                  <m:t>1</m:t>
+                                </m:r>
+                              </m:e>
+                              <m:e>
+                                <m:r>
+                                  <a:rPr kumimoji="1" lang="en-US" altLang="ja-JP" b="0" i="1" smtClean="0">
+                                    <a:latin typeface="Cambria Math" panose="02040503050406030204" pitchFamily="18" charset="0"/>
+                                  </a:rPr>
+                                  <m:t>0</m:t>
+                                </m:r>
+                              </m:e>
+                              <m:e>
+                                <m:r>
+                                  <a:rPr kumimoji="1" lang="en-US" altLang="ja-JP" b="0" i="1" smtClean="0">
+                                    <a:latin typeface="Cambria Math" panose="02040503050406030204" pitchFamily="18" charset="0"/>
+                                  </a:rPr>
+                                  <m:t>0</m:t>
+                                </m:r>
+                              </m:e>
+                            </m:mr>
+                            <m:mr>
+                              <m:e>
+                                <m:r>
+                                  <a:rPr kumimoji="1" lang="en-US" altLang="ja-JP" b="0" i="1" smtClean="0">
+                                    <a:latin typeface="Cambria Math" panose="02040503050406030204" pitchFamily="18" charset="0"/>
+                                  </a:rPr>
+                                  <m:t>0</m:t>
+                                </m:r>
+                              </m:e>
+                              <m:e>
+                                <m:r>
+                                  <a:rPr kumimoji="1" lang="en-US" altLang="ja-JP" b="0" i="1" smtClean="0">
+                                    <a:latin typeface="Cambria Math" panose="02040503050406030204" pitchFamily="18" charset="0"/>
+                                  </a:rPr>
+                                  <m:t>1</m:t>
+                                </m:r>
+                              </m:e>
+                              <m:e>
+                                <m:r>
+                                  <a:rPr kumimoji="1" lang="en-US" altLang="ja-JP" b="0" i="1" smtClean="0">
+                                    <a:latin typeface="Cambria Math" panose="02040503050406030204" pitchFamily="18" charset="0"/>
+                                  </a:rPr>
+                                  <m:t>0</m:t>
+                                </m:r>
+                              </m:e>
+                            </m:mr>
+                            <m:mr>
+                              <m:e>
+                                <m:r>
+                                  <a:rPr kumimoji="1" lang="en-US" altLang="ja-JP" b="0" i="1" smtClean="0">
+                                    <a:latin typeface="Cambria Math" panose="02040503050406030204" pitchFamily="18" charset="0"/>
+                                  </a:rPr>
+                                  <m:t>0</m:t>
+                                </m:r>
+                              </m:e>
+                              <m:e>
+                                <m:r>
+                                  <a:rPr kumimoji="1" lang="en-US" altLang="ja-JP" b="0" i="1" smtClean="0">
+                                    <a:latin typeface="Cambria Math" panose="02040503050406030204" pitchFamily="18" charset="0"/>
+                                  </a:rPr>
+                                  <m:t>0</m:t>
+                                </m:r>
+                              </m:e>
+                              <m:e>
+                                <m:r>
+                                  <a:rPr kumimoji="1" lang="en-US" altLang="ja-JP" b="0" i="1" smtClean="0">
+                                    <a:latin typeface="Cambria Math" panose="02040503050406030204" pitchFamily="18" charset="0"/>
+                                  </a:rPr>
+                                  <m:t>1</m:t>
+                                </m:r>
+                              </m:e>
+                            </m:mr>
+                          </m:m>
+                        </m:e>
+                      </m:d>
+                      <m:r>
+                        <a:rPr kumimoji="1" lang="en-US" altLang="ja-JP" b="0" i="1" smtClean="0">
+                          <a:latin typeface="Cambria Math" panose="02040503050406030204" pitchFamily="18" charset="0"/>
+                        </a:rPr>
+                        <m:t>𝑥</m:t>
+                      </m:r>
+                      <m:r>
+                        <a:rPr kumimoji="1" lang="en-US" altLang="ja-JP" b="0" i="1" smtClean="0">
+                          <a:latin typeface="Cambria Math" panose="02040503050406030204" pitchFamily="18" charset="0"/>
+                        </a:rPr>
+                        <m:t>(</m:t>
+                      </m:r>
+                      <m:r>
+                        <a:rPr kumimoji="1" lang="en-US" altLang="ja-JP" b="0" i="1" smtClean="0">
+                          <a:latin typeface="Cambria Math" panose="02040503050406030204" pitchFamily="18" charset="0"/>
+                        </a:rPr>
+                        <m:t>𝑘</m:t>
+                      </m:r>
+                      <m:r>
+                        <a:rPr kumimoji="1" lang="en-US" altLang="ja-JP" b="0" i="1" smtClean="0">
+                          <a:latin typeface="Cambria Math" panose="02040503050406030204" pitchFamily="18" charset="0"/>
+                        </a:rPr>
+                        <m:t>)+</m:t>
+                      </m:r>
+                      <m:d>
+                        <m:dPr>
+                          <m:begChr m:val="["/>
+                          <m:endChr m:val="]"/>
+                          <m:ctrlPr>
+                            <a:rPr kumimoji="1" lang="en-US" altLang="ja-JP" b="0" i="1" smtClean="0">
+                              <a:latin typeface="Cambria Math" panose="02040503050406030204" pitchFamily="18" charset="0"/>
+                            </a:rPr>
+                          </m:ctrlPr>
+                        </m:dPr>
+                        <m:e>
+                          <m:m>
+                            <m:mPr>
+                              <m:mcs>
+                                <m:mc>
+                                  <m:mcPr>
+                                    <m:count m:val="2"/>
+                                    <m:mcJc m:val="center"/>
+                                  </m:mcPr>
+                                </m:mc>
+                              </m:mcs>
+                              <m:ctrlPr>
+                                <a:rPr kumimoji="1" lang="en-US" altLang="ja-JP" b="0" i="1" smtClean="0">
+                                  <a:latin typeface="Cambria Math" panose="02040503050406030204" pitchFamily="18" charset="0"/>
+                                </a:rPr>
+                              </m:ctrlPr>
+                            </m:mPr>
+                            <m:mr>
+                              <m:e>
+                                <m:r>
+                                  <m:rPr>
+                                    <m:brk m:alnAt="7"/>
+                                  </m:rPr>
+                                  <a:rPr kumimoji="1" lang="en-US" altLang="ja-JP" b="0" i="1" smtClean="0">
+                                    <a:latin typeface="Cambria Math" panose="02040503050406030204" pitchFamily="18" charset="0"/>
+                                  </a:rPr>
+                                  <m:t>0.05</m:t>
+                                </m:r>
+                              </m:e>
+                              <m:e>
+                                <m:r>
+                                  <a:rPr kumimoji="1" lang="en-US" altLang="ja-JP" b="0" i="1" smtClean="0">
+                                    <a:latin typeface="Cambria Math" panose="02040503050406030204" pitchFamily="18" charset="0"/>
+                                  </a:rPr>
+                                  <m:t>0</m:t>
+                                </m:r>
+                              </m:e>
+                            </m:mr>
+                            <m:mr>
+                              <m:e>
+                                <m:r>
+                                  <a:rPr kumimoji="1" lang="en-US" altLang="ja-JP" b="0" i="1" smtClean="0">
+                                    <a:latin typeface="Cambria Math" panose="02040503050406030204" pitchFamily="18" charset="0"/>
+                                  </a:rPr>
+                                  <m:t>0</m:t>
+                                </m:r>
+                              </m:e>
+                              <m:e>
+                                <m:r>
+                                  <a:rPr kumimoji="1" lang="en-US" altLang="ja-JP" b="0" i="1" smtClean="0">
+                                    <a:latin typeface="Cambria Math" panose="02040503050406030204" pitchFamily="18" charset="0"/>
+                                  </a:rPr>
+                                  <m:t>0</m:t>
+                                </m:r>
+                              </m:e>
+                            </m:mr>
+                            <m:mr>
+                              <m:e>
+                                <m:r>
+                                  <a:rPr kumimoji="1" lang="en-US" altLang="ja-JP" b="0" i="1" smtClean="0">
+                                    <a:latin typeface="Cambria Math" panose="02040503050406030204" pitchFamily="18" charset="0"/>
+                                  </a:rPr>
+                                  <m:t>0</m:t>
+                                </m:r>
+                              </m:e>
+                              <m:e>
+                                <m:r>
+                                  <a:rPr kumimoji="1" lang="en-US" altLang="ja-JP" b="0" i="1" smtClean="0">
+                                    <a:latin typeface="Cambria Math" panose="02040503050406030204" pitchFamily="18" charset="0"/>
+                                  </a:rPr>
+                                  <m:t>0.05</m:t>
+                                </m:r>
+                              </m:e>
+                            </m:mr>
+                          </m:m>
+                        </m:e>
+                      </m:d>
+                      <m:r>
+                        <a:rPr lang="en-US" altLang="ja-JP" b="0" i="1" smtClean="0">
+                          <a:latin typeface="Cambria Math" panose="02040503050406030204" pitchFamily="18" charset="0"/>
+                          <a:ea typeface="Cambria Math" panose="02040503050406030204" pitchFamily="18" charset="0"/>
+                        </a:rPr>
+                        <m:t>𝑢</m:t>
+                      </m:r>
+                      <m:r>
+                        <a:rPr lang="en-US" altLang="ja-JP" b="0" i="1" smtClean="0">
+                          <a:latin typeface="Cambria Math" panose="02040503050406030204" pitchFamily="18" charset="0"/>
+                          <a:ea typeface="Cambria Math" panose="02040503050406030204" pitchFamily="18" charset="0"/>
+                        </a:rPr>
+                        <m:t>(</m:t>
+                      </m:r>
+                      <m:r>
+                        <a:rPr lang="en-US" altLang="ja-JP" b="0" i="1" smtClean="0">
+                          <a:latin typeface="Cambria Math" panose="02040503050406030204" pitchFamily="18" charset="0"/>
+                          <a:ea typeface="Cambria Math" panose="02040503050406030204" pitchFamily="18" charset="0"/>
+                        </a:rPr>
+                        <m:t>𝑘</m:t>
+                      </m:r>
+                      <m:r>
+                        <a:rPr lang="en-US" altLang="ja-JP" b="0" i="1" smtClean="0">
+                          <a:latin typeface="Cambria Math" panose="02040503050406030204" pitchFamily="18" charset="0"/>
+                          <a:ea typeface="Cambria Math" panose="02040503050406030204" pitchFamily="18" charset="0"/>
+                        </a:rPr>
+                        <m:t>)</m:t>
+                      </m:r>
+                    </m:oMath>
+                  </m:oMathPara>
+                </a14:m>
+                <a:endParaRPr kumimoji="1" lang="ja-JP" altLang="en-US" dirty="0"/>
+              </a:p>
+            </p:txBody>
+          </p:sp>
+        </mc:Choice>
+        <mc:Fallback>
+          <p:sp>
+            <p:nvSpPr>
+              <p:cNvPr id="2" name="テキスト ボックス 1">
+                <a:extLst>
+                  <a:ext uri="{FF2B5EF4-FFF2-40B4-BE49-F238E27FC236}">
+                    <a16:creationId xmlns:a16="http://schemas.microsoft.com/office/drawing/2014/main" id="{92C5B413-9B08-43B0-8F08-443BAFDB6F92}"/>
+                  </a:ext>
+                </a:extLst>
+              </p:cNvPr>
+              <p:cNvSpPr txBox="1">
+                <a:spLocks noRot="1" noChangeAspect="1" noMove="1" noResize="1" noEditPoints="1" noAdjustHandles="1" noChangeArrowheads="1" noChangeShapeType="1" noTextEdit="1"/>
+              </p:cNvSpPr>
+              <p:nvPr/>
+            </p:nvSpPr>
+            <p:spPr>
+              <a:xfrm>
+                <a:off x="697877" y="716712"/>
+                <a:ext cx="4996432" cy="830548"/>
+              </a:xfrm>
+              <a:prstGeom prst="rect">
+                <a:avLst/>
+              </a:prstGeom>
+              <a:blipFill>
+                <a:blip r:embed="rId2"/>
+                <a:stretch>
+                  <a:fillRect/>
+                </a:stretch>
+              </a:blipFill>
+            </p:spPr>
+            <p:txBody>
+              <a:bodyPr/>
+              <a:lstStyle/>
+              <a:p>
+                <a:r>
+                  <a:rPr lang="ja-JP" altLang="en-US">
+                    <a:noFill/>
+                  </a:rPr>
+                  <a:t> </a:t>
+                </a:r>
+              </a:p>
+            </p:txBody>
+          </p:sp>
+        </mc:Fallback>
+      </mc:AlternateContent>
+      <p:sp>
+        <p:nvSpPr>
+          <p:cNvPr id="3" name="正方形/長方形 2">
+            <a:extLst>
+              <a:ext uri="{FF2B5EF4-FFF2-40B4-BE49-F238E27FC236}">
+                <a16:creationId xmlns:a16="http://schemas.microsoft.com/office/drawing/2014/main" id="{91AB6152-A817-4139-B154-B9542E04EBDD}"/>
+              </a:ext>
+            </a:extLst>
+          </p:cNvPr>
+          <p:cNvSpPr/>
+          <p:nvPr/>
+        </p:nvSpPr>
+        <p:spPr>
+          <a:xfrm>
+            <a:off x="1926458" y="677383"/>
+            <a:ext cx="1091953" cy="914400"/>
+          </a:xfrm>
+          <a:prstGeom prst="rect">
+            <a:avLst/>
+          </a:prstGeom>
+          <a:noFill/>
+          <a:ln w="28575">
+            <a:solidFill>
+              <a:srgbClr val="FF0000"/>
+            </a:solidFill>
+          </a:ln>
+        </p:spPr>
+        <p:style>
+          <a:lnRef idx="2">
+            <a:schemeClr val="accent1">
+              <a:shade val="50000"/>
+            </a:schemeClr>
+          </a:lnRef>
+          <a:fillRef idx="1">
+            <a:schemeClr val="accent1"/>
+          </a:fillRef>
+          <a:effectRef idx="0">
+            <a:schemeClr val="accent1"/>
+          </a:effectRef>
+          <a:fontRef idx="minor">
+            <a:schemeClr val="lt1"/>
+          </a:fontRef>
+        </p:style>
+        <p:txBody>
+          <a:bodyPr rtlCol="0" anchor="ctr"/>
+          <a:lstStyle/>
+          <a:p>
+            <a:pPr algn="ctr"/>
+            <a:endParaRPr kumimoji="1" lang="ja-JP" altLang="en-US"/>
+          </a:p>
+        </p:txBody>
+      </p:sp>
+      <p:sp>
+        <p:nvSpPr>
+          <p:cNvPr id="4" name="正方形/長方形 3">
+            <a:extLst>
+              <a:ext uri="{FF2B5EF4-FFF2-40B4-BE49-F238E27FC236}">
+                <a16:creationId xmlns:a16="http://schemas.microsoft.com/office/drawing/2014/main" id="{787F2A3B-72DC-43AB-B518-251432CD0E8B}"/>
+              </a:ext>
+            </a:extLst>
+          </p:cNvPr>
+          <p:cNvSpPr/>
+          <p:nvPr/>
+        </p:nvSpPr>
+        <p:spPr>
+          <a:xfrm>
+            <a:off x="3712351" y="672665"/>
+            <a:ext cx="1330170" cy="914400"/>
+          </a:xfrm>
+          <a:prstGeom prst="rect">
+            <a:avLst/>
+          </a:prstGeom>
+          <a:noFill/>
+          <a:ln w="28575">
+            <a:solidFill>
+              <a:srgbClr val="FF0000"/>
+            </a:solidFill>
+          </a:ln>
+        </p:spPr>
+        <p:style>
+          <a:lnRef idx="2">
+            <a:schemeClr val="accent1">
+              <a:shade val="50000"/>
+            </a:schemeClr>
+          </a:lnRef>
+          <a:fillRef idx="1">
+            <a:schemeClr val="accent1"/>
+          </a:fillRef>
+          <a:effectRef idx="0">
+            <a:schemeClr val="accent1"/>
+          </a:effectRef>
+          <a:fontRef idx="minor">
+            <a:schemeClr val="lt1"/>
+          </a:fontRef>
+        </p:style>
+        <p:txBody>
+          <a:bodyPr rtlCol="0" anchor="ctr"/>
+          <a:lstStyle/>
+          <a:p>
+            <a:pPr algn="ctr"/>
+            <a:endParaRPr kumimoji="1" lang="ja-JP" altLang="en-US"/>
+          </a:p>
+        </p:txBody>
+      </p:sp>
+      <p:sp>
+        <p:nvSpPr>
+          <p:cNvPr id="5" name="テキスト ボックス 4">
+            <a:extLst>
+              <a:ext uri="{FF2B5EF4-FFF2-40B4-BE49-F238E27FC236}">
+                <a16:creationId xmlns:a16="http://schemas.microsoft.com/office/drawing/2014/main" id="{4B7EA8FB-EE40-4612-B0A0-DAD18C0D7BF2}"/>
+              </a:ext>
+            </a:extLst>
+          </p:cNvPr>
+          <p:cNvSpPr txBox="1"/>
+          <p:nvPr/>
+        </p:nvSpPr>
+        <p:spPr>
+          <a:xfrm>
+            <a:off x="2300752" y="1594617"/>
+            <a:ext cx="343364" cy="369332"/>
+          </a:xfrm>
+          <a:prstGeom prst="rect">
+            <a:avLst/>
+          </a:prstGeom>
+          <a:noFill/>
+        </p:spPr>
+        <p:txBody>
+          <a:bodyPr wrap="none" rtlCol="0">
+            <a:spAutoFit/>
+          </a:bodyPr>
+          <a:lstStyle/>
+          <a:p>
+            <a:pPr algn="ctr"/>
+            <a:r>
+              <a:rPr kumimoji="1" lang="en-US" altLang="ja-JP" b="1" dirty="0"/>
+              <a:t>A</a:t>
+            </a:r>
+            <a:endParaRPr kumimoji="1" lang="ja-JP" altLang="en-US" b="1" dirty="0"/>
+          </a:p>
+        </p:txBody>
+      </p:sp>
+      <p:sp>
+        <p:nvSpPr>
+          <p:cNvPr id="6" name="テキスト ボックス 5">
+            <a:extLst>
+              <a:ext uri="{FF2B5EF4-FFF2-40B4-BE49-F238E27FC236}">
+                <a16:creationId xmlns:a16="http://schemas.microsoft.com/office/drawing/2014/main" id="{42C4DB56-29A8-47BC-AB58-F52F41642B09}"/>
+              </a:ext>
+            </a:extLst>
+          </p:cNvPr>
+          <p:cNvSpPr txBox="1"/>
+          <p:nvPr/>
+        </p:nvSpPr>
+        <p:spPr>
+          <a:xfrm>
+            <a:off x="4203350" y="1589557"/>
+            <a:ext cx="348172" cy="369332"/>
+          </a:xfrm>
+          <a:prstGeom prst="rect">
+            <a:avLst/>
+          </a:prstGeom>
+          <a:noFill/>
+        </p:spPr>
+        <p:txBody>
+          <a:bodyPr wrap="none" rtlCol="0">
+            <a:spAutoFit/>
+          </a:bodyPr>
+          <a:lstStyle/>
+          <a:p>
+            <a:pPr algn="ctr"/>
+            <a:r>
+              <a:rPr lang="en-US" altLang="ja-JP" b="1" dirty="0"/>
+              <a:t>B</a:t>
+            </a:r>
+            <a:endParaRPr kumimoji="1" lang="ja-JP" altLang="en-US" b="1" dirty="0"/>
+          </a:p>
+        </p:txBody>
+      </p:sp>
+      <mc:AlternateContent xmlns:mc="http://schemas.openxmlformats.org/markup-compatibility/2006">
+        <mc:Choice xmlns:a14="http://schemas.microsoft.com/office/drawing/2010/main" Requires="a14">
+          <p:sp>
+            <p:nvSpPr>
+              <p:cNvPr id="7" name="正方形/長方形 6">
+                <a:extLst>
+                  <a:ext uri="{FF2B5EF4-FFF2-40B4-BE49-F238E27FC236}">
+                    <a16:creationId xmlns:a16="http://schemas.microsoft.com/office/drawing/2014/main" id="{22790B26-CD14-47AB-AC70-527D98358507}"/>
+                  </a:ext>
+                </a:extLst>
+              </p:cNvPr>
+              <p:cNvSpPr/>
+              <p:nvPr/>
+            </p:nvSpPr>
+            <p:spPr>
+              <a:xfrm>
+                <a:off x="660399" y="2110794"/>
+                <a:ext cx="3454792" cy="824906"/>
+              </a:xfrm>
+              <a:prstGeom prst="rect">
+                <a:avLst/>
+              </a:prstGeom>
+            </p:spPr>
+            <p:txBody>
+              <a:bodyPr wrap="none">
+                <a:spAutoFit/>
+              </a:bodyPr>
+              <a:lstStyle/>
+              <a:p>
+                <a:pPr/>
+                <a14:m>
+                  <m:oMathPara xmlns:m="http://schemas.openxmlformats.org/officeDocument/2006/math">
+                    <m:oMathParaPr>
+                      <m:jc m:val="centerGroup"/>
+                    </m:oMathParaPr>
+                    <m:oMath xmlns:m="http://schemas.openxmlformats.org/officeDocument/2006/math">
+                      <m:r>
+                        <a:rPr lang="en-US" altLang="ja-JP" b="0" i="1" smtClean="0">
+                          <a:latin typeface="Cambria Math" panose="02040503050406030204" pitchFamily="18" charset="0"/>
+                        </a:rPr>
+                        <m:t>𝑦</m:t>
+                      </m:r>
+                      <m:d>
+                        <m:dPr>
+                          <m:ctrlPr>
+                            <a:rPr lang="en-US" altLang="ja-JP" b="0" i="1" smtClean="0">
+                              <a:latin typeface="Cambria Math" panose="02040503050406030204" pitchFamily="18" charset="0"/>
+                            </a:rPr>
+                          </m:ctrlPr>
+                        </m:dPr>
+                        <m:e>
+                          <m:r>
+                            <a:rPr lang="en-US" altLang="ja-JP" b="0" i="1" smtClean="0">
+                              <a:latin typeface="Cambria Math" panose="02040503050406030204" pitchFamily="18" charset="0"/>
+                            </a:rPr>
+                            <m:t>𝑘</m:t>
+                          </m:r>
+                        </m:e>
+                      </m:d>
+                      <m:r>
+                        <a:rPr lang="en-US" altLang="ja-JP" b="0" i="1" smtClean="0">
+                          <a:latin typeface="Cambria Math" panose="02040503050406030204" pitchFamily="18" charset="0"/>
+                        </a:rPr>
+                        <m:t>=</m:t>
+                      </m:r>
+                      <m:d>
+                        <m:dPr>
+                          <m:begChr m:val="["/>
+                          <m:endChr m:val="]"/>
+                          <m:ctrlPr>
+                            <a:rPr lang="en-US" altLang="ja-JP" i="1">
+                              <a:latin typeface="Cambria Math" panose="02040503050406030204" pitchFamily="18" charset="0"/>
+                            </a:rPr>
+                          </m:ctrlPr>
+                        </m:dPr>
+                        <m:e>
+                          <m:m>
+                            <m:mPr>
+                              <m:mcs>
+                                <m:mc>
+                                  <m:mcPr>
+                                    <m:count m:val="3"/>
+                                    <m:mcJc m:val="center"/>
+                                  </m:mcPr>
+                                </m:mc>
+                              </m:mcs>
+                              <m:ctrlPr>
+                                <a:rPr lang="en-US" altLang="ja-JP" i="1">
+                                  <a:latin typeface="Cambria Math" panose="02040503050406030204" pitchFamily="18" charset="0"/>
+                                </a:rPr>
+                              </m:ctrlPr>
+                            </m:mPr>
+                            <m:mr>
+                              <m:e>
+                                <m:r>
+                                  <m:rPr>
+                                    <m:brk m:alnAt="7"/>
+                                  </m:rPr>
+                                  <a:rPr lang="en-US" altLang="ja-JP" i="1">
+                                    <a:latin typeface="Cambria Math" panose="02040503050406030204" pitchFamily="18" charset="0"/>
+                                  </a:rPr>
+                                  <m:t>1</m:t>
+                                </m:r>
+                              </m:e>
+                              <m:e>
+                                <m:r>
+                                  <a:rPr lang="en-US" altLang="ja-JP" i="1">
+                                    <a:latin typeface="Cambria Math" panose="02040503050406030204" pitchFamily="18" charset="0"/>
+                                  </a:rPr>
+                                  <m:t>0</m:t>
+                                </m:r>
+                              </m:e>
+                              <m:e>
+                                <m:r>
+                                  <a:rPr lang="en-US" altLang="ja-JP" i="1">
+                                    <a:latin typeface="Cambria Math" panose="02040503050406030204" pitchFamily="18" charset="0"/>
+                                  </a:rPr>
+                                  <m:t>0</m:t>
+                                </m:r>
+                              </m:e>
+                            </m:mr>
+                            <m:mr>
+                              <m:e>
+                                <m:r>
+                                  <a:rPr lang="en-US" altLang="ja-JP" i="1">
+                                    <a:latin typeface="Cambria Math" panose="02040503050406030204" pitchFamily="18" charset="0"/>
+                                  </a:rPr>
+                                  <m:t>0</m:t>
+                                </m:r>
+                              </m:e>
+                              <m:e>
+                                <m:r>
+                                  <a:rPr lang="en-US" altLang="ja-JP" i="1">
+                                    <a:latin typeface="Cambria Math" panose="02040503050406030204" pitchFamily="18" charset="0"/>
+                                  </a:rPr>
+                                  <m:t>1</m:t>
+                                </m:r>
+                              </m:e>
+                              <m:e>
+                                <m:r>
+                                  <a:rPr lang="en-US" altLang="ja-JP" i="1">
+                                    <a:latin typeface="Cambria Math" panose="02040503050406030204" pitchFamily="18" charset="0"/>
+                                  </a:rPr>
+                                  <m:t>0</m:t>
+                                </m:r>
+                              </m:e>
+                            </m:mr>
+                            <m:mr>
+                              <m:e>
+                                <m:r>
+                                  <a:rPr lang="en-US" altLang="ja-JP" i="1">
+                                    <a:latin typeface="Cambria Math" panose="02040503050406030204" pitchFamily="18" charset="0"/>
+                                  </a:rPr>
+                                  <m:t>0</m:t>
+                                </m:r>
+                              </m:e>
+                              <m:e>
+                                <m:r>
+                                  <a:rPr lang="en-US" altLang="ja-JP" i="1">
+                                    <a:latin typeface="Cambria Math" panose="02040503050406030204" pitchFamily="18" charset="0"/>
+                                  </a:rPr>
+                                  <m:t>0</m:t>
+                                </m:r>
+                              </m:e>
+                              <m:e>
+                                <m:r>
+                                  <a:rPr lang="en-US" altLang="ja-JP" i="1">
+                                    <a:latin typeface="Cambria Math" panose="02040503050406030204" pitchFamily="18" charset="0"/>
+                                  </a:rPr>
+                                  <m:t>1</m:t>
+                                </m:r>
+                              </m:e>
+                            </m:mr>
+                          </m:m>
+                        </m:e>
+                      </m:d>
+                      <m:r>
+                        <a:rPr lang="en-US" altLang="ja-JP" b="0" i="1" smtClean="0">
+                          <a:latin typeface="Cambria Math" panose="02040503050406030204" pitchFamily="18" charset="0"/>
+                        </a:rPr>
+                        <m:t>𝑥</m:t>
+                      </m:r>
+                      <m:d>
+                        <m:dPr>
+                          <m:ctrlPr>
+                            <a:rPr lang="en-US" altLang="ja-JP" b="0" i="1" smtClean="0">
+                              <a:latin typeface="Cambria Math" panose="02040503050406030204" pitchFamily="18" charset="0"/>
+                            </a:rPr>
+                          </m:ctrlPr>
+                        </m:dPr>
+                        <m:e>
+                          <m:r>
+                            <a:rPr lang="en-US" altLang="ja-JP" b="0" i="1" smtClean="0">
+                              <a:latin typeface="Cambria Math" panose="02040503050406030204" pitchFamily="18" charset="0"/>
+                            </a:rPr>
+                            <m:t>𝑘</m:t>
+                          </m:r>
+                        </m:e>
+                      </m:d>
+                      <m:r>
+                        <a:rPr lang="en-US" altLang="ja-JP" b="0" i="1" smtClean="0">
+                          <a:latin typeface="Cambria Math" panose="02040503050406030204" pitchFamily="18" charset="0"/>
+                        </a:rPr>
+                        <m:t>+0 </m:t>
+                      </m:r>
+                      <m:r>
+                        <a:rPr lang="en-US" altLang="ja-JP" b="0" i="1" smtClean="0">
+                          <a:latin typeface="Cambria Math" panose="02040503050406030204" pitchFamily="18" charset="0"/>
+                        </a:rPr>
+                        <m:t>𝑢</m:t>
+                      </m:r>
+                      <m:r>
+                        <a:rPr lang="en-US" altLang="ja-JP" b="0" i="1" smtClean="0">
+                          <a:latin typeface="Cambria Math" panose="02040503050406030204" pitchFamily="18" charset="0"/>
+                        </a:rPr>
+                        <m:t>(</m:t>
+                      </m:r>
+                      <m:r>
+                        <a:rPr lang="en-US" altLang="ja-JP" b="0" i="1" smtClean="0">
+                          <a:latin typeface="Cambria Math" panose="02040503050406030204" pitchFamily="18" charset="0"/>
+                        </a:rPr>
+                        <m:t>𝑘</m:t>
+                      </m:r>
+                      <m:r>
+                        <a:rPr lang="en-US" altLang="ja-JP" b="0" i="1" smtClean="0">
+                          <a:latin typeface="Cambria Math" panose="02040503050406030204" pitchFamily="18" charset="0"/>
+                        </a:rPr>
+                        <m:t>)</m:t>
+                      </m:r>
+                    </m:oMath>
+                  </m:oMathPara>
+                </a14:m>
+                <a:endParaRPr lang="ja-JP" altLang="en-US" dirty="0"/>
+              </a:p>
+            </p:txBody>
+          </p:sp>
+        </mc:Choice>
+        <mc:Fallback>
+          <p:sp>
+            <p:nvSpPr>
+              <p:cNvPr id="7" name="正方形/長方形 6">
+                <a:extLst>
+                  <a:ext uri="{FF2B5EF4-FFF2-40B4-BE49-F238E27FC236}">
+                    <a16:creationId xmlns:a16="http://schemas.microsoft.com/office/drawing/2014/main" id="{22790B26-CD14-47AB-AC70-527D98358507}"/>
+                  </a:ext>
+                </a:extLst>
+              </p:cNvPr>
+              <p:cNvSpPr>
+                <a:spLocks noRot="1" noChangeAspect="1" noMove="1" noResize="1" noEditPoints="1" noAdjustHandles="1" noChangeArrowheads="1" noChangeShapeType="1" noTextEdit="1"/>
+              </p:cNvSpPr>
+              <p:nvPr/>
+            </p:nvSpPr>
+            <p:spPr>
+              <a:xfrm>
+                <a:off x="660399" y="2110794"/>
+                <a:ext cx="3454792" cy="824906"/>
+              </a:xfrm>
+              <a:prstGeom prst="rect">
+                <a:avLst/>
+              </a:prstGeom>
+              <a:blipFill>
+                <a:blip r:embed="rId3"/>
+                <a:stretch>
+                  <a:fillRect/>
+                </a:stretch>
+              </a:blipFill>
+            </p:spPr>
+            <p:txBody>
+              <a:bodyPr/>
+              <a:lstStyle/>
+              <a:p>
+                <a:r>
+                  <a:rPr lang="ja-JP" altLang="en-US">
+                    <a:noFill/>
+                  </a:rPr>
+                  <a:t> </a:t>
+                </a:r>
+              </a:p>
+            </p:txBody>
+          </p:sp>
+        </mc:Fallback>
+      </mc:AlternateContent>
+      <p:sp>
+        <p:nvSpPr>
+          <p:cNvPr id="8" name="正方形/長方形 7">
+            <a:extLst>
+              <a:ext uri="{FF2B5EF4-FFF2-40B4-BE49-F238E27FC236}">
+                <a16:creationId xmlns:a16="http://schemas.microsoft.com/office/drawing/2014/main" id="{C4A55443-8A6E-4B02-92DE-D4F410309027}"/>
+              </a:ext>
+            </a:extLst>
+          </p:cNvPr>
+          <p:cNvSpPr/>
+          <p:nvPr/>
+        </p:nvSpPr>
+        <p:spPr>
+          <a:xfrm>
+            <a:off x="1501810" y="2066404"/>
+            <a:ext cx="1091953" cy="914400"/>
+          </a:xfrm>
+          <a:prstGeom prst="rect">
+            <a:avLst/>
+          </a:prstGeom>
+          <a:noFill/>
+          <a:ln w="28575">
+            <a:solidFill>
+              <a:srgbClr val="FF0000"/>
+            </a:solidFill>
+          </a:ln>
+        </p:spPr>
+        <p:style>
+          <a:lnRef idx="2">
+            <a:schemeClr val="accent1">
+              <a:shade val="50000"/>
+            </a:schemeClr>
+          </a:lnRef>
+          <a:fillRef idx="1">
+            <a:schemeClr val="accent1"/>
+          </a:fillRef>
+          <a:effectRef idx="0">
+            <a:schemeClr val="accent1"/>
+          </a:effectRef>
+          <a:fontRef idx="minor">
+            <a:schemeClr val="lt1"/>
+          </a:fontRef>
+        </p:style>
+        <p:txBody>
+          <a:bodyPr rtlCol="0" anchor="ctr"/>
+          <a:lstStyle/>
+          <a:p>
+            <a:pPr algn="ctr"/>
+            <a:endParaRPr kumimoji="1" lang="ja-JP" altLang="en-US"/>
+          </a:p>
+        </p:txBody>
+      </p:sp>
+      <p:sp>
+        <p:nvSpPr>
+          <p:cNvPr id="9" name="テキスト ボックス 8">
+            <a:extLst>
+              <a:ext uri="{FF2B5EF4-FFF2-40B4-BE49-F238E27FC236}">
+                <a16:creationId xmlns:a16="http://schemas.microsoft.com/office/drawing/2014/main" id="{9C36BB42-6294-4A9E-B68B-F50CD386309D}"/>
+              </a:ext>
+            </a:extLst>
+          </p:cNvPr>
+          <p:cNvSpPr txBox="1"/>
+          <p:nvPr/>
+        </p:nvSpPr>
+        <p:spPr>
+          <a:xfrm>
+            <a:off x="1872898" y="2983638"/>
+            <a:ext cx="349776" cy="369332"/>
+          </a:xfrm>
+          <a:prstGeom prst="rect">
+            <a:avLst/>
+          </a:prstGeom>
+          <a:noFill/>
+        </p:spPr>
+        <p:txBody>
+          <a:bodyPr wrap="none" rtlCol="0">
+            <a:spAutoFit/>
+          </a:bodyPr>
+          <a:lstStyle/>
+          <a:p>
+            <a:pPr algn="ctr"/>
+            <a:r>
+              <a:rPr lang="en-US" altLang="ja-JP" b="1" dirty="0"/>
+              <a:t>C</a:t>
+            </a:r>
+            <a:endParaRPr kumimoji="1" lang="ja-JP" altLang="en-US" b="1" dirty="0"/>
+          </a:p>
+        </p:txBody>
+      </p:sp>
+      <p:sp>
+        <p:nvSpPr>
+          <p:cNvPr id="10" name="正方形/長方形 9">
+            <a:extLst>
+              <a:ext uri="{FF2B5EF4-FFF2-40B4-BE49-F238E27FC236}">
+                <a16:creationId xmlns:a16="http://schemas.microsoft.com/office/drawing/2014/main" id="{4ED03721-BAB2-4A1E-86B7-611FF0E1BE3D}"/>
+              </a:ext>
+            </a:extLst>
+          </p:cNvPr>
+          <p:cNvSpPr/>
+          <p:nvPr/>
+        </p:nvSpPr>
+        <p:spPr>
+          <a:xfrm>
+            <a:off x="3261074" y="2317071"/>
+            <a:ext cx="263362" cy="426129"/>
+          </a:xfrm>
+          <a:prstGeom prst="rect">
+            <a:avLst/>
+          </a:prstGeom>
+          <a:noFill/>
+          <a:ln w="28575">
+            <a:solidFill>
+              <a:srgbClr val="FF0000"/>
+            </a:solidFill>
+          </a:ln>
+        </p:spPr>
+        <p:style>
+          <a:lnRef idx="2">
+            <a:schemeClr val="accent1">
+              <a:shade val="50000"/>
+            </a:schemeClr>
+          </a:lnRef>
+          <a:fillRef idx="1">
+            <a:schemeClr val="accent1"/>
+          </a:fillRef>
+          <a:effectRef idx="0">
+            <a:schemeClr val="accent1"/>
+          </a:effectRef>
+          <a:fontRef idx="minor">
+            <a:schemeClr val="lt1"/>
+          </a:fontRef>
+        </p:style>
+        <p:txBody>
+          <a:bodyPr rtlCol="0" anchor="ctr"/>
+          <a:lstStyle/>
+          <a:p>
+            <a:pPr algn="ctr"/>
+            <a:endParaRPr kumimoji="1" lang="ja-JP" altLang="en-US"/>
+          </a:p>
+        </p:txBody>
+      </p:sp>
+      <p:sp>
+        <p:nvSpPr>
+          <p:cNvPr id="11" name="テキスト ボックス 10">
+            <a:extLst>
+              <a:ext uri="{FF2B5EF4-FFF2-40B4-BE49-F238E27FC236}">
+                <a16:creationId xmlns:a16="http://schemas.microsoft.com/office/drawing/2014/main" id="{ED19429E-33A7-4950-9172-EDC3A1F7501E}"/>
+              </a:ext>
+            </a:extLst>
+          </p:cNvPr>
+          <p:cNvSpPr txBox="1"/>
+          <p:nvPr/>
+        </p:nvSpPr>
+        <p:spPr>
+          <a:xfrm>
+            <a:off x="3196093" y="2847284"/>
+            <a:ext cx="349776" cy="369332"/>
+          </a:xfrm>
+          <a:prstGeom prst="rect">
+            <a:avLst/>
+          </a:prstGeom>
+          <a:noFill/>
+        </p:spPr>
+        <p:txBody>
+          <a:bodyPr wrap="square" rtlCol="0">
+            <a:spAutoFit/>
+          </a:bodyPr>
+          <a:lstStyle/>
+          <a:p>
+            <a:pPr algn="ctr"/>
+            <a:r>
+              <a:rPr kumimoji="1" lang="en-US" altLang="ja-JP" b="1" dirty="0"/>
+              <a:t>D</a:t>
+            </a:r>
+            <a:endParaRPr kumimoji="1" lang="ja-JP" altLang="en-US" b="1" dirty="0"/>
+          </a:p>
+        </p:txBody>
+      </p:sp>
+      <mc:AlternateContent xmlns:mc="http://schemas.openxmlformats.org/markup-compatibility/2006">
+        <mc:Choice xmlns:a14="http://schemas.microsoft.com/office/drawing/2010/main" Requires="a14">
+          <p:sp>
+            <p:nvSpPr>
+              <p:cNvPr id="12" name="テキスト ボックス 11">
+                <a:extLst>
+                  <a:ext uri="{FF2B5EF4-FFF2-40B4-BE49-F238E27FC236}">
+                    <a16:creationId xmlns:a16="http://schemas.microsoft.com/office/drawing/2014/main" id="{11F98D7A-60BC-4BD6-8327-6C9E3F0AC0C4}"/>
+                  </a:ext>
+                </a:extLst>
+              </p:cNvPr>
+              <p:cNvSpPr txBox="1"/>
+              <p:nvPr/>
+            </p:nvSpPr>
+            <p:spPr>
+              <a:xfrm>
+                <a:off x="7061389" y="1029809"/>
+                <a:ext cx="2379113" cy="369332"/>
+              </a:xfrm>
+              <a:prstGeom prst="rect">
+                <a:avLst/>
+              </a:prstGeom>
+              <a:noFill/>
+            </p:spPr>
+            <p:txBody>
+              <a:bodyPr wrap="none" rtlCol="0">
+                <a:spAutoFit/>
+              </a:bodyPr>
+              <a:lstStyle/>
+              <a:p>
+                <a:pPr algn="ctr"/>
+                <a14:m>
+                  <m:oMathPara xmlns:m="http://schemas.openxmlformats.org/officeDocument/2006/math">
+                    <m:oMathParaPr>
+                      <m:jc m:val="centerGroup"/>
+                    </m:oMathParaPr>
+                    <m:oMath xmlns:m="http://schemas.openxmlformats.org/officeDocument/2006/math">
+                      <m:d>
+                        <m:dPr>
+                          <m:ctrlPr>
+                            <a:rPr kumimoji="1" lang="en-US" altLang="ja-JP" i="1" smtClean="0">
+                              <a:latin typeface="Cambria Math" panose="02040503050406030204" pitchFamily="18" charset="0"/>
+                            </a:rPr>
+                          </m:ctrlPr>
+                        </m:dPr>
+                        <m:e>
+                          <m:r>
+                            <a:rPr kumimoji="1" lang="en-US" altLang="ja-JP" b="0" i="1" smtClean="0">
+                              <a:latin typeface="Cambria Math" panose="02040503050406030204" pitchFamily="18" charset="0"/>
+                            </a:rPr>
+                            <m:t>𝐵</m:t>
+                          </m:r>
+                          <m:r>
+                            <a:rPr kumimoji="1" lang="en-US" altLang="ja-JP" b="0" i="1" smtClean="0">
+                              <a:latin typeface="Cambria Math" panose="02040503050406030204" pitchFamily="18" charset="0"/>
+                            </a:rPr>
+                            <m:t>|</m:t>
+                          </m:r>
+                          <m:r>
+                            <a:rPr kumimoji="1" lang="en-US" altLang="ja-JP" b="0" i="1" smtClean="0">
+                              <a:latin typeface="Cambria Math" panose="02040503050406030204" pitchFamily="18" charset="0"/>
+                            </a:rPr>
+                            <m:t>𝐴𝐵</m:t>
+                          </m:r>
+                          <m:r>
+                            <a:rPr kumimoji="1" lang="en-US" altLang="ja-JP" b="0" i="1" smtClean="0">
+                              <a:latin typeface="Cambria Math" panose="02040503050406030204" pitchFamily="18" charset="0"/>
+                            </a:rPr>
+                            <m:t>|</m:t>
+                          </m:r>
+                          <m:sSup>
+                            <m:sSupPr>
+                              <m:ctrlPr>
+                                <a:rPr kumimoji="1" lang="en-US" altLang="ja-JP" b="0" i="1" smtClean="0">
+                                  <a:latin typeface="Cambria Math" panose="02040503050406030204" pitchFamily="18" charset="0"/>
+                                </a:rPr>
+                              </m:ctrlPr>
+                            </m:sSupPr>
+                            <m:e>
+                              <m:r>
+                                <a:rPr kumimoji="1" lang="en-US" altLang="ja-JP" b="0" i="1" smtClean="0">
+                                  <a:latin typeface="Cambria Math" panose="02040503050406030204" pitchFamily="18" charset="0"/>
+                                </a:rPr>
+                                <m:t>𝐴</m:t>
+                              </m:r>
+                            </m:e>
+                            <m:sup>
+                              <m:r>
+                                <a:rPr kumimoji="1" lang="en-US" altLang="ja-JP" b="0" i="1" smtClean="0">
+                                  <a:latin typeface="Cambria Math" panose="02040503050406030204" pitchFamily="18" charset="0"/>
+                                </a:rPr>
+                                <m:t>2</m:t>
+                              </m:r>
+                            </m:sup>
+                          </m:sSup>
+                          <m:r>
+                            <a:rPr kumimoji="1" lang="en-US" altLang="ja-JP" b="0" i="1" smtClean="0">
+                              <a:latin typeface="Cambria Math" panose="02040503050406030204" pitchFamily="18" charset="0"/>
+                            </a:rPr>
+                            <m:t>𝐵</m:t>
+                          </m:r>
+                          <m:r>
+                            <a:rPr kumimoji="1" lang="en-US" altLang="ja-JP" b="0" i="1" smtClean="0">
+                              <a:latin typeface="Cambria Math" panose="02040503050406030204" pitchFamily="18" charset="0"/>
+                            </a:rPr>
+                            <m:t>⋯</m:t>
+                          </m:r>
+                          <m:sSup>
+                            <m:sSupPr>
+                              <m:ctrlPr>
+                                <a:rPr kumimoji="1" lang="en-US" altLang="ja-JP" b="0" i="1" smtClean="0">
+                                  <a:latin typeface="Cambria Math" panose="02040503050406030204" pitchFamily="18" charset="0"/>
+                                </a:rPr>
+                              </m:ctrlPr>
+                            </m:sSupPr>
+                            <m:e>
+                              <m:r>
+                                <a:rPr kumimoji="1" lang="en-US" altLang="ja-JP" b="0" i="1" smtClean="0">
+                                  <a:latin typeface="Cambria Math" panose="02040503050406030204" pitchFamily="18" charset="0"/>
+                                </a:rPr>
+                                <m:t>𝐴</m:t>
+                              </m:r>
+                            </m:e>
+                            <m:sup>
+                              <m:r>
+                                <a:rPr kumimoji="1" lang="en-US" altLang="ja-JP" b="0" i="1" smtClean="0">
+                                  <a:latin typeface="Cambria Math" panose="02040503050406030204" pitchFamily="18" charset="0"/>
+                                </a:rPr>
+                                <m:t>𝑛</m:t>
+                              </m:r>
+                              <m:r>
+                                <a:rPr kumimoji="1" lang="en-US" altLang="ja-JP" b="0" i="1" smtClean="0">
+                                  <a:latin typeface="Cambria Math" panose="02040503050406030204" pitchFamily="18" charset="0"/>
+                                </a:rPr>
+                                <m:t>−1</m:t>
+                              </m:r>
+                            </m:sup>
+                          </m:sSup>
+                          <m:r>
+                            <a:rPr kumimoji="1" lang="en-US" altLang="ja-JP" b="0" i="1" smtClean="0">
+                              <a:latin typeface="Cambria Math" panose="02040503050406030204" pitchFamily="18" charset="0"/>
+                            </a:rPr>
+                            <m:t>𝐵</m:t>
+                          </m:r>
+                        </m:e>
+                      </m:d>
+                    </m:oMath>
+                  </m:oMathPara>
+                </a14:m>
+                <a:endParaRPr kumimoji="1" lang="ja-JP" altLang="en-US" dirty="0"/>
+              </a:p>
+            </p:txBody>
+          </p:sp>
+        </mc:Choice>
+        <mc:Fallback>
+          <p:sp>
+            <p:nvSpPr>
+              <p:cNvPr id="12" name="テキスト ボックス 11">
+                <a:extLst>
+                  <a:ext uri="{FF2B5EF4-FFF2-40B4-BE49-F238E27FC236}">
+                    <a16:creationId xmlns:a16="http://schemas.microsoft.com/office/drawing/2014/main" id="{11F98D7A-60BC-4BD6-8327-6C9E3F0AC0C4}"/>
+                  </a:ext>
+                </a:extLst>
+              </p:cNvPr>
+              <p:cNvSpPr txBox="1">
+                <a:spLocks noRot="1" noChangeAspect="1" noMove="1" noResize="1" noEditPoints="1" noAdjustHandles="1" noChangeArrowheads="1" noChangeShapeType="1" noTextEdit="1"/>
+              </p:cNvSpPr>
+              <p:nvPr/>
+            </p:nvSpPr>
+            <p:spPr>
+              <a:xfrm>
+                <a:off x="7061389" y="1029809"/>
+                <a:ext cx="2379113" cy="369332"/>
+              </a:xfrm>
+              <a:prstGeom prst="rect">
+                <a:avLst/>
+              </a:prstGeom>
+              <a:blipFill>
+                <a:blip r:embed="rId4"/>
+                <a:stretch>
+                  <a:fillRect b="-11475"/>
+                </a:stretch>
+              </a:blipFill>
+            </p:spPr>
+            <p:txBody>
+              <a:bodyPr/>
+              <a:lstStyle/>
+              <a:p>
+                <a:r>
+                  <a:rPr lang="ja-JP" altLang="en-US">
+                    <a:noFill/>
+                  </a:rPr>
+                  <a:t> </a:t>
+                </a:r>
+              </a:p>
+            </p:txBody>
+          </p:sp>
+        </mc:Fallback>
+      </mc:AlternateContent>
+      <mc:AlternateContent xmlns:mc="http://schemas.openxmlformats.org/markup-compatibility/2006">
+        <mc:Choice xmlns:a14="http://schemas.microsoft.com/office/drawing/2010/main" Requires="a14">
+          <p:sp>
+            <p:nvSpPr>
+              <p:cNvPr id="13" name="テキスト ボックス 12">
+                <a:extLst>
+                  <a:ext uri="{FF2B5EF4-FFF2-40B4-BE49-F238E27FC236}">
+                    <a16:creationId xmlns:a16="http://schemas.microsoft.com/office/drawing/2014/main" id="{00D40E60-F002-46B4-8364-8FE69C971E64}"/>
+                  </a:ext>
+                </a:extLst>
+              </p:cNvPr>
+              <p:cNvSpPr txBox="1"/>
+              <p:nvPr/>
+            </p:nvSpPr>
+            <p:spPr>
+              <a:xfrm>
+                <a:off x="7520039" y="1547260"/>
+                <a:ext cx="1461810" cy="369332"/>
+              </a:xfrm>
+              <a:prstGeom prst="rect">
+                <a:avLst/>
+              </a:prstGeom>
+              <a:noFill/>
+            </p:spPr>
+            <p:txBody>
+              <a:bodyPr wrap="none" rtlCol="0">
+                <a:spAutoFit/>
+              </a:bodyPr>
+              <a:lstStyle/>
+              <a:p>
+                <a:pPr algn="ctr"/>
+                <a14:m>
+                  <m:oMathPara xmlns:m="http://schemas.openxmlformats.org/officeDocument/2006/math">
+                    <m:oMathParaPr>
+                      <m:jc m:val="centerGroup"/>
+                    </m:oMathParaPr>
+                    <m:oMath xmlns:m="http://schemas.openxmlformats.org/officeDocument/2006/math">
+                      <m:d>
+                        <m:dPr>
+                          <m:ctrlPr>
+                            <a:rPr kumimoji="1" lang="en-US" altLang="ja-JP" i="1" smtClean="0">
+                              <a:latin typeface="Cambria Math" panose="02040503050406030204" pitchFamily="18" charset="0"/>
+                            </a:rPr>
+                          </m:ctrlPr>
+                        </m:dPr>
+                        <m:e>
+                          <m:r>
+                            <a:rPr kumimoji="1" lang="en-US" altLang="ja-JP" b="0" i="1" smtClean="0">
+                              <a:latin typeface="Cambria Math" panose="02040503050406030204" pitchFamily="18" charset="0"/>
+                            </a:rPr>
+                            <m:t>𝐵</m:t>
+                          </m:r>
+                          <m:r>
+                            <a:rPr kumimoji="1" lang="en-US" altLang="ja-JP" b="0" i="1" smtClean="0">
+                              <a:latin typeface="Cambria Math" panose="02040503050406030204" pitchFamily="18" charset="0"/>
+                            </a:rPr>
+                            <m:t>|</m:t>
+                          </m:r>
+                          <m:r>
+                            <a:rPr kumimoji="1" lang="en-US" altLang="ja-JP" b="0" i="1" smtClean="0">
+                              <a:latin typeface="Cambria Math" panose="02040503050406030204" pitchFamily="18" charset="0"/>
+                            </a:rPr>
+                            <m:t>𝐴𝐵</m:t>
+                          </m:r>
+                          <m:r>
+                            <a:rPr kumimoji="1" lang="en-US" altLang="ja-JP" b="0" i="1" smtClean="0">
+                              <a:latin typeface="Cambria Math" panose="02040503050406030204" pitchFamily="18" charset="0"/>
+                            </a:rPr>
+                            <m:t>|</m:t>
+                          </m:r>
+                          <m:sSup>
+                            <m:sSupPr>
+                              <m:ctrlPr>
+                                <a:rPr kumimoji="1" lang="en-US" altLang="ja-JP" b="0" i="1" smtClean="0">
+                                  <a:latin typeface="Cambria Math" panose="02040503050406030204" pitchFamily="18" charset="0"/>
+                                </a:rPr>
+                              </m:ctrlPr>
+                            </m:sSupPr>
+                            <m:e>
+                              <m:r>
+                                <a:rPr kumimoji="1" lang="en-US" altLang="ja-JP" b="0" i="1" smtClean="0">
+                                  <a:latin typeface="Cambria Math" panose="02040503050406030204" pitchFamily="18" charset="0"/>
+                                </a:rPr>
+                                <m:t>𝐴</m:t>
+                              </m:r>
+                            </m:e>
+                            <m:sup>
+                              <m:r>
+                                <a:rPr kumimoji="1" lang="en-US" altLang="ja-JP" b="0" i="1" smtClean="0">
+                                  <a:latin typeface="Cambria Math" panose="02040503050406030204" pitchFamily="18" charset="0"/>
+                                </a:rPr>
+                                <m:t>2</m:t>
+                              </m:r>
+                            </m:sup>
+                          </m:sSup>
+                          <m:r>
+                            <a:rPr kumimoji="1" lang="en-US" altLang="ja-JP" b="0" i="1" smtClean="0">
+                              <a:latin typeface="Cambria Math" panose="02040503050406030204" pitchFamily="18" charset="0"/>
+                            </a:rPr>
+                            <m:t>𝐵</m:t>
+                          </m:r>
+                        </m:e>
+                      </m:d>
+                    </m:oMath>
+                  </m:oMathPara>
+                </a14:m>
+                <a:endParaRPr kumimoji="1" lang="ja-JP" altLang="en-US" dirty="0"/>
+              </a:p>
+            </p:txBody>
+          </p:sp>
+        </mc:Choice>
+        <mc:Fallback>
+          <p:sp>
+            <p:nvSpPr>
+              <p:cNvPr id="13" name="テキスト ボックス 12">
+                <a:extLst>
+                  <a:ext uri="{FF2B5EF4-FFF2-40B4-BE49-F238E27FC236}">
+                    <a16:creationId xmlns:a16="http://schemas.microsoft.com/office/drawing/2014/main" id="{00D40E60-F002-46B4-8364-8FE69C971E64}"/>
+                  </a:ext>
+                </a:extLst>
+              </p:cNvPr>
+              <p:cNvSpPr txBox="1">
+                <a:spLocks noRot="1" noChangeAspect="1" noMove="1" noResize="1" noEditPoints="1" noAdjustHandles="1" noChangeArrowheads="1" noChangeShapeType="1" noTextEdit="1"/>
+              </p:cNvSpPr>
+              <p:nvPr/>
+            </p:nvSpPr>
+            <p:spPr>
+              <a:xfrm>
+                <a:off x="7520039" y="1547260"/>
+                <a:ext cx="1461810" cy="369332"/>
+              </a:xfrm>
+              <a:prstGeom prst="rect">
+                <a:avLst/>
+              </a:prstGeom>
+              <a:blipFill>
+                <a:blip r:embed="rId5"/>
+                <a:stretch>
+                  <a:fillRect b="-13333"/>
+                </a:stretch>
+              </a:blipFill>
+            </p:spPr>
+            <p:txBody>
+              <a:bodyPr/>
+              <a:lstStyle/>
+              <a:p>
+                <a:r>
+                  <a:rPr lang="ja-JP" altLang="en-US">
+                    <a:noFill/>
+                  </a:rPr>
+                  <a:t> </a:t>
+                </a:r>
+              </a:p>
+            </p:txBody>
+          </p:sp>
+        </mc:Fallback>
+      </mc:AlternateContent>
+      <p:pic>
+        <p:nvPicPr>
+          <p:cNvPr id="14" name="図 13">
+            <a:extLst>
+              <a:ext uri="{FF2B5EF4-FFF2-40B4-BE49-F238E27FC236}">
+                <a16:creationId xmlns:a16="http://schemas.microsoft.com/office/drawing/2014/main" id="{184108CE-FCB3-46AF-9208-6848AE962237}"/>
+              </a:ext>
+            </a:extLst>
+          </p:cNvPr>
+          <p:cNvPicPr>
+            <a:picLocks noChangeAspect="1"/>
+          </p:cNvPicPr>
+          <p:nvPr/>
+        </p:nvPicPr>
+        <p:blipFill>
+          <a:blip r:embed="rId6"/>
+          <a:stretch>
+            <a:fillRect/>
+          </a:stretch>
+        </p:blipFill>
+        <p:spPr>
+          <a:xfrm>
+            <a:off x="5495878" y="2530135"/>
+            <a:ext cx="4173542" cy="1476560"/>
+          </a:xfrm>
+          <a:prstGeom prst="rect">
+            <a:avLst/>
+          </a:prstGeom>
+        </p:spPr>
+      </p:pic>
+      <p:sp>
+        <p:nvSpPr>
+          <p:cNvPr id="15" name="正方形/長方形 14">
+            <a:extLst>
+              <a:ext uri="{FF2B5EF4-FFF2-40B4-BE49-F238E27FC236}">
+                <a16:creationId xmlns:a16="http://schemas.microsoft.com/office/drawing/2014/main" id="{A0DB0EDE-5BA4-44A7-BBD3-460B468C5414}"/>
+              </a:ext>
+            </a:extLst>
+          </p:cNvPr>
+          <p:cNvSpPr/>
+          <p:nvPr/>
+        </p:nvSpPr>
+        <p:spPr>
+          <a:xfrm>
+            <a:off x="5672118" y="2913526"/>
+            <a:ext cx="1270220" cy="914400"/>
+          </a:xfrm>
+          <a:prstGeom prst="rect">
+            <a:avLst/>
+          </a:prstGeom>
+          <a:noFill/>
+          <a:ln w="28575">
+            <a:solidFill>
+              <a:srgbClr val="FF0000"/>
+            </a:solidFill>
+          </a:ln>
+        </p:spPr>
+        <p:style>
+          <a:lnRef idx="2">
+            <a:schemeClr val="accent1">
+              <a:shade val="50000"/>
+            </a:schemeClr>
+          </a:lnRef>
+          <a:fillRef idx="1">
+            <a:schemeClr val="accent1"/>
+          </a:fillRef>
+          <a:effectRef idx="0">
+            <a:schemeClr val="accent1"/>
+          </a:effectRef>
+          <a:fontRef idx="minor">
+            <a:schemeClr val="lt1"/>
+          </a:fontRef>
+        </p:style>
+        <p:txBody>
+          <a:bodyPr rtlCol="0" anchor="ctr"/>
+          <a:lstStyle/>
+          <a:p>
+            <a:pPr algn="ctr"/>
+            <a:endParaRPr kumimoji="1" lang="ja-JP" altLang="en-US"/>
+          </a:p>
+        </p:txBody>
+      </p:sp>
+      <p:sp>
+        <p:nvSpPr>
+          <p:cNvPr id="16" name="正方形/長方形 15">
+            <a:extLst>
+              <a:ext uri="{FF2B5EF4-FFF2-40B4-BE49-F238E27FC236}">
+                <a16:creationId xmlns:a16="http://schemas.microsoft.com/office/drawing/2014/main" id="{0553B9D7-97FD-428C-A539-2FA0D889D0E6}"/>
+              </a:ext>
+            </a:extLst>
+          </p:cNvPr>
+          <p:cNvSpPr/>
+          <p:nvPr/>
+        </p:nvSpPr>
+        <p:spPr>
+          <a:xfrm>
+            <a:off x="6960860" y="2915003"/>
+            <a:ext cx="1162208" cy="914400"/>
+          </a:xfrm>
+          <a:prstGeom prst="rect">
+            <a:avLst/>
+          </a:prstGeom>
+          <a:noFill/>
+          <a:ln w="28575">
+            <a:solidFill>
+              <a:srgbClr val="FF0000"/>
+            </a:solidFill>
+          </a:ln>
+        </p:spPr>
+        <p:style>
+          <a:lnRef idx="2">
+            <a:schemeClr val="accent1">
+              <a:shade val="50000"/>
+            </a:schemeClr>
+          </a:lnRef>
+          <a:fillRef idx="1">
+            <a:schemeClr val="accent1"/>
+          </a:fillRef>
+          <a:effectRef idx="0">
+            <a:schemeClr val="accent1"/>
+          </a:effectRef>
+          <a:fontRef idx="minor">
+            <a:schemeClr val="lt1"/>
+          </a:fontRef>
+        </p:style>
+        <p:txBody>
+          <a:bodyPr rtlCol="0" anchor="ctr"/>
+          <a:lstStyle/>
+          <a:p>
+            <a:pPr algn="ctr"/>
+            <a:endParaRPr kumimoji="1" lang="ja-JP" altLang="en-US"/>
+          </a:p>
+        </p:txBody>
+      </p:sp>
+      <p:sp>
+        <p:nvSpPr>
+          <p:cNvPr id="17" name="正方形/長方形 16">
+            <a:extLst>
+              <a:ext uri="{FF2B5EF4-FFF2-40B4-BE49-F238E27FC236}">
+                <a16:creationId xmlns:a16="http://schemas.microsoft.com/office/drawing/2014/main" id="{E2901082-83F2-481C-B6E7-9D7847B093CA}"/>
+              </a:ext>
+            </a:extLst>
+          </p:cNvPr>
+          <p:cNvSpPr/>
+          <p:nvPr/>
+        </p:nvSpPr>
+        <p:spPr>
+          <a:xfrm>
+            <a:off x="8178579" y="2907605"/>
+            <a:ext cx="1162208" cy="914400"/>
+          </a:xfrm>
+          <a:prstGeom prst="rect">
+            <a:avLst/>
+          </a:prstGeom>
+          <a:noFill/>
+          <a:ln w="28575">
+            <a:solidFill>
+              <a:srgbClr val="FF0000"/>
+            </a:solidFill>
+          </a:ln>
+        </p:spPr>
+        <p:style>
+          <a:lnRef idx="2">
+            <a:schemeClr val="accent1">
+              <a:shade val="50000"/>
+            </a:schemeClr>
+          </a:lnRef>
+          <a:fillRef idx="1">
+            <a:schemeClr val="accent1"/>
+          </a:fillRef>
+          <a:effectRef idx="0">
+            <a:schemeClr val="accent1"/>
+          </a:effectRef>
+          <a:fontRef idx="minor">
+            <a:schemeClr val="lt1"/>
+          </a:fontRef>
+        </p:style>
+        <p:txBody>
+          <a:bodyPr rtlCol="0" anchor="ctr"/>
+          <a:lstStyle/>
+          <a:p>
+            <a:pPr algn="ctr"/>
+            <a:endParaRPr kumimoji="1" lang="ja-JP" altLang="en-US"/>
+          </a:p>
+        </p:txBody>
+      </p:sp>
+      <mc:AlternateContent xmlns:mc="http://schemas.openxmlformats.org/markup-compatibility/2006">
+        <mc:Choice xmlns:a14="http://schemas.microsoft.com/office/drawing/2010/main" Requires="a14">
+          <p:sp>
+            <p:nvSpPr>
+              <p:cNvPr id="18" name="テキスト ボックス 17">
+                <a:extLst>
+                  <a:ext uri="{FF2B5EF4-FFF2-40B4-BE49-F238E27FC236}">
+                    <a16:creationId xmlns:a16="http://schemas.microsoft.com/office/drawing/2014/main" id="{6E1E13D3-F728-403D-AA0B-0448990C2E8E}"/>
+                  </a:ext>
+                </a:extLst>
+              </p:cNvPr>
+              <p:cNvSpPr txBox="1"/>
+              <p:nvPr/>
+            </p:nvSpPr>
+            <p:spPr>
+              <a:xfrm>
+                <a:off x="6099403" y="4025608"/>
+                <a:ext cx="408893" cy="369332"/>
+              </a:xfrm>
+              <a:prstGeom prst="rect">
+                <a:avLst/>
+              </a:prstGeom>
+              <a:noFill/>
+            </p:spPr>
+            <p:txBody>
+              <a:bodyPr wrap="none" rtlCol="0">
+                <a:spAutoFit/>
+              </a:bodyPr>
+              <a:lstStyle/>
+              <a:p>
+                <a:pPr algn="ctr"/>
+                <a14:m>
+                  <m:oMathPara xmlns:m="http://schemas.openxmlformats.org/officeDocument/2006/math">
+                    <m:oMathParaPr>
+                      <m:jc m:val="centerGroup"/>
+                    </m:oMathParaPr>
+                    <m:oMath xmlns:m="http://schemas.openxmlformats.org/officeDocument/2006/math">
+                      <m:r>
+                        <a:rPr kumimoji="1" lang="en-US" altLang="ja-JP" b="0" i="1" smtClean="0">
+                          <a:latin typeface="Cambria Math" panose="02040503050406030204" pitchFamily="18" charset="0"/>
+                        </a:rPr>
+                        <m:t>𝐵</m:t>
+                      </m:r>
+                    </m:oMath>
+                  </m:oMathPara>
+                </a14:m>
+                <a:endParaRPr kumimoji="1" lang="ja-JP" altLang="en-US" dirty="0"/>
+              </a:p>
+            </p:txBody>
+          </p:sp>
+        </mc:Choice>
+        <mc:Fallback>
+          <p:sp>
+            <p:nvSpPr>
+              <p:cNvPr id="18" name="テキスト ボックス 17">
+                <a:extLst>
+                  <a:ext uri="{FF2B5EF4-FFF2-40B4-BE49-F238E27FC236}">
+                    <a16:creationId xmlns:a16="http://schemas.microsoft.com/office/drawing/2014/main" id="{6E1E13D3-F728-403D-AA0B-0448990C2E8E}"/>
+                  </a:ext>
+                </a:extLst>
+              </p:cNvPr>
+              <p:cNvSpPr txBox="1">
+                <a:spLocks noRot="1" noChangeAspect="1" noMove="1" noResize="1" noEditPoints="1" noAdjustHandles="1" noChangeArrowheads="1" noChangeShapeType="1" noTextEdit="1"/>
+              </p:cNvSpPr>
+              <p:nvPr/>
+            </p:nvSpPr>
+            <p:spPr>
+              <a:xfrm>
+                <a:off x="6099403" y="4025608"/>
+                <a:ext cx="408893" cy="369332"/>
+              </a:xfrm>
+              <a:prstGeom prst="rect">
+                <a:avLst/>
+              </a:prstGeom>
+              <a:blipFill>
+                <a:blip r:embed="rId7"/>
+                <a:stretch>
+                  <a:fillRect/>
+                </a:stretch>
+              </a:blipFill>
+            </p:spPr>
+            <p:txBody>
+              <a:bodyPr/>
+              <a:lstStyle/>
+              <a:p>
+                <a:r>
+                  <a:rPr lang="ja-JP" altLang="en-US">
+                    <a:noFill/>
+                  </a:rPr>
+                  <a:t> </a:t>
+                </a:r>
+              </a:p>
+            </p:txBody>
+          </p:sp>
+        </mc:Fallback>
+      </mc:AlternateContent>
+      <mc:AlternateContent xmlns:mc="http://schemas.openxmlformats.org/markup-compatibility/2006">
+        <mc:Choice xmlns:a14="http://schemas.microsoft.com/office/drawing/2010/main" Requires="a14">
+          <p:sp>
+            <p:nvSpPr>
+              <p:cNvPr id="19" name="テキスト ボックス 18">
+                <a:extLst>
+                  <a:ext uri="{FF2B5EF4-FFF2-40B4-BE49-F238E27FC236}">
+                    <a16:creationId xmlns:a16="http://schemas.microsoft.com/office/drawing/2014/main" id="{9FC9BA6F-9C96-4A3F-8571-3D483E0787E9}"/>
+                  </a:ext>
+                </a:extLst>
+              </p:cNvPr>
+              <p:cNvSpPr txBox="1"/>
+              <p:nvPr/>
+            </p:nvSpPr>
+            <p:spPr>
+              <a:xfrm>
+                <a:off x="7270820" y="4035966"/>
+                <a:ext cx="554767" cy="369332"/>
+              </a:xfrm>
+              <a:prstGeom prst="rect">
+                <a:avLst/>
+              </a:prstGeom>
+              <a:noFill/>
+            </p:spPr>
+            <p:txBody>
+              <a:bodyPr wrap="none" rtlCol="0">
+                <a:spAutoFit/>
+              </a:bodyPr>
+              <a:lstStyle/>
+              <a:p>
+                <a:pPr algn="ctr"/>
+                <a14:m>
+                  <m:oMathPara xmlns:m="http://schemas.openxmlformats.org/officeDocument/2006/math">
+                    <m:oMathParaPr>
+                      <m:jc m:val="centerGroup"/>
+                    </m:oMathParaPr>
+                    <m:oMath xmlns:m="http://schemas.openxmlformats.org/officeDocument/2006/math">
+                      <m:r>
+                        <a:rPr kumimoji="1" lang="en-US" altLang="ja-JP" b="0" i="1" smtClean="0">
+                          <a:latin typeface="Cambria Math" panose="02040503050406030204" pitchFamily="18" charset="0"/>
+                        </a:rPr>
+                        <m:t>𝐴𝐵</m:t>
+                      </m:r>
+                    </m:oMath>
+                  </m:oMathPara>
+                </a14:m>
+                <a:endParaRPr kumimoji="1" lang="ja-JP" altLang="en-US" dirty="0"/>
+              </a:p>
+            </p:txBody>
+          </p:sp>
+        </mc:Choice>
+        <mc:Fallback>
+          <p:sp>
+            <p:nvSpPr>
+              <p:cNvPr id="19" name="テキスト ボックス 18">
+                <a:extLst>
+                  <a:ext uri="{FF2B5EF4-FFF2-40B4-BE49-F238E27FC236}">
+                    <a16:creationId xmlns:a16="http://schemas.microsoft.com/office/drawing/2014/main" id="{9FC9BA6F-9C96-4A3F-8571-3D483E0787E9}"/>
+                  </a:ext>
+                </a:extLst>
+              </p:cNvPr>
+              <p:cNvSpPr txBox="1">
+                <a:spLocks noRot="1" noChangeAspect="1" noMove="1" noResize="1" noEditPoints="1" noAdjustHandles="1" noChangeArrowheads="1" noChangeShapeType="1" noTextEdit="1"/>
+              </p:cNvSpPr>
+              <p:nvPr/>
+            </p:nvSpPr>
+            <p:spPr>
+              <a:xfrm>
+                <a:off x="7270820" y="4035966"/>
+                <a:ext cx="554767" cy="369332"/>
+              </a:xfrm>
+              <a:prstGeom prst="rect">
+                <a:avLst/>
+              </a:prstGeom>
+              <a:blipFill>
+                <a:blip r:embed="rId8"/>
+                <a:stretch>
+                  <a:fillRect/>
+                </a:stretch>
+              </a:blipFill>
+            </p:spPr>
+            <p:txBody>
+              <a:bodyPr/>
+              <a:lstStyle/>
+              <a:p>
+                <a:r>
+                  <a:rPr lang="ja-JP" altLang="en-US">
+                    <a:noFill/>
+                  </a:rPr>
+                  <a:t> </a:t>
+                </a:r>
+              </a:p>
+            </p:txBody>
+          </p:sp>
+        </mc:Fallback>
+      </mc:AlternateContent>
+      <mc:AlternateContent xmlns:mc="http://schemas.openxmlformats.org/markup-compatibility/2006">
+        <mc:Choice xmlns:a14="http://schemas.microsoft.com/office/drawing/2010/main" Requires="a14">
+          <p:sp>
+            <p:nvSpPr>
+              <p:cNvPr id="20" name="テキスト ボックス 19">
+                <a:extLst>
+                  <a:ext uri="{FF2B5EF4-FFF2-40B4-BE49-F238E27FC236}">
+                    <a16:creationId xmlns:a16="http://schemas.microsoft.com/office/drawing/2014/main" id="{80C921A0-139A-420D-8DB5-AF03E8AE9291}"/>
+                  </a:ext>
+                </a:extLst>
+              </p:cNvPr>
+              <p:cNvSpPr txBox="1"/>
+              <p:nvPr/>
+            </p:nvSpPr>
+            <p:spPr>
+              <a:xfrm>
+                <a:off x="8489261" y="4046321"/>
+                <a:ext cx="659860" cy="369332"/>
+              </a:xfrm>
+              <a:prstGeom prst="rect">
+                <a:avLst/>
+              </a:prstGeom>
+              <a:noFill/>
+            </p:spPr>
+            <p:txBody>
+              <a:bodyPr wrap="none" rtlCol="0">
+                <a:spAutoFit/>
+              </a:bodyPr>
+              <a:lstStyle/>
+              <a:p>
+                <a:pPr algn="ctr"/>
+                <a14:m>
+                  <m:oMathPara xmlns:m="http://schemas.openxmlformats.org/officeDocument/2006/math">
+                    <m:oMathParaPr>
+                      <m:jc m:val="centerGroup"/>
+                    </m:oMathParaPr>
+                    <m:oMath xmlns:m="http://schemas.openxmlformats.org/officeDocument/2006/math">
+                      <m:sSup>
+                        <m:sSupPr>
+                          <m:ctrlPr>
+                            <a:rPr kumimoji="1" lang="en-US" altLang="ja-JP" b="0" i="1" smtClean="0">
+                              <a:latin typeface="Cambria Math" panose="02040503050406030204" pitchFamily="18" charset="0"/>
+                            </a:rPr>
+                          </m:ctrlPr>
+                        </m:sSupPr>
+                        <m:e>
+                          <m:r>
+                            <a:rPr kumimoji="1" lang="en-US" altLang="ja-JP" b="0" i="1" smtClean="0">
+                              <a:latin typeface="Cambria Math" panose="02040503050406030204" pitchFamily="18" charset="0"/>
+                            </a:rPr>
+                            <m:t>𝐴</m:t>
+                          </m:r>
+                        </m:e>
+                        <m:sup>
+                          <m:r>
+                            <a:rPr kumimoji="1" lang="en-US" altLang="ja-JP" b="0" i="1" smtClean="0">
+                              <a:latin typeface="Cambria Math" panose="02040503050406030204" pitchFamily="18" charset="0"/>
+                            </a:rPr>
+                            <m:t>2</m:t>
+                          </m:r>
+                        </m:sup>
+                      </m:sSup>
+                      <m:r>
+                        <a:rPr kumimoji="1" lang="en-US" altLang="ja-JP" b="0" i="1" smtClean="0">
+                          <a:latin typeface="Cambria Math" panose="02040503050406030204" pitchFamily="18" charset="0"/>
+                        </a:rPr>
+                        <m:t>𝐵</m:t>
+                      </m:r>
+                    </m:oMath>
+                  </m:oMathPara>
+                </a14:m>
+                <a:endParaRPr kumimoji="1" lang="ja-JP" altLang="en-US" dirty="0"/>
+              </a:p>
+            </p:txBody>
+          </p:sp>
+        </mc:Choice>
+        <mc:Fallback>
+          <p:sp>
+            <p:nvSpPr>
+              <p:cNvPr id="20" name="テキスト ボックス 19">
+                <a:extLst>
+                  <a:ext uri="{FF2B5EF4-FFF2-40B4-BE49-F238E27FC236}">
+                    <a16:creationId xmlns:a16="http://schemas.microsoft.com/office/drawing/2014/main" id="{80C921A0-139A-420D-8DB5-AF03E8AE9291}"/>
+                  </a:ext>
+                </a:extLst>
+              </p:cNvPr>
+              <p:cNvSpPr txBox="1">
+                <a:spLocks noRot="1" noChangeAspect="1" noMove="1" noResize="1" noEditPoints="1" noAdjustHandles="1" noChangeArrowheads="1" noChangeShapeType="1" noTextEdit="1"/>
+              </p:cNvSpPr>
+              <p:nvPr/>
+            </p:nvSpPr>
+            <p:spPr>
+              <a:xfrm>
+                <a:off x="8489261" y="4046321"/>
+                <a:ext cx="659860" cy="369332"/>
+              </a:xfrm>
+              <a:prstGeom prst="rect">
+                <a:avLst/>
+              </a:prstGeom>
+              <a:blipFill>
+                <a:blip r:embed="rId9"/>
+                <a:stretch>
+                  <a:fillRect/>
+                </a:stretch>
+              </a:blipFill>
+            </p:spPr>
+            <p:txBody>
+              <a:bodyPr/>
+              <a:lstStyle/>
+              <a:p>
+                <a:r>
+                  <a:rPr lang="ja-JP" altLang="en-US">
+                    <a:noFill/>
+                  </a:rPr>
+                  <a:t> </a:t>
+                </a:r>
+              </a:p>
+            </p:txBody>
+          </p:sp>
+        </mc:Fallback>
+      </mc:AlternateContent>
+      <mc:AlternateContent xmlns:mc="http://schemas.openxmlformats.org/markup-compatibility/2006">
+        <mc:Choice xmlns:a14="http://schemas.microsoft.com/office/drawing/2010/main" Requires="a14">
+          <p:sp>
+            <p:nvSpPr>
+              <p:cNvPr id="21" name="テキスト ボックス 20">
+                <a:extLst>
+                  <a:ext uri="{FF2B5EF4-FFF2-40B4-BE49-F238E27FC236}">
+                    <a16:creationId xmlns:a16="http://schemas.microsoft.com/office/drawing/2014/main" id="{7C1A60E2-1D66-4239-9214-AC278541C100}"/>
+                  </a:ext>
+                </a:extLst>
+              </p:cNvPr>
+              <p:cNvSpPr txBox="1"/>
+              <p:nvPr/>
+            </p:nvSpPr>
+            <p:spPr>
+              <a:xfrm>
+                <a:off x="562852" y="4394940"/>
+                <a:ext cx="2358145" cy="824906"/>
+              </a:xfrm>
+              <a:prstGeom prst="rect">
+                <a:avLst/>
+              </a:prstGeom>
+              <a:noFill/>
+            </p:spPr>
+            <p:txBody>
+              <a:bodyPr wrap="none" rtlCol="0">
+                <a:spAutoFit/>
+              </a:bodyPr>
+              <a:lstStyle/>
+              <a:p>
+                <a:pPr algn="ctr"/>
+                <a14:m>
+                  <m:oMathPara xmlns:m="http://schemas.openxmlformats.org/officeDocument/2006/math">
+                    <m:oMathParaPr>
+                      <m:jc m:val="centerGroup"/>
+                    </m:oMathParaPr>
+                    <m:oMath xmlns:m="http://schemas.openxmlformats.org/officeDocument/2006/math">
+                      <m:d>
+                        <m:dPr>
+                          <m:begChr m:val="["/>
+                          <m:endChr m:val="]"/>
+                          <m:ctrlPr>
+                            <a:rPr kumimoji="1" lang="en-US" altLang="ja-JP" i="1" smtClean="0">
+                              <a:latin typeface="Cambria Math" panose="02040503050406030204" pitchFamily="18" charset="0"/>
+                            </a:rPr>
+                          </m:ctrlPr>
+                        </m:dPr>
+                        <m:e>
+                          <m:m>
+                            <m:mPr>
+                              <m:mcs>
+                                <m:mc>
+                                  <m:mcPr>
+                                    <m:count m:val="3"/>
+                                    <m:mcJc m:val="center"/>
+                                  </m:mcPr>
+                                </m:mc>
+                              </m:mcs>
+                              <m:ctrlPr>
+                                <a:rPr kumimoji="1" lang="en-US" altLang="ja-JP" i="1" smtClean="0">
+                                  <a:latin typeface="Cambria Math" panose="02040503050406030204" pitchFamily="18" charset="0"/>
+                                </a:rPr>
+                              </m:ctrlPr>
+                            </m:mPr>
+                            <m:mr>
+                              <m:e>
+                                <m:m>
+                                  <m:mPr>
+                                    <m:mcs>
+                                      <m:mc>
+                                        <m:mcPr>
+                                          <m:count m:val="2"/>
+                                          <m:mcJc m:val="center"/>
+                                        </m:mcPr>
+                                      </m:mc>
+                                    </m:mcs>
+                                    <m:ctrlPr>
+                                      <a:rPr kumimoji="1" lang="en-US" altLang="ja-JP" i="1" smtClean="0">
+                                        <a:latin typeface="Cambria Math" panose="02040503050406030204" pitchFamily="18" charset="0"/>
+                                      </a:rPr>
+                                    </m:ctrlPr>
+                                  </m:mPr>
+                                  <m:mr>
+                                    <m:e>
+                                      <m:r>
+                                        <m:rPr>
+                                          <m:brk m:alnAt="7"/>
+                                        </m:rPr>
+                                        <a:rPr kumimoji="1" lang="en-US" altLang="ja-JP" b="0" i="1" smtClean="0">
+                                          <a:latin typeface="Cambria Math" panose="02040503050406030204" pitchFamily="18" charset="0"/>
+                                        </a:rPr>
+                                        <m:t>1</m:t>
+                                      </m:r>
+                                    </m:e>
+                                    <m:e>
+                                      <m:r>
+                                        <a:rPr kumimoji="1" lang="en-US" altLang="ja-JP" b="0" i="1" smtClean="0">
+                                          <a:latin typeface="Cambria Math" panose="02040503050406030204" pitchFamily="18" charset="0"/>
+                                        </a:rPr>
+                                        <m:t>0</m:t>
+                                      </m:r>
+                                    </m:e>
+                                  </m:mr>
+                                  <m:mr>
+                                    <m:e>
+                                      <m:r>
+                                        <a:rPr kumimoji="1" lang="en-US" altLang="ja-JP" b="0" i="1" smtClean="0">
+                                          <a:latin typeface="Cambria Math" panose="02040503050406030204" pitchFamily="18" charset="0"/>
+                                        </a:rPr>
+                                        <m:t>0</m:t>
+                                      </m:r>
+                                    </m:e>
+                                    <m:e>
+                                      <m:r>
+                                        <a:rPr kumimoji="1" lang="en-US" altLang="ja-JP" b="0" i="1" smtClean="0">
+                                          <a:latin typeface="Cambria Math" panose="02040503050406030204" pitchFamily="18" charset="0"/>
+                                        </a:rPr>
+                                        <m:t>1</m:t>
+                                      </m:r>
+                                    </m:e>
+                                  </m:mr>
+                                  <m:mr>
+                                    <m:e>
+                                      <m:r>
+                                        <a:rPr kumimoji="1" lang="en-US" altLang="ja-JP" b="0" i="1" smtClean="0">
+                                          <a:latin typeface="Cambria Math" panose="02040503050406030204" pitchFamily="18" charset="0"/>
+                                        </a:rPr>
+                                        <m:t>0</m:t>
+                                      </m:r>
+                                    </m:e>
+                                    <m:e>
+                                      <m:r>
+                                        <a:rPr kumimoji="1" lang="en-US" altLang="ja-JP" b="0" i="1" smtClean="0">
+                                          <a:latin typeface="Cambria Math" panose="02040503050406030204" pitchFamily="18" charset="0"/>
+                                        </a:rPr>
+                                        <m:t>0</m:t>
+                                      </m:r>
+                                    </m:e>
+                                  </m:mr>
+                                </m:m>
+                              </m:e>
+                              <m:e>
+                                <m:m>
+                                  <m:mPr>
+                                    <m:mcs>
+                                      <m:mc>
+                                        <m:mcPr>
+                                          <m:count m:val="2"/>
+                                          <m:mcJc m:val="center"/>
+                                        </m:mcPr>
+                                      </m:mc>
+                                    </m:mcs>
+                                    <m:ctrlPr>
+                                      <a:rPr kumimoji="1" lang="en-US" altLang="ja-JP" i="1" smtClean="0">
+                                        <a:latin typeface="Cambria Math" panose="02040503050406030204" pitchFamily="18" charset="0"/>
+                                      </a:rPr>
+                                    </m:ctrlPr>
+                                  </m:mPr>
+                                  <m:mr>
+                                    <m:e>
+                                      <m:r>
+                                        <m:rPr>
+                                          <m:brk m:alnAt="7"/>
+                                        </m:rPr>
+                                        <a:rPr kumimoji="1" lang="en-US" altLang="ja-JP" b="0" i="1" smtClean="0">
+                                          <a:latin typeface="Cambria Math" panose="02040503050406030204" pitchFamily="18" charset="0"/>
+                                        </a:rPr>
+                                        <m:t>1</m:t>
+                                      </m:r>
+                                    </m:e>
+                                    <m:e>
+                                      <m:r>
+                                        <a:rPr kumimoji="1" lang="en-US" altLang="ja-JP" b="0" i="1" smtClean="0">
+                                          <a:latin typeface="Cambria Math" panose="02040503050406030204" pitchFamily="18" charset="0"/>
+                                        </a:rPr>
+                                        <m:t>0</m:t>
+                                      </m:r>
+                                    </m:e>
+                                  </m:mr>
+                                  <m:mr>
+                                    <m:e>
+                                      <m:r>
+                                        <a:rPr kumimoji="1" lang="en-US" altLang="ja-JP" b="0" i="1" smtClean="0">
+                                          <a:latin typeface="Cambria Math" panose="02040503050406030204" pitchFamily="18" charset="0"/>
+                                        </a:rPr>
+                                        <m:t>0</m:t>
+                                      </m:r>
+                                    </m:e>
+                                    <m:e>
+                                      <m:r>
+                                        <a:rPr kumimoji="1" lang="en-US" altLang="ja-JP" b="0" i="1" smtClean="0">
+                                          <a:latin typeface="Cambria Math" panose="02040503050406030204" pitchFamily="18" charset="0"/>
+                                        </a:rPr>
+                                        <m:t>1</m:t>
+                                      </m:r>
+                                    </m:e>
+                                  </m:mr>
+                                  <m:mr>
+                                    <m:e>
+                                      <m:r>
+                                        <a:rPr kumimoji="1" lang="en-US" altLang="ja-JP" b="0" i="1" smtClean="0">
+                                          <a:latin typeface="Cambria Math" panose="02040503050406030204" pitchFamily="18" charset="0"/>
+                                        </a:rPr>
+                                        <m:t>0</m:t>
+                                      </m:r>
+                                    </m:e>
+                                    <m:e>
+                                      <m:r>
+                                        <a:rPr kumimoji="1" lang="en-US" altLang="ja-JP" b="0" i="1" smtClean="0">
+                                          <a:latin typeface="Cambria Math" panose="02040503050406030204" pitchFamily="18" charset="0"/>
+                                        </a:rPr>
+                                        <m:t>0</m:t>
+                                      </m:r>
+                                    </m:e>
+                                  </m:mr>
+                                </m:m>
+                              </m:e>
+                              <m:e>
+                                <m:m>
+                                  <m:mPr>
+                                    <m:mcs>
+                                      <m:mc>
+                                        <m:mcPr>
+                                          <m:count m:val="2"/>
+                                          <m:mcJc m:val="center"/>
+                                        </m:mcPr>
+                                      </m:mc>
+                                    </m:mcs>
+                                    <m:ctrlPr>
+                                      <a:rPr kumimoji="1" lang="en-US" altLang="ja-JP" i="1" smtClean="0">
+                                        <a:latin typeface="Cambria Math" panose="02040503050406030204" pitchFamily="18" charset="0"/>
+                                      </a:rPr>
+                                    </m:ctrlPr>
+                                  </m:mPr>
+                                  <m:mr>
+                                    <m:e>
+                                      <m:r>
+                                        <m:rPr>
+                                          <m:brk m:alnAt="7"/>
+                                        </m:rPr>
+                                        <a:rPr kumimoji="1" lang="en-US" altLang="ja-JP" b="0" i="1" smtClean="0">
+                                          <a:latin typeface="Cambria Math" panose="02040503050406030204" pitchFamily="18" charset="0"/>
+                                        </a:rPr>
+                                        <m:t>1</m:t>
+                                      </m:r>
+                                    </m:e>
+                                    <m:e>
+                                      <m:r>
+                                        <a:rPr kumimoji="1" lang="en-US" altLang="ja-JP" b="0" i="1" smtClean="0">
+                                          <a:latin typeface="Cambria Math" panose="02040503050406030204" pitchFamily="18" charset="0"/>
+                                        </a:rPr>
+                                        <m:t>0</m:t>
+                                      </m:r>
+                                    </m:e>
+                                  </m:mr>
+                                  <m:mr>
+                                    <m:e>
+                                      <m:r>
+                                        <a:rPr kumimoji="1" lang="en-US" altLang="ja-JP" b="0" i="1" smtClean="0">
+                                          <a:latin typeface="Cambria Math" panose="02040503050406030204" pitchFamily="18" charset="0"/>
+                                        </a:rPr>
+                                        <m:t>0</m:t>
+                                      </m:r>
+                                    </m:e>
+                                    <m:e>
+                                      <m:r>
+                                        <a:rPr kumimoji="1" lang="en-US" altLang="ja-JP" b="0" i="1" smtClean="0">
+                                          <a:latin typeface="Cambria Math" panose="02040503050406030204" pitchFamily="18" charset="0"/>
+                                        </a:rPr>
+                                        <m:t>1</m:t>
+                                      </m:r>
+                                    </m:e>
+                                  </m:mr>
+                                  <m:mr>
+                                    <m:e>
+                                      <m:r>
+                                        <a:rPr kumimoji="1" lang="en-US" altLang="ja-JP" b="0" i="1" smtClean="0">
+                                          <a:latin typeface="Cambria Math" panose="02040503050406030204" pitchFamily="18" charset="0"/>
+                                        </a:rPr>
+                                        <m:t>0</m:t>
+                                      </m:r>
+                                    </m:e>
+                                    <m:e>
+                                      <m:r>
+                                        <a:rPr kumimoji="1" lang="en-US" altLang="ja-JP" b="0" i="1" smtClean="0">
+                                          <a:latin typeface="Cambria Math" panose="02040503050406030204" pitchFamily="18" charset="0"/>
+                                        </a:rPr>
+                                        <m:t>0</m:t>
+                                      </m:r>
+                                    </m:e>
+                                  </m:mr>
+                                </m:m>
+                              </m:e>
+                            </m:mr>
+                          </m:m>
+                        </m:e>
+                      </m:d>
+                    </m:oMath>
+                  </m:oMathPara>
+                </a14:m>
+                <a:endParaRPr kumimoji="1" lang="ja-JP" altLang="en-US" dirty="0"/>
+              </a:p>
+            </p:txBody>
+          </p:sp>
+        </mc:Choice>
+        <mc:Fallback>
+          <p:sp>
+            <p:nvSpPr>
+              <p:cNvPr id="21" name="テキスト ボックス 20">
+                <a:extLst>
+                  <a:ext uri="{FF2B5EF4-FFF2-40B4-BE49-F238E27FC236}">
+                    <a16:creationId xmlns:a16="http://schemas.microsoft.com/office/drawing/2014/main" id="{7C1A60E2-1D66-4239-9214-AC278541C100}"/>
+                  </a:ext>
+                </a:extLst>
+              </p:cNvPr>
+              <p:cNvSpPr txBox="1">
+                <a:spLocks noRot="1" noChangeAspect="1" noMove="1" noResize="1" noEditPoints="1" noAdjustHandles="1" noChangeArrowheads="1" noChangeShapeType="1" noTextEdit="1"/>
+              </p:cNvSpPr>
+              <p:nvPr/>
+            </p:nvSpPr>
+            <p:spPr>
+              <a:xfrm>
+                <a:off x="562852" y="4394940"/>
+                <a:ext cx="2358145" cy="824906"/>
+              </a:xfrm>
+              <a:prstGeom prst="rect">
+                <a:avLst/>
+              </a:prstGeom>
+              <a:blipFill>
+                <a:blip r:embed="rId10"/>
+                <a:stretch>
+                  <a:fillRect/>
+                </a:stretch>
+              </a:blipFill>
+            </p:spPr>
+            <p:txBody>
+              <a:bodyPr/>
+              <a:lstStyle/>
+              <a:p>
+                <a:r>
+                  <a:rPr lang="ja-JP" altLang="en-US">
+                    <a:noFill/>
+                  </a:rPr>
+                  <a:t> </a:t>
+                </a:r>
+              </a:p>
+            </p:txBody>
+          </p:sp>
+        </mc:Fallback>
+      </mc:AlternateContent>
+      <mc:AlternateContent xmlns:mc="http://schemas.openxmlformats.org/markup-compatibility/2006">
+        <mc:Choice xmlns:a14="http://schemas.microsoft.com/office/drawing/2010/main" Requires="a14">
+          <p:sp>
+            <p:nvSpPr>
+              <p:cNvPr id="22" name="テキスト ボックス 21">
+                <a:extLst>
+                  <a:ext uri="{FF2B5EF4-FFF2-40B4-BE49-F238E27FC236}">
+                    <a16:creationId xmlns:a16="http://schemas.microsoft.com/office/drawing/2014/main" id="{879E2383-85F1-44DD-BCED-27E4EAEA382F}"/>
+                  </a:ext>
+                </a:extLst>
+              </p:cNvPr>
+              <p:cNvSpPr txBox="1"/>
+              <p:nvPr/>
+            </p:nvSpPr>
+            <p:spPr>
+              <a:xfrm>
+                <a:off x="3610588" y="3852165"/>
+                <a:ext cx="1221616" cy="1126975"/>
+              </a:xfrm>
+              <a:prstGeom prst="rect">
+                <a:avLst/>
+              </a:prstGeom>
+              <a:noFill/>
+            </p:spPr>
+            <p:txBody>
+              <a:bodyPr wrap="none" rtlCol="0">
+                <a:spAutoFit/>
+              </a:bodyPr>
+              <a:lstStyle/>
+              <a:p>
+                <a:pPr algn="ctr"/>
+                <a14:m>
+                  <m:oMathPara xmlns:m="http://schemas.openxmlformats.org/officeDocument/2006/math">
+                    <m:oMathParaPr>
+                      <m:jc m:val="centerGroup"/>
+                    </m:oMathParaPr>
+                    <m:oMath xmlns:m="http://schemas.openxmlformats.org/officeDocument/2006/math">
+                      <m:d>
+                        <m:dPr>
+                          <m:ctrlPr>
+                            <a:rPr kumimoji="1" lang="en-US" altLang="ja-JP" i="1" smtClean="0">
+                              <a:latin typeface="Cambria Math" panose="02040503050406030204" pitchFamily="18" charset="0"/>
+                            </a:rPr>
+                          </m:ctrlPr>
+                        </m:dPr>
+                        <m:e>
+                          <m:eqArr>
+                            <m:eqArrPr>
+                              <m:ctrlPr>
+                                <a:rPr kumimoji="1" lang="en-US" altLang="ja-JP" b="0" i="1" smtClean="0">
+                                  <a:latin typeface="Cambria Math" panose="02040503050406030204" pitchFamily="18" charset="0"/>
+                                </a:rPr>
+                              </m:ctrlPr>
+                            </m:eqArrPr>
+                            <m:e>
+                              <m:r>
+                                <a:rPr kumimoji="1" lang="en-US" altLang="ja-JP" b="0" i="1" smtClean="0">
+                                  <a:latin typeface="Cambria Math" panose="02040503050406030204" pitchFamily="18" charset="0"/>
+                                </a:rPr>
+                                <m:t>𝐶</m:t>
+                              </m:r>
+                            </m:e>
+                            <m:e>
+                              <m:r>
+                                <a:rPr lang="en-US" altLang="ja-JP" b="0" i="1" smtClean="0">
+                                  <a:latin typeface="Cambria Math" panose="02040503050406030204" pitchFamily="18" charset="0"/>
+                                </a:rPr>
+                                <m:t>𝐶𝐴</m:t>
+                              </m:r>
+                            </m:e>
+                            <m:e>
+                              <m:r>
+                                <a:rPr lang="en-US" altLang="ja-JP" b="0" i="1" smtClean="0">
+                                  <a:latin typeface="Cambria Math" panose="02040503050406030204" pitchFamily="18" charset="0"/>
+                                </a:rPr>
+                                <m:t>⋮</m:t>
+                              </m:r>
+                            </m:e>
+                            <m:e>
+                              <m:r>
+                                <a:rPr lang="en-US" altLang="ja-JP" b="0" i="1" smtClean="0">
+                                  <a:latin typeface="Cambria Math" panose="02040503050406030204" pitchFamily="18" charset="0"/>
+                                </a:rPr>
+                                <m:t>𝐶</m:t>
+                              </m:r>
+                              <m:sSup>
+                                <m:sSupPr>
+                                  <m:ctrlPr>
+                                    <a:rPr lang="en-US" altLang="ja-JP" b="0" i="1" smtClean="0">
+                                      <a:latin typeface="Cambria Math" panose="02040503050406030204" pitchFamily="18" charset="0"/>
+                                    </a:rPr>
+                                  </m:ctrlPr>
+                                </m:sSupPr>
+                                <m:e>
+                                  <m:r>
+                                    <a:rPr lang="en-US" altLang="ja-JP" b="0" i="1" smtClean="0">
+                                      <a:latin typeface="Cambria Math" panose="02040503050406030204" pitchFamily="18" charset="0"/>
+                                    </a:rPr>
+                                    <m:t>𝐴</m:t>
+                                  </m:r>
+                                </m:e>
+                                <m:sup>
+                                  <m:r>
+                                    <a:rPr lang="en-US" altLang="ja-JP" b="0" i="1" smtClean="0">
+                                      <a:latin typeface="Cambria Math" panose="02040503050406030204" pitchFamily="18" charset="0"/>
+                                    </a:rPr>
+                                    <m:t>𝑛</m:t>
+                                  </m:r>
+                                  <m:r>
+                                    <a:rPr lang="en-US" altLang="ja-JP" b="0" i="1" smtClean="0">
+                                      <a:latin typeface="Cambria Math" panose="02040503050406030204" pitchFamily="18" charset="0"/>
+                                    </a:rPr>
+                                    <m:t>−1</m:t>
+                                  </m:r>
+                                </m:sup>
+                              </m:sSup>
+                            </m:e>
+                          </m:eqArr>
+                        </m:e>
+                      </m:d>
+                    </m:oMath>
+                  </m:oMathPara>
+                </a14:m>
+                <a:endParaRPr kumimoji="1" lang="ja-JP" altLang="en-US" dirty="0"/>
+              </a:p>
+            </p:txBody>
+          </p:sp>
+        </mc:Choice>
+        <mc:Fallback>
+          <p:sp>
+            <p:nvSpPr>
+              <p:cNvPr id="22" name="テキスト ボックス 21">
+                <a:extLst>
+                  <a:ext uri="{FF2B5EF4-FFF2-40B4-BE49-F238E27FC236}">
+                    <a16:creationId xmlns:a16="http://schemas.microsoft.com/office/drawing/2014/main" id="{879E2383-85F1-44DD-BCED-27E4EAEA382F}"/>
+                  </a:ext>
+                </a:extLst>
+              </p:cNvPr>
+              <p:cNvSpPr txBox="1">
+                <a:spLocks noRot="1" noChangeAspect="1" noMove="1" noResize="1" noEditPoints="1" noAdjustHandles="1" noChangeArrowheads="1" noChangeShapeType="1" noTextEdit="1"/>
+              </p:cNvSpPr>
+              <p:nvPr/>
+            </p:nvSpPr>
+            <p:spPr>
+              <a:xfrm>
+                <a:off x="3610588" y="3852165"/>
+                <a:ext cx="1221616" cy="1126975"/>
+              </a:xfrm>
+              <a:prstGeom prst="rect">
+                <a:avLst/>
+              </a:prstGeom>
+              <a:blipFill>
+                <a:blip r:embed="rId11"/>
+                <a:stretch>
+                  <a:fillRect/>
+                </a:stretch>
+              </a:blipFill>
+            </p:spPr>
+            <p:txBody>
+              <a:bodyPr/>
+              <a:lstStyle/>
+              <a:p>
+                <a:r>
+                  <a:rPr lang="ja-JP" altLang="en-US">
+                    <a:noFill/>
+                  </a:rPr>
+                  <a:t> </a:t>
+                </a:r>
+              </a:p>
+            </p:txBody>
+          </p:sp>
+        </mc:Fallback>
+      </mc:AlternateContent>
+    </p:spTree>
+    <p:extLst>
+      <p:ext uri="{BB962C8B-B14F-4D97-AF65-F5344CB8AC3E}">
+        <p14:creationId xmlns:p14="http://schemas.microsoft.com/office/powerpoint/2010/main" val="1553971758"/>
+      </p:ext>
+    </p:extLst>
+  </p:cSld>
+  <p:clrMapOvr>
+    <a:masterClrMapping/>
+  </p:clrMapOvr>
+</p:sld>
+</file>
+
+<file path=ppt/slides/slide3.xml><?xml version="1.0" encoding="utf-8"?>
+<p:sld xmlns:a="http://schemas.openxmlformats.org/drawingml/2006/main" xmlns:r="http://schemas.openxmlformats.org/officeDocument/2006/relationships" xmlns:p="http://schemas.openxmlformats.org/presentationml/2006/main">
+  <p:cSld>
+    <p:spTree>
+      <p:nvGrpSpPr>
+        <p:cNvPr id="1" name=""/>
+        <p:cNvGrpSpPr/>
+        <p:nvPr/>
+      </p:nvGrpSpPr>
+      <p:grpSpPr>
+        <a:xfrm>
+          <a:off x="0" y="0"/>
+          <a:ext cx="0" cy="0"/>
+          <a:chOff x="0" y="0"/>
+          <a:chExt cx="0" cy="0"/>
+        </a:xfrm>
+      </p:grpSpPr>
+      <p:pic>
+        <p:nvPicPr>
+          <p:cNvPr id="2" name="図 1">
+            <a:extLst>
+              <a:ext uri="{FF2B5EF4-FFF2-40B4-BE49-F238E27FC236}">
+                <a16:creationId xmlns:a16="http://schemas.microsoft.com/office/drawing/2014/main" id="{EC776ABA-AF62-482C-B888-4E7226A02696}"/>
+              </a:ext>
+            </a:extLst>
+          </p:cNvPr>
+          <p:cNvPicPr>
+            <a:picLocks noChangeAspect="1"/>
+          </p:cNvPicPr>
+          <p:nvPr/>
+        </p:nvPicPr>
+        <p:blipFill>
+          <a:blip r:embed="rId2"/>
+          <a:stretch>
+            <a:fillRect/>
+          </a:stretch>
+        </p:blipFill>
+        <p:spPr>
+          <a:xfrm>
+            <a:off x="1624012" y="886333"/>
+            <a:ext cx="2211141" cy="2805951"/>
+          </a:xfrm>
+          <a:prstGeom prst="rect">
+            <a:avLst/>
+          </a:prstGeom>
+        </p:spPr>
+      </p:pic>
+      <p:sp>
+        <p:nvSpPr>
+          <p:cNvPr id="3" name="正方形/長方形 2">
+            <a:extLst>
+              <a:ext uri="{FF2B5EF4-FFF2-40B4-BE49-F238E27FC236}">
+                <a16:creationId xmlns:a16="http://schemas.microsoft.com/office/drawing/2014/main" id="{A44314CC-3659-430C-BCCF-E0178644D30A}"/>
+              </a:ext>
+            </a:extLst>
+          </p:cNvPr>
+          <p:cNvSpPr/>
+          <p:nvPr/>
+        </p:nvSpPr>
+        <p:spPr>
+          <a:xfrm>
+            <a:off x="1757066" y="1200137"/>
+            <a:ext cx="1110421" cy="779584"/>
+          </a:xfrm>
+          <a:prstGeom prst="rect">
+            <a:avLst/>
+          </a:prstGeom>
+          <a:noFill/>
+          <a:ln w="28575">
+            <a:solidFill>
+              <a:srgbClr val="FF0000"/>
+            </a:solidFill>
+          </a:ln>
+        </p:spPr>
+        <p:style>
+          <a:lnRef idx="2">
+            <a:schemeClr val="accent1">
+              <a:shade val="50000"/>
+            </a:schemeClr>
+          </a:lnRef>
+          <a:fillRef idx="1">
+            <a:schemeClr val="accent1"/>
+          </a:fillRef>
+          <a:effectRef idx="0">
+            <a:schemeClr val="accent1"/>
+          </a:effectRef>
+          <a:fontRef idx="minor">
+            <a:schemeClr val="lt1"/>
+          </a:fontRef>
+        </p:style>
+        <p:txBody>
+          <a:bodyPr rtlCol="0" anchor="ctr"/>
+          <a:lstStyle/>
+          <a:p>
+            <a:pPr algn="ctr"/>
+            <a:endParaRPr kumimoji="1" lang="ja-JP" altLang="en-US"/>
+          </a:p>
+        </p:txBody>
+      </p:sp>
+      <mc:AlternateContent xmlns:mc="http://schemas.openxmlformats.org/markup-compatibility/2006">
+        <mc:Choice xmlns:a14="http://schemas.microsoft.com/office/drawing/2010/main" Requires="a14">
+          <p:sp>
+            <p:nvSpPr>
+              <p:cNvPr id="4" name="テキスト ボックス 3">
+                <a:extLst>
+                  <a:ext uri="{FF2B5EF4-FFF2-40B4-BE49-F238E27FC236}">
+                    <a16:creationId xmlns:a16="http://schemas.microsoft.com/office/drawing/2014/main" id="{E0C6F1E4-326C-4BD9-9EE1-CEE720D088F3}"/>
+                  </a:ext>
+                </a:extLst>
+              </p:cNvPr>
+              <p:cNvSpPr txBox="1"/>
+              <p:nvPr/>
+            </p:nvSpPr>
+            <p:spPr>
+              <a:xfrm>
+                <a:off x="1220376" y="1405263"/>
+                <a:ext cx="398379" cy="369332"/>
+              </a:xfrm>
+              <a:prstGeom prst="rect">
+                <a:avLst/>
+              </a:prstGeom>
+              <a:noFill/>
+            </p:spPr>
+            <p:txBody>
+              <a:bodyPr wrap="none" rtlCol="0">
+                <a:spAutoFit/>
+              </a:bodyPr>
+              <a:lstStyle/>
+              <a:p>
+                <a:pPr algn="ctr"/>
+                <a14:m>
+                  <m:oMathPara xmlns:m="http://schemas.openxmlformats.org/officeDocument/2006/math">
+                    <m:oMathParaPr>
+                      <m:jc m:val="centerGroup"/>
+                    </m:oMathParaPr>
+                    <m:oMath xmlns:m="http://schemas.openxmlformats.org/officeDocument/2006/math">
+                      <m:r>
+                        <a:rPr kumimoji="1" lang="en-US" altLang="ja-JP" b="0" i="1" smtClean="0">
+                          <a:latin typeface="Cambria Math" panose="02040503050406030204" pitchFamily="18" charset="0"/>
+                        </a:rPr>
+                        <m:t>𝐶</m:t>
+                      </m:r>
+                    </m:oMath>
+                  </m:oMathPara>
+                </a14:m>
+                <a:endParaRPr kumimoji="1" lang="ja-JP" altLang="en-US" dirty="0"/>
+              </a:p>
+            </p:txBody>
+          </p:sp>
+        </mc:Choice>
+        <mc:Fallback>
+          <p:sp>
+            <p:nvSpPr>
+              <p:cNvPr id="4" name="テキスト ボックス 3">
+                <a:extLst>
+                  <a:ext uri="{FF2B5EF4-FFF2-40B4-BE49-F238E27FC236}">
+                    <a16:creationId xmlns:a16="http://schemas.microsoft.com/office/drawing/2014/main" id="{E0C6F1E4-326C-4BD9-9EE1-CEE720D088F3}"/>
+                  </a:ext>
+                </a:extLst>
+              </p:cNvPr>
+              <p:cNvSpPr txBox="1">
+                <a:spLocks noRot="1" noChangeAspect="1" noMove="1" noResize="1" noEditPoints="1" noAdjustHandles="1" noChangeArrowheads="1" noChangeShapeType="1" noTextEdit="1"/>
+              </p:cNvSpPr>
+              <p:nvPr/>
+            </p:nvSpPr>
+            <p:spPr>
+              <a:xfrm>
+                <a:off x="1220376" y="1405263"/>
+                <a:ext cx="398379" cy="369332"/>
+              </a:xfrm>
+              <a:prstGeom prst="rect">
+                <a:avLst/>
+              </a:prstGeom>
+              <a:blipFill>
+                <a:blip r:embed="rId3"/>
+                <a:stretch>
+                  <a:fillRect/>
+                </a:stretch>
+              </a:blipFill>
+            </p:spPr>
+            <p:txBody>
+              <a:bodyPr/>
+              <a:lstStyle/>
+              <a:p>
+                <a:r>
+                  <a:rPr lang="ja-JP" altLang="en-US">
+                    <a:noFill/>
+                  </a:rPr>
+                  <a:t> </a:t>
+                </a:r>
+              </a:p>
+            </p:txBody>
+          </p:sp>
+        </mc:Fallback>
+      </mc:AlternateContent>
+      <p:sp>
+        <p:nvSpPr>
+          <p:cNvPr id="5" name="正方形/長方形 4">
+            <a:extLst>
+              <a:ext uri="{FF2B5EF4-FFF2-40B4-BE49-F238E27FC236}">
+                <a16:creationId xmlns:a16="http://schemas.microsoft.com/office/drawing/2014/main" id="{BAB5824F-C55F-4818-A79B-043E5E512BC2}"/>
+              </a:ext>
+            </a:extLst>
+          </p:cNvPr>
+          <p:cNvSpPr/>
+          <p:nvPr/>
+        </p:nvSpPr>
+        <p:spPr>
+          <a:xfrm>
+            <a:off x="1758545" y="2009486"/>
+            <a:ext cx="1110421" cy="779584"/>
+          </a:xfrm>
+          <a:prstGeom prst="rect">
+            <a:avLst/>
+          </a:prstGeom>
+          <a:noFill/>
+          <a:ln w="28575">
+            <a:solidFill>
+              <a:srgbClr val="FF0000"/>
+            </a:solidFill>
+          </a:ln>
+        </p:spPr>
+        <p:style>
+          <a:lnRef idx="2">
+            <a:schemeClr val="accent1">
+              <a:shade val="50000"/>
+            </a:schemeClr>
+          </a:lnRef>
+          <a:fillRef idx="1">
+            <a:schemeClr val="accent1"/>
+          </a:fillRef>
+          <a:effectRef idx="0">
+            <a:schemeClr val="accent1"/>
+          </a:effectRef>
+          <a:fontRef idx="minor">
+            <a:schemeClr val="lt1"/>
+          </a:fontRef>
+        </p:style>
+        <p:txBody>
+          <a:bodyPr rtlCol="0" anchor="ctr"/>
+          <a:lstStyle/>
+          <a:p>
+            <a:pPr algn="ctr"/>
+            <a:endParaRPr kumimoji="1" lang="ja-JP" altLang="en-US"/>
+          </a:p>
+        </p:txBody>
+      </p:sp>
+      <p:sp>
+        <p:nvSpPr>
+          <p:cNvPr id="6" name="正方形/長方形 5">
+            <a:extLst>
+              <a:ext uri="{FF2B5EF4-FFF2-40B4-BE49-F238E27FC236}">
+                <a16:creationId xmlns:a16="http://schemas.microsoft.com/office/drawing/2014/main" id="{E520DF08-8101-4364-9D84-851D3175E894}"/>
+              </a:ext>
+            </a:extLst>
+          </p:cNvPr>
+          <p:cNvSpPr/>
+          <p:nvPr/>
+        </p:nvSpPr>
+        <p:spPr>
+          <a:xfrm>
+            <a:off x="1760025" y="2818835"/>
+            <a:ext cx="1110421" cy="779584"/>
+          </a:xfrm>
+          <a:prstGeom prst="rect">
+            <a:avLst/>
+          </a:prstGeom>
+          <a:noFill/>
+          <a:ln w="28575">
+            <a:solidFill>
+              <a:srgbClr val="FF0000"/>
+            </a:solidFill>
+          </a:ln>
+        </p:spPr>
+        <p:style>
+          <a:lnRef idx="2">
+            <a:schemeClr val="accent1">
+              <a:shade val="50000"/>
+            </a:schemeClr>
+          </a:lnRef>
+          <a:fillRef idx="1">
+            <a:schemeClr val="accent1"/>
+          </a:fillRef>
+          <a:effectRef idx="0">
+            <a:schemeClr val="accent1"/>
+          </a:effectRef>
+          <a:fontRef idx="minor">
+            <a:schemeClr val="lt1"/>
+          </a:fontRef>
+        </p:style>
+        <p:txBody>
+          <a:bodyPr rtlCol="0" anchor="ctr"/>
+          <a:lstStyle/>
+          <a:p>
+            <a:pPr algn="ctr"/>
+            <a:endParaRPr kumimoji="1" lang="ja-JP" altLang="en-US"/>
+          </a:p>
+        </p:txBody>
+      </p:sp>
+      <mc:AlternateContent xmlns:mc="http://schemas.openxmlformats.org/markup-compatibility/2006">
+        <mc:Choice xmlns:a14="http://schemas.microsoft.com/office/drawing/2010/main" Requires="a14">
+          <p:sp>
+            <p:nvSpPr>
+              <p:cNvPr id="7" name="テキスト ボックス 6">
+                <a:extLst>
+                  <a:ext uri="{FF2B5EF4-FFF2-40B4-BE49-F238E27FC236}">
+                    <a16:creationId xmlns:a16="http://schemas.microsoft.com/office/drawing/2014/main" id="{94C8C92C-90E1-4636-8E0E-7909F154D25B}"/>
+                  </a:ext>
+                </a:extLst>
+              </p:cNvPr>
+              <p:cNvSpPr txBox="1"/>
+              <p:nvPr/>
+            </p:nvSpPr>
+            <p:spPr>
+              <a:xfrm>
+                <a:off x="1152861" y="2232366"/>
+                <a:ext cx="536365" cy="369332"/>
+              </a:xfrm>
+              <a:prstGeom prst="rect">
+                <a:avLst/>
+              </a:prstGeom>
+              <a:noFill/>
+            </p:spPr>
+            <p:txBody>
+              <a:bodyPr wrap="none" rtlCol="0">
+                <a:spAutoFit/>
+              </a:bodyPr>
+              <a:lstStyle/>
+              <a:p>
+                <a:pPr algn="ctr"/>
+                <a14:m>
+                  <m:oMathPara xmlns:m="http://schemas.openxmlformats.org/officeDocument/2006/math">
+                    <m:oMathParaPr>
+                      <m:jc m:val="centerGroup"/>
+                    </m:oMathParaPr>
+                    <m:oMath xmlns:m="http://schemas.openxmlformats.org/officeDocument/2006/math">
+                      <m:r>
+                        <a:rPr kumimoji="1" lang="en-US" altLang="ja-JP" b="0" i="1" smtClean="0">
+                          <a:latin typeface="Cambria Math" panose="02040503050406030204" pitchFamily="18" charset="0"/>
+                        </a:rPr>
+                        <m:t>𝐶𝐴</m:t>
+                      </m:r>
+                    </m:oMath>
+                  </m:oMathPara>
+                </a14:m>
+                <a:endParaRPr kumimoji="1" lang="ja-JP" altLang="en-US" dirty="0"/>
+              </a:p>
+            </p:txBody>
+          </p:sp>
+        </mc:Choice>
+        <mc:Fallback>
+          <p:sp>
+            <p:nvSpPr>
+              <p:cNvPr id="7" name="テキスト ボックス 6">
+                <a:extLst>
+                  <a:ext uri="{FF2B5EF4-FFF2-40B4-BE49-F238E27FC236}">
+                    <a16:creationId xmlns:a16="http://schemas.microsoft.com/office/drawing/2014/main" id="{94C8C92C-90E1-4636-8E0E-7909F154D25B}"/>
+                  </a:ext>
+                </a:extLst>
+              </p:cNvPr>
+              <p:cNvSpPr txBox="1">
+                <a:spLocks noRot="1" noChangeAspect="1" noMove="1" noResize="1" noEditPoints="1" noAdjustHandles="1" noChangeArrowheads="1" noChangeShapeType="1" noTextEdit="1"/>
+              </p:cNvSpPr>
+              <p:nvPr/>
+            </p:nvSpPr>
+            <p:spPr>
+              <a:xfrm>
+                <a:off x="1152861" y="2232366"/>
+                <a:ext cx="536365" cy="369332"/>
+              </a:xfrm>
+              <a:prstGeom prst="rect">
+                <a:avLst/>
+              </a:prstGeom>
+              <a:blipFill>
+                <a:blip r:embed="rId4"/>
+                <a:stretch>
+                  <a:fillRect/>
+                </a:stretch>
+              </a:blipFill>
+            </p:spPr>
+            <p:txBody>
+              <a:bodyPr/>
+              <a:lstStyle/>
+              <a:p>
+                <a:r>
+                  <a:rPr lang="ja-JP" altLang="en-US">
+                    <a:noFill/>
+                  </a:rPr>
+                  <a:t> </a:t>
+                </a:r>
+              </a:p>
+            </p:txBody>
+          </p:sp>
+        </mc:Fallback>
+      </mc:AlternateContent>
+      <mc:AlternateContent xmlns:mc="http://schemas.openxmlformats.org/markup-compatibility/2006">
+        <mc:Choice xmlns:a14="http://schemas.microsoft.com/office/drawing/2010/main" Requires="a14">
+          <p:sp>
+            <p:nvSpPr>
+              <p:cNvPr id="8" name="テキスト ボックス 7">
+                <a:extLst>
+                  <a:ext uri="{FF2B5EF4-FFF2-40B4-BE49-F238E27FC236}">
+                    <a16:creationId xmlns:a16="http://schemas.microsoft.com/office/drawing/2014/main" id="{E9CD74A9-B57F-446D-B55B-C5A986ADC238}"/>
+                  </a:ext>
+                </a:extLst>
+              </p:cNvPr>
+              <p:cNvSpPr txBox="1"/>
+              <p:nvPr/>
+            </p:nvSpPr>
+            <p:spPr>
+              <a:xfrm>
+                <a:off x="1088974" y="3032835"/>
+                <a:ext cx="649344" cy="369332"/>
+              </a:xfrm>
+              <a:prstGeom prst="rect">
+                <a:avLst/>
+              </a:prstGeom>
+              <a:noFill/>
+            </p:spPr>
+            <p:txBody>
+              <a:bodyPr wrap="none" rtlCol="0">
+                <a:spAutoFit/>
+              </a:bodyPr>
+              <a:lstStyle/>
+              <a:p>
+                <a:pPr algn="ctr"/>
+                <a14:m>
+                  <m:oMathPara xmlns:m="http://schemas.openxmlformats.org/officeDocument/2006/math">
+                    <m:oMathParaPr>
+                      <m:jc m:val="centerGroup"/>
+                    </m:oMathParaPr>
+                    <m:oMath xmlns:m="http://schemas.openxmlformats.org/officeDocument/2006/math">
+                      <m:r>
+                        <a:rPr kumimoji="1" lang="en-US" altLang="ja-JP" b="0" i="1" smtClean="0">
+                          <a:latin typeface="Cambria Math" panose="02040503050406030204" pitchFamily="18" charset="0"/>
+                        </a:rPr>
+                        <m:t>𝐶</m:t>
+                      </m:r>
+                      <m:sSup>
+                        <m:sSupPr>
+                          <m:ctrlPr>
+                            <a:rPr kumimoji="1" lang="en-US" altLang="ja-JP" b="0" i="1" smtClean="0">
+                              <a:latin typeface="Cambria Math" panose="02040503050406030204" pitchFamily="18" charset="0"/>
+                            </a:rPr>
+                          </m:ctrlPr>
+                        </m:sSupPr>
+                        <m:e>
+                          <m:r>
+                            <a:rPr kumimoji="1" lang="en-US" altLang="ja-JP" b="0" i="1" smtClean="0">
+                              <a:latin typeface="Cambria Math" panose="02040503050406030204" pitchFamily="18" charset="0"/>
+                            </a:rPr>
+                            <m:t>𝐴</m:t>
+                          </m:r>
+                        </m:e>
+                        <m:sup>
+                          <m:r>
+                            <a:rPr kumimoji="1" lang="en-US" altLang="ja-JP" b="0" i="1" smtClean="0">
+                              <a:latin typeface="Cambria Math" panose="02040503050406030204" pitchFamily="18" charset="0"/>
+                            </a:rPr>
+                            <m:t>2</m:t>
+                          </m:r>
+                        </m:sup>
+                      </m:sSup>
+                    </m:oMath>
+                  </m:oMathPara>
+                </a14:m>
+                <a:endParaRPr kumimoji="1" lang="ja-JP" altLang="en-US" dirty="0"/>
+              </a:p>
+            </p:txBody>
+          </p:sp>
+        </mc:Choice>
+        <mc:Fallback>
+          <p:sp>
+            <p:nvSpPr>
+              <p:cNvPr id="8" name="テキスト ボックス 7">
+                <a:extLst>
+                  <a:ext uri="{FF2B5EF4-FFF2-40B4-BE49-F238E27FC236}">
+                    <a16:creationId xmlns:a16="http://schemas.microsoft.com/office/drawing/2014/main" id="{E9CD74A9-B57F-446D-B55B-C5A986ADC238}"/>
+                  </a:ext>
+                </a:extLst>
+              </p:cNvPr>
+              <p:cNvSpPr txBox="1">
+                <a:spLocks noRot="1" noChangeAspect="1" noMove="1" noResize="1" noEditPoints="1" noAdjustHandles="1" noChangeArrowheads="1" noChangeShapeType="1" noTextEdit="1"/>
+              </p:cNvSpPr>
+              <p:nvPr/>
+            </p:nvSpPr>
+            <p:spPr>
+              <a:xfrm>
+                <a:off x="1088974" y="3032835"/>
+                <a:ext cx="649344" cy="369332"/>
+              </a:xfrm>
+              <a:prstGeom prst="rect">
+                <a:avLst/>
+              </a:prstGeom>
+              <a:blipFill>
+                <a:blip r:embed="rId5"/>
+                <a:stretch>
+                  <a:fillRect/>
+                </a:stretch>
+              </a:blipFill>
+            </p:spPr>
+            <p:txBody>
+              <a:bodyPr/>
+              <a:lstStyle/>
+              <a:p>
+                <a:r>
+                  <a:rPr lang="ja-JP" altLang="en-US">
+                    <a:noFill/>
+                  </a:rPr>
+                  <a:t> </a:t>
+                </a:r>
+              </a:p>
+            </p:txBody>
+          </p:sp>
+        </mc:Fallback>
+      </mc:AlternateContent>
+    </p:spTree>
+    <p:extLst>
+      <p:ext uri="{BB962C8B-B14F-4D97-AF65-F5344CB8AC3E}">
+        <p14:creationId xmlns:p14="http://schemas.microsoft.com/office/powerpoint/2010/main" val="461297746"/>
       </p:ext>
     </p:extLst>
   </p:cSld>

</xml_diff>

<commit_message>
add formula converting from state space model to transfer function model.
</commit_message>
<xml_diff>
--- a/materials.pptx
+++ b/materials.pptx
@@ -8,6 +8,7 @@
     <p:sldId id="256" r:id="rId2"/>
     <p:sldId id="257" r:id="rId3"/>
     <p:sldId id="258" r:id="rId4"/>
+    <p:sldId id="259" r:id="rId5"/>
   </p:sldIdLst>
   <p:sldSz cx="12192000" cy="6858000"/>
   <p:notesSz cx="6858000" cy="9144000"/>
@@ -261,7 +262,7 @@
           <a:p>
             <a:fld id="{2FD84066-1B35-4AB8-92BE-780EAC268AC3}" type="datetimeFigureOut">
               <a:rPr kumimoji="1" lang="ja-JP" altLang="en-US" smtClean="0"/>
-              <a:t>2020/4/18</a:t>
+              <a:t>2020/4/26</a:t>
             </a:fld>
             <a:endParaRPr kumimoji="1" lang="ja-JP" altLang="en-US"/>
           </a:p>
@@ -491,7 +492,7 @@
           <a:p>
             <a:fld id="{2FD84066-1B35-4AB8-92BE-780EAC268AC3}" type="datetimeFigureOut">
               <a:rPr kumimoji="1" lang="ja-JP" altLang="en-US" smtClean="0"/>
-              <a:t>2020/4/18</a:t>
+              <a:t>2020/4/26</a:t>
             </a:fld>
             <a:endParaRPr kumimoji="1" lang="ja-JP" altLang="en-US"/>
           </a:p>
@@ -731,7 +732,7 @@
           <a:p>
             <a:fld id="{2FD84066-1B35-4AB8-92BE-780EAC268AC3}" type="datetimeFigureOut">
               <a:rPr kumimoji="1" lang="ja-JP" altLang="en-US" smtClean="0"/>
-              <a:t>2020/4/18</a:t>
+              <a:t>2020/4/26</a:t>
             </a:fld>
             <a:endParaRPr kumimoji="1" lang="ja-JP" altLang="en-US"/>
           </a:p>
@@ -961,7 +962,7 @@
           <a:p>
             <a:fld id="{2FD84066-1B35-4AB8-92BE-780EAC268AC3}" type="datetimeFigureOut">
               <a:rPr kumimoji="1" lang="ja-JP" altLang="en-US" smtClean="0"/>
-              <a:t>2020/4/18</a:t>
+              <a:t>2020/4/26</a:t>
             </a:fld>
             <a:endParaRPr kumimoji="1" lang="ja-JP" altLang="en-US"/>
           </a:p>
@@ -1236,7 +1237,7 @@
           <a:p>
             <a:fld id="{2FD84066-1B35-4AB8-92BE-780EAC268AC3}" type="datetimeFigureOut">
               <a:rPr kumimoji="1" lang="ja-JP" altLang="en-US" smtClean="0"/>
-              <a:t>2020/4/18</a:t>
+              <a:t>2020/4/26</a:t>
             </a:fld>
             <a:endParaRPr kumimoji="1" lang="ja-JP" altLang="en-US"/>
           </a:p>
@@ -1565,7 +1566,7 @@
           <a:p>
             <a:fld id="{2FD84066-1B35-4AB8-92BE-780EAC268AC3}" type="datetimeFigureOut">
               <a:rPr kumimoji="1" lang="ja-JP" altLang="en-US" smtClean="0"/>
-              <a:t>2020/4/18</a:t>
+              <a:t>2020/4/26</a:t>
             </a:fld>
             <a:endParaRPr kumimoji="1" lang="ja-JP" altLang="en-US"/>
           </a:p>
@@ -2041,7 +2042,7 @@
           <a:p>
             <a:fld id="{2FD84066-1B35-4AB8-92BE-780EAC268AC3}" type="datetimeFigureOut">
               <a:rPr kumimoji="1" lang="ja-JP" altLang="en-US" smtClean="0"/>
-              <a:t>2020/4/18</a:t>
+              <a:t>2020/4/26</a:t>
             </a:fld>
             <a:endParaRPr kumimoji="1" lang="ja-JP" altLang="en-US"/>
           </a:p>
@@ -2182,7 +2183,7 @@
           <a:p>
             <a:fld id="{2FD84066-1B35-4AB8-92BE-780EAC268AC3}" type="datetimeFigureOut">
               <a:rPr kumimoji="1" lang="ja-JP" altLang="en-US" smtClean="0"/>
-              <a:t>2020/4/18</a:t>
+              <a:t>2020/4/26</a:t>
             </a:fld>
             <a:endParaRPr kumimoji="1" lang="ja-JP" altLang="en-US"/>
           </a:p>
@@ -2295,7 +2296,7 @@
           <a:p>
             <a:fld id="{2FD84066-1B35-4AB8-92BE-780EAC268AC3}" type="datetimeFigureOut">
               <a:rPr kumimoji="1" lang="ja-JP" altLang="en-US" smtClean="0"/>
-              <a:t>2020/4/18</a:t>
+              <a:t>2020/4/26</a:t>
             </a:fld>
             <a:endParaRPr kumimoji="1" lang="ja-JP" altLang="en-US"/>
           </a:p>
@@ -2638,7 +2639,7 @@
           <a:p>
             <a:fld id="{2FD84066-1B35-4AB8-92BE-780EAC268AC3}" type="datetimeFigureOut">
               <a:rPr kumimoji="1" lang="ja-JP" altLang="en-US" smtClean="0"/>
-              <a:t>2020/4/18</a:t>
+              <a:t>2020/4/26</a:t>
             </a:fld>
             <a:endParaRPr kumimoji="1" lang="ja-JP" altLang="en-US"/>
           </a:p>
@@ -2926,7 +2927,7 @@
           <a:p>
             <a:fld id="{2FD84066-1B35-4AB8-92BE-780EAC268AC3}" type="datetimeFigureOut">
               <a:rPr kumimoji="1" lang="ja-JP" altLang="en-US" smtClean="0"/>
-              <a:t>2020/4/18</a:t>
+              <a:t>2020/4/26</a:t>
             </a:fld>
             <a:endParaRPr kumimoji="1" lang="ja-JP" altLang="en-US"/>
           </a:p>
@@ -3199,7 +3200,7 @@
           <a:p>
             <a:fld id="{2FD84066-1B35-4AB8-92BE-780EAC268AC3}" type="datetimeFigureOut">
               <a:rPr kumimoji="1" lang="ja-JP" altLang="en-US" smtClean="0"/>
-              <a:t>2020/4/18</a:t>
+              <a:t>2020/4/26</a:t>
             </a:fld>
             <a:endParaRPr kumimoji="1" lang="ja-JP" altLang="en-US"/>
           </a:p>
@@ -7626,8 +7627,8 @@
           <a:chExt cx="0" cy="0"/>
         </a:xfrm>
       </p:grpSpPr>
-      <mc:AlternateContent xmlns:mc="http://schemas.openxmlformats.org/markup-compatibility/2006">
-        <mc:Choice xmlns:a14="http://schemas.microsoft.com/office/drawing/2010/main" Requires="a14">
+      <mc:AlternateContent xmlns:mc="http://schemas.openxmlformats.org/markup-compatibility/2006" xmlns:a14="http://schemas.microsoft.com/office/drawing/2010/main">
+        <mc:Choice Requires="a14">
           <p:sp>
             <p:nvSpPr>
               <p:cNvPr id="2" name="テキスト ボックス 1">
@@ -7858,7 +7859,13 @@
                                   <a:rPr kumimoji="1" lang="en-US" altLang="ja-JP" b="0" i="1" smtClean="0">
                                     <a:latin typeface="Cambria Math" panose="02040503050406030204" pitchFamily="18" charset="0"/>
                                   </a:rPr>
-                                  <m:t>0.05</m:t>
+                                  <m:t>0</m:t>
+                                </m:r>
+                                <m:r>
+                                  <a:rPr kumimoji="1" lang="en-US" altLang="ja-JP" b="0" i="1" smtClean="0">
+                                    <a:latin typeface="Cambria Math" panose="02040503050406030204" pitchFamily="18" charset="0"/>
+                                  </a:rPr>
+                                  <m:t>.05</m:t>
                                 </m:r>
                               </m:e>
                               <m:e>
@@ -7945,7 +7952,7 @@
             </p:txBody>
           </p:sp>
         </mc:Choice>
-        <mc:Fallback>
+        <mc:Fallback xmlns="">
           <p:sp>
             <p:nvSpPr>
               <p:cNvPr id="2" name="テキスト ボックス 1">
@@ -8168,8 +8175,8 @@
           </a:p>
         </p:txBody>
       </p:sp>
-      <mc:AlternateContent xmlns:mc="http://schemas.openxmlformats.org/markup-compatibility/2006">
-        <mc:Choice xmlns:a14="http://schemas.microsoft.com/office/drawing/2010/main" Requires="a14">
+      <mc:AlternateContent xmlns:mc="http://schemas.openxmlformats.org/markup-compatibility/2006" xmlns:a14="http://schemas.microsoft.com/office/drawing/2010/main">
+        <mc:Choice Requires="a14">
           <p:sp>
             <p:nvSpPr>
               <p:cNvPr id="7" name="正方形/長方形 6">
@@ -8405,7 +8412,7 @@
             </p:txBody>
           </p:sp>
         </mc:Choice>
-        <mc:Fallback>
+        <mc:Fallback xmlns="">
           <p:sp>
             <p:nvSpPr>
               <p:cNvPr id="7" name="正方形/長方形 6">
@@ -8628,8 +8635,8 @@
           </a:p>
         </p:txBody>
       </p:sp>
-      <mc:AlternateContent xmlns:mc="http://schemas.openxmlformats.org/markup-compatibility/2006">
-        <mc:Choice xmlns:a14="http://schemas.microsoft.com/office/drawing/2010/main" Requires="a14">
+      <mc:AlternateContent xmlns:mc="http://schemas.openxmlformats.org/markup-compatibility/2006" xmlns:a14="http://schemas.microsoft.com/office/drawing/2010/main">
+        <mc:Choice Requires="a14">
           <p:sp>
             <p:nvSpPr>
               <p:cNvPr id="12" name="テキスト ボックス 11">
@@ -8782,7 +8789,7 @@
             </p:txBody>
           </p:sp>
         </mc:Choice>
-        <mc:Fallback>
+        <mc:Fallback xmlns="">
           <p:sp>
             <p:nvSpPr>
               <p:cNvPr id="12" name="テキスト ボックス 11">
@@ -8827,8 +8834,8 @@
           </p:sp>
         </mc:Fallback>
       </mc:AlternateContent>
-      <mc:AlternateContent xmlns:mc="http://schemas.openxmlformats.org/markup-compatibility/2006">
-        <mc:Choice xmlns:a14="http://schemas.microsoft.com/office/drawing/2010/main" Requires="a14">
+      <mc:AlternateContent xmlns:mc="http://schemas.openxmlformats.org/markup-compatibility/2006" xmlns:a14="http://schemas.microsoft.com/office/drawing/2010/main">
+        <mc:Choice Requires="a14">
           <p:sp>
             <p:nvSpPr>
               <p:cNvPr id="13" name="テキスト ボックス 12">
@@ -8938,7 +8945,7 @@
             </p:txBody>
           </p:sp>
         </mc:Choice>
-        <mc:Fallback>
+        <mc:Fallback xmlns="">
           <p:sp>
             <p:nvSpPr>
               <p:cNvPr id="13" name="テキスト ボックス 12">
@@ -9169,8 +9176,8 @@
           </a:p>
         </p:txBody>
       </p:sp>
-      <mc:AlternateContent xmlns:mc="http://schemas.openxmlformats.org/markup-compatibility/2006">
-        <mc:Choice xmlns:a14="http://schemas.microsoft.com/office/drawing/2010/main" Requires="a14">
+      <mc:AlternateContent xmlns:mc="http://schemas.openxmlformats.org/markup-compatibility/2006" xmlns:a14="http://schemas.microsoft.com/office/drawing/2010/main">
+        <mc:Choice Requires="a14">
           <p:sp>
             <p:nvSpPr>
               <p:cNvPr id="18" name="テキスト ボックス 17">
@@ -9220,7 +9227,7 @@
             </p:txBody>
           </p:sp>
         </mc:Choice>
-        <mc:Fallback>
+        <mc:Fallback xmlns="">
           <p:sp>
             <p:nvSpPr>
               <p:cNvPr id="18" name="テキスト ボックス 17">
@@ -9265,8 +9272,8 @@
           </p:sp>
         </mc:Fallback>
       </mc:AlternateContent>
-      <mc:AlternateContent xmlns:mc="http://schemas.openxmlformats.org/markup-compatibility/2006">
-        <mc:Choice xmlns:a14="http://schemas.microsoft.com/office/drawing/2010/main" Requires="a14">
+      <mc:AlternateContent xmlns:mc="http://schemas.openxmlformats.org/markup-compatibility/2006" xmlns:a14="http://schemas.microsoft.com/office/drawing/2010/main">
+        <mc:Choice Requires="a14">
           <p:sp>
             <p:nvSpPr>
               <p:cNvPr id="19" name="テキスト ボックス 18">
@@ -9316,7 +9323,7 @@
             </p:txBody>
           </p:sp>
         </mc:Choice>
-        <mc:Fallback>
+        <mc:Fallback xmlns="">
           <p:sp>
             <p:nvSpPr>
               <p:cNvPr id="19" name="テキスト ボックス 18">
@@ -9361,8 +9368,8 @@
           </p:sp>
         </mc:Fallback>
       </mc:AlternateContent>
-      <mc:AlternateContent xmlns:mc="http://schemas.openxmlformats.org/markup-compatibility/2006">
-        <mc:Choice xmlns:a14="http://schemas.microsoft.com/office/drawing/2010/main" Requires="a14">
+      <mc:AlternateContent xmlns:mc="http://schemas.openxmlformats.org/markup-compatibility/2006" xmlns:a14="http://schemas.microsoft.com/office/drawing/2010/main">
+        <mc:Choice Requires="a14">
           <p:sp>
             <p:nvSpPr>
               <p:cNvPr id="20" name="テキスト ボックス 19">
@@ -9437,7 +9444,7 @@
             </p:txBody>
           </p:sp>
         </mc:Choice>
-        <mc:Fallback>
+        <mc:Fallback xmlns="">
           <p:sp>
             <p:nvSpPr>
               <p:cNvPr id="20" name="テキスト ボックス 19">
@@ -9482,8 +9489,8 @@
           </p:sp>
         </mc:Fallback>
       </mc:AlternateContent>
-      <mc:AlternateContent xmlns:mc="http://schemas.openxmlformats.org/markup-compatibility/2006">
-        <mc:Choice xmlns:a14="http://schemas.microsoft.com/office/drawing/2010/main" Requires="a14">
+      <mc:AlternateContent xmlns:mc="http://schemas.openxmlformats.org/markup-compatibility/2006" xmlns:a14="http://schemas.microsoft.com/office/drawing/2010/main">
+        <mc:Choice Requires="a14">
           <p:sp>
             <p:nvSpPr>
               <p:cNvPr id="21" name="テキスト ボックス 20">
@@ -9787,7 +9794,7 @@
             </p:txBody>
           </p:sp>
         </mc:Choice>
-        <mc:Fallback>
+        <mc:Fallback xmlns="">
           <p:sp>
             <p:nvSpPr>
               <p:cNvPr id="21" name="テキスト ボックス 20">
@@ -9832,8 +9839,8 @@
           </p:sp>
         </mc:Fallback>
       </mc:AlternateContent>
-      <mc:AlternateContent xmlns:mc="http://schemas.openxmlformats.org/markup-compatibility/2006">
-        <mc:Choice xmlns:a14="http://schemas.microsoft.com/office/drawing/2010/main" Requires="a14">
+      <mc:AlternateContent xmlns:mc="http://schemas.openxmlformats.org/markup-compatibility/2006" xmlns:a14="http://schemas.microsoft.com/office/drawing/2010/main">
+        <mc:Choice Requires="a14">
           <p:sp>
             <p:nvSpPr>
               <p:cNvPr id="22" name="テキスト ボックス 21">
@@ -9960,7 +9967,7 @@
             </p:txBody>
           </p:sp>
         </mc:Choice>
-        <mc:Fallback>
+        <mc:Fallback xmlns="">
           <p:sp>
             <p:nvSpPr>
               <p:cNvPr id="22" name="テキスト ボックス 21">
@@ -10117,8 +10124,8 @@
           </a:p>
         </p:txBody>
       </p:sp>
-      <mc:AlternateContent xmlns:mc="http://schemas.openxmlformats.org/markup-compatibility/2006">
-        <mc:Choice xmlns:a14="http://schemas.microsoft.com/office/drawing/2010/main" Requires="a14">
+      <mc:AlternateContent xmlns:mc="http://schemas.openxmlformats.org/markup-compatibility/2006" xmlns:a14="http://schemas.microsoft.com/office/drawing/2010/main">
+        <mc:Choice Requires="a14">
           <p:sp>
             <p:nvSpPr>
               <p:cNvPr id="4" name="テキスト ボックス 3">
@@ -10168,7 +10175,7 @@
             </p:txBody>
           </p:sp>
         </mc:Choice>
-        <mc:Fallback>
+        <mc:Fallback xmlns="">
           <p:sp>
             <p:nvSpPr>
               <p:cNvPr id="4" name="テキスト ボックス 3">
@@ -10317,8 +10324,8 @@
           </a:p>
         </p:txBody>
       </p:sp>
-      <mc:AlternateContent xmlns:mc="http://schemas.openxmlformats.org/markup-compatibility/2006">
-        <mc:Choice xmlns:a14="http://schemas.microsoft.com/office/drawing/2010/main" Requires="a14">
+      <mc:AlternateContent xmlns:mc="http://schemas.openxmlformats.org/markup-compatibility/2006" xmlns:a14="http://schemas.microsoft.com/office/drawing/2010/main">
+        <mc:Choice Requires="a14">
           <p:sp>
             <p:nvSpPr>
               <p:cNvPr id="7" name="テキスト ボックス 6">
@@ -10368,7 +10375,7 @@
             </p:txBody>
           </p:sp>
         </mc:Choice>
-        <mc:Fallback>
+        <mc:Fallback xmlns="">
           <p:sp>
             <p:nvSpPr>
               <p:cNvPr id="7" name="テキスト ボックス 6">
@@ -10413,8 +10420,8 @@
           </p:sp>
         </mc:Fallback>
       </mc:AlternateContent>
-      <mc:AlternateContent xmlns:mc="http://schemas.openxmlformats.org/markup-compatibility/2006">
-        <mc:Choice xmlns:a14="http://schemas.microsoft.com/office/drawing/2010/main" Requires="a14">
+      <mc:AlternateContent xmlns:mc="http://schemas.openxmlformats.org/markup-compatibility/2006" xmlns:a14="http://schemas.microsoft.com/office/drawing/2010/main">
+        <mc:Choice Requires="a14">
           <p:sp>
             <p:nvSpPr>
               <p:cNvPr id="8" name="テキスト ボックス 7">
@@ -10489,7 +10496,7 @@
             </p:txBody>
           </p:sp>
         </mc:Choice>
-        <mc:Fallback>
+        <mc:Fallback xmlns="">
           <p:sp>
             <p:nvSpPr>
               <p:cNvPr id="8" name="テキスト ボックス 7">
@@ -10534,10 +10541,2254 @@
           </p:sp>
         </mc:Fallback>
       </mc:AlternateContent>
+      <mc:AlternateContent xmlns:mc="http://schemas.openxmlformats.org/markup-compatibility/2006">
+        <mc:Choice xmlns:a14="http://schemas.microsoft.com/office/drawing/2010/main" Requires="a14">
+          <p:sp>
+            <p:nvSpPr>
+              <p:cNvPr id="9" name="テキスト ボックス 8">
+                <a:extLst>
+                  <a:ext uri="{FF2B5EF4-FFF2-40B4-BE49-F238E27FC236}">
+                    <a16:creationId xmlns:a16="http://schemas.microsoft.com/office/drawing/2014/main" id="{69D568AD-0A5D-4F7F-824E-F7C524BCEB1A}"/>
+                  </a:ext>
+                </a:extLst>
+              </p:cNvPr>
+              <p:cNvSpPr txBox="1"/>
+              <p:nvPr/>
+            </p:nvSpPr>
+            <p:spPr>
+              <a:xfrm>
+                <a:off x="5678648" y="260826"/>
+                <a:ext cx="6263188" cy="5544018"/>
+              </a:xfrm>
+              <a:prstGeom prst="rect">
+                <a:avLst/>
+              </a:prstGeom>
+              <a:noFill/>
+            </p:spPr>
+            <p:txBody>
+              <a:bodyPr wrap="none" rtlCol="0">
+                <a:spAutoFit/>
+              </a:bodyPr>
+              <a:lstStyle/>
+              <a:p>
+                <a:pPr algn="ctr"/>
+                <a14:m>
+                  <m:oMathPara xmlns:m="http://schemas.openxmlformats.org/officeDocument/2006/math">
+                    <m:oMathParaPr>
+                      <m:jc m:val="centerGroup"/>
+                    </m:oMathParaPr>
+                    <m:oMath xmlns:m="http://schemas.openxmlformats.org/officeDocument/2006/math">
+                      <m:r>
+                        <a:rPr kumimoji="1" lang="en-US" altLang="ja-JP" b="0" i="1" smtClean="0">
+                          <a:latin typeface="Cambria Math" panose="02040503050406030204" pitchFamily="18" charset="0"/>
+                        </a:rPr>
+                        <m:t>𝐺</m:t>
+                      </m:r>
+                      <m:d>
+                        <m:dPr>
+                          <m:ctrlPr>
+                            <a:rPr kumimoji="1" lang="en-US" altLang="ja-JP" b="0" i="1" smtClean="0">
+                              <a:latin typeface="Cambria Math" panose="02040503050406030204" pitchFamily="18" charset="0"/>
+                            </a:rPr>
+                          </m:ctrlPr>
+                        </m:dPr>
+                        <m:e>
+                          <m:r>
+                            <a:rPr kumimoji="1" lang="en-US" altLang="ja-JP" b="0" i="1" smtClean="0">
+                              <a:latin typeface="Cambria Math" panose="02040503050406030204" pitchFamily="18" charset="0"/>
+                            </a:rPr>
+                            <m:t>𝑠</m:t>
+                          </m:r>
+                        </m:e>
+                      </m:d>
+                      <m:r>
+                        <a:rPr kumimoji="1" lang="en-US" altLang="ja-JP" b="0" i="1" smtClean="0">
+                          <a:latin typeface="Cambria Math" panose="02040503050406030204" pitchFamily="18" charset="0"/>
+                        </a:rPr>
+                        <m:t>=</m:t>
+                      </m:r>
+                      <m:f>
+                        <m:fPr>
+                          <m:ctrlPr>
+                            <a:rPr kumimoji="1" lang="en-US" altLang="ja-JP" b="0" i="1" smtClean="0">
+                              <a:latin typeface="Cambria Math" panose="02040503050406030204" pitchFamily="18" charset="0"/>
+                            </a:rPr>
+                          </m:ctrlPr>
+                        </m:fPr>
+                        <m:num>
+                          <m:r>
+                            <a:rPr kumimoji="1" lang="en-US" altLang="ja-JP" b="0" i="1" smtClean="0">
+                              <a:latin typeface="Cambria Math" panose="02040503050406030204" pitchFamily="18" charset="0"/>
+                            </a:rPr>
+                            <m:t>𝑌</m:t>
+                          </m:r>
+                          <m:r>
+                            <a:rPr kumimoji="1" lang="en-US" altLang="ja-JP" b="0" i="1" smtClean="0">
+                              <a:latin typeface="Cambria Math" panose="02040503050406030204" pitchFamily="18" charset="0"/>
+                            </a:rPr>
+                            <m:t>(</m:t>
+                          </m:r>
+                          <m:r>
+                            <a:rPr kumimoji="1" lang="en-US" altLang="ja-JP" b="0" i="1" smtClean="0">
+                              <a:latin typeface="Cambria Math" panose="02040503050406030204" pitchFamily="18" charset="0"/>
+                            </a:rPr>
+                            <m:t>𝑠</m:t>
+                          </m:r>
+                          <m:r>
+                            <a:rPr kumimoji="1" lang="en-US" altLang="ja-JP" b="0" i="1" smtClean="0">
+                              <a:latin typeface="Cambria Math" panose="02040503050406030204" pitchFamily="18" charset="0"/>
+                            </a:rPr>
+                            <m:t>)</m:t>
+                          </m:r>
+                        </m:num>
+                        <m:den>
+                          <m:r>
+                            <a:rPr kumimoji="1" lang="en-US" altLang="ja-JP" b="0" i="1" smtClean="0">
+                              <a:latin typeface="Cambria Math" panose="02040503050406030204" pitchFamily="18" charset="0"/>
+                            </a:rPr>
+                            <m:t>𝑈</m:t>
+                          </m:r>
+                          <m:r>
+                            <a:rPr kumimoji="1" lang="en-US" altLang="ja-JP" b="0" i="1" smtClean="0">
+                              <a:latin typeface="Cambria Math" panose="02040503050406030204" pitchFamily="18" charset="0"/>
+                            </a:rPr>
+                            <m:t>(</m:t>
+                          </m:r>
+                          <m:r>
+                            <a:rPr kumimoji="1" lang="en-US" altLang="ja-JP" b="0" i="1" smtClean="0">
+                              <a:latin typeface="Cambria Math" panose="02040503050406030204" pitchFamily="18" charset="0"/>
+                            </a:rPr>
+                            <m:t>𝑠</m:t>
+                          </m:r>
+                          <m:r>
+                            <a:rPr kumimoji="1" lang="en-US" altLang="ja-JP" b="0" i="1" smtClean="0">
+                              <a:latin typeface="Cambria Math" panose="02040503050406030204" pitchFamily="18" charset="0"/>
+                            </a:rPr>
+                            <m:t>)</m:t>
+                          </m:r>
+                        </m:den>
+                      </m:f>
+                      <m:r>
+                        <a:rPr kumimoji="1" lang="en-US" altLang="ja-JP" b="0" i="1" smtClean="0">
+                          <a:latin typeface="Cambria Math" panose="02040503050406030204" pitchFamily="18" charset="0"/>
+                        </a:rPr>
+                        <m:t>=</m:t>
+                      </m:r>
+                      <m:sSup>
+                        <m:sSupPr>
+                          <m:ctrlPr>
+                            <a:rPr kumimoji="1" lang="en-US" altLang="ja-JP" b="0" i="1" smtClean="0">
+                              <a:latin typeface="Cambria Math" panose="02040503050406030204" pitchFamily="18" charset="0"/>
+                            </a:rPr>
+                          </m:ctrlPr>
+                        </m:sSupPr>
+                        <m:e>
+                          <m:r>
+                            <a:rPr kumimoji="1" lang="en-US" altLang="ja-JP" b="0" i="1" smtClean="0">
+                              <a:latin typeface="Cambria Math" panose="02040503050406030204" pitchFamily="18" charset="0"/>
+                            </a:rPr>
+                            <m:t>𝐶</m:t>
+                          </m:r>
+                          <m:r>
+                            <a:rPr kumimoji="1" lang="en-US" altLang="ja-JP" b="0" i="1" smtClean="0">
+                              <a:latin typeface="Cambria Math" panose="02040503050406030204" pitchFamily="18" charset="0"/>
+                            </a:rPr>
+                            <m:t>(</m:t>
+                          </m:r>
+                          <m:r>
+                            <a:rPr kumimoji="1" lang="en-US" altLang="ja-JP" b="0" i="1" smtClean="0">
+                              <a:latin typeface="Cambria Math" panose="02040503050406030204" pitchFamily="18" charset="0"/>
+                            </a:rPr>
+                            <m:t>𝑠𝐼</m:t>
+                          </m:r>
+                          <m:r>
+                            <a:rPr kumimoji="1" lang="en-US" altLang="ja-JP" b="0" i="1" smtClean="0">
+                              <a:latin typeface="Cambria Math" panose="02040503050406030204" pitchFamily="18" charset="0"/>
+                            </a:rPr>
+                            <m:t>−</m:t>
+                          </m:r>
+                          <m:r>
+                            <a:rPr kumimoji="1" lang="en-US" altLang="ja-JP" b="0" i="1" smtClean="0">
+                              <a:latin typeface="Cambria Math" panose="02040503050406030204" pitchFamily="18" charset="0"/>
+                            </a:rPr>
+                            <m:t>𝐴</m:t>
+                          </m:r>
+                          <m:r>
+                            <a:rPr kumimoji="1" lang="en-US" altLang="ja-JP" b="0" i="1" smtClean="0">
+                              <a:latin typeface="Cambria Math" panose="02040503050406030204" pitchFamily="18" charset="0"/>
+                            </a:rPr>
+                            <m:t>)</m:t>
+                          </m:r>
+                        </m:e>
+                        <m:sup>
+                          <m:r>
+                            <a:rPr kumimoji="1" lang="en-US" altLang="ja-JP" b="0" i="1" smtClean="0">
+                              <a:latin typeface="Cambria Math" panose="02040503050406030204" pitchFamily="18" charset="0"/>
+                            </a:rPr>
+                            <m:t>−1</m:t>
+                          </m:r>
+                        </m:sup>
+                      </m:sSup>
+                      <m:r>
+                        <a:rPr kumimoji="1" lang="en-US" altLang="ja-JP" b="0" i="1" smtClean="0">
+                          <a:latin typeface="Cambria Math" panose="02040503050406030204" pitchFamily="18" charset="0"/>
+                        </a:rPr>
+                        <m:t>𝐵</m:t>
+                      </m:r>
+                      <m:r>
+                        <a:rPr kumimoji="1" lang="en-US" altLang="ja-JP" b="0" i="1" smtClean="0">
+                          <a:latin typeface="Cambria Math" panose="02040503050406030204" pitchFamily="18" charset="0"/>
+                        </a:rPr>
+                        <m:t>+</m:t>
+                      </m:r>
+                      <m:r>
+                        <a:rPr kumimoji="1" lang="en-US" altLang="ja-JP" b="0" i="1" smtClean="0">
+                          <a:latin typeface="Cambria Math" panose="02040503050406030204" pitchFamily="18" charset="0"/>
+                        </a:rPr>
+                        <m:t>𝐷</m:t>
+                      </m:r>
+                    </m:oMath>
+                  </m:oMathPara>
+                </a14:m>
+                <a:endParaRPr kumimoji="1" lang="en-US" altLang="ja-JP" b="0" i="1" dirty="0">
+                  <a:latin typeface="Cambria Math" panose="02040503050406030204" pitchFamily="18" charset="0"/>
+                </a:endParaRPr>
+              </a:p>
+              <a:p>
+                <a:pPr algn="ctr"/>
+                <a14:m>
+                  <m:oMathPara xmlns:m="http://schemas.openxmlformats.org/officeDocument/2006/math">
+                    <m:oMathParaPr>
+                      <m:jc m:val="centerGroup"/>
+                    </m:oMathParaPr>
+                    <m:oMath xmlns:m="http://schemas.openxmlformats.org/officeDocument/2006/math">
+                      <m:r>
+                        <a:rPr kumimoji="1" lang="en-US" altLang="ja-JP" b="0" i="1" smtClean="0">
+                          <a:latin typeface="Cambria Math" panose="02040503050406030204" pitchFamily="18" charset="0"/>
+                        </a:rPr>
+                        <m:t>=</m:t>
+                      </m:r>
+                      <m:d>
+                        <m:dPr>
+                          <m:begChr m:val="["/>
+                          <m:endChr m:val="]"/>
+                          <m:ctrlPr>
+                            <a:rPr kumimoji="1" lang="en-US" altLang="ja-JP" b="0" i="1" smtClean="0">
+                              <a:latin typeface="Cambria Math" panose="02040503050406030204" pitchFamily="18" charset="0"/>
+                            </a:rPr>
+                          </m:ctrlPr>
+                        </m:dPr>
+                        <m:e>
+                          <m:m>
+                            <m:mPr>
+                              <m:plcHide m:val="on"/>
+                              <m:mcs>
+                                <m:mc>
+                                  <m:mcPr>
+                                    <m:count m:val="3"/>
+                                    <m:mcJc m:val="center"/>
+                                  </m:mcPr>
+                                </m:mc>
+                              </m:mcs>
+                              <m:ctrlPr>
+                                <a:rPr kumimoji="1" lang="en-US" altLang="ja-JP" b="0" i="1" smtClean="0">
+                                  <a:latin typeface="Cambria Math" panose="02040503050406030204" pitchFamily="18" charset="0"/>
+                                </a:rPr>
+                              </m:ctrlPr>
+                            </m:mPr>
+                            <m:mr>
+                              <m:e>
+                                <m:r>
+                                  <a:rPr kumimoji="1" lang="en-US" altLang="ja-JP" b="0" i="1" smtClean="0">
+                                    <a:latin typeface="Cambria Math" panose="02040503050406030204" pitchFamily="18" charset="0"/>
+                                  </a:rPr>
+                                  <m:t>1</m:t>
+                                </m:r>
+                              </m:e>
+                              <m:e>
+                                <m:r>
+                                  <a:rPr kumimoji="1" lang="en-US" altLang="ja-JP" b="0" i="1" smtClean="0">
+                                    <a:latin typeface="Cambria Math" panose="02040503050406030204" pitchFamily="18" charset="0"/>
+                                  </a:rPr>
+                                  <m:t>0</m:t>
+                                </m:r>
+                              </m:e>
+                              <m:e>
+                                <m:r>
+                                  <a:rPr kumimoji="1" lang="en-US" altLang="ja-JP" b="0" i="1" smtClean="0">
+                                    <a:latin typeface="Cambria Math" panose="02040503050406030204" pitchFamily="18" charset="0"/>
+                                  </a:rPr>
+                                  <m:t>0</m:t>
+                                </m:r>
+                              </m:e>
+                            </m:mr>
+                            <m:mr>
+                              <m:e>
+                                <m:r>
+                                  <a:rPr kumimoji="1" lang="en-US" altLang="ja-JP" b="0" i="1" smtClean="0">
+                                    <a:latin typeface="Cambria Math" panose="02040503050406030204" pitchFamily="18" charset="0"/>
+                                  </a:rPr>
+                                  <m:t>0</m:t>
+                                </m:r>
+                              </m:e>
+                              <m:e>
+                                <m:r>
+                                  <a:rPr kumimoji="1" lang="en-US" altLang="ja-JP" b="0" i="1" smtClean="0">
+                                    <a:latin typeface="Cambria Math" panose="02040503050406030204" pitchFamily="18" charset="0"/>
+                                  </a:rPr>
+                                  <m:t>1</m:t>
+                                </m:r>
+                              </m:e>
+                              <m:e>
+                                <m:r>
+                                  <a:rPr kumimoji="1" lang="en-US" altLang="ja-JP" b="0" i="1" smtClean="0">
+                                    <a:latin typeface="Cambria Math" panose="02040503050406030204" pitchFamily="18" charset="0"/>
+                                  </a:rPr>
+                                  <m:t>0</m:t>
+                                </m:r>
+                              </m:e>
+                            </m:mr>
+                            <m:mr>
+                              <m:e>
+                                <m:r>
+                                  <a:rPr kumimoji="1" lang="en-US" altLang="ja-JP" b="0" i="1" smtClean="0">
+                                    <a:latin typeface="Cambria Math" panose="02040503050406030204" pitchFamily="18" charset="0"/>
+                                  </a:rPr>
+                                  <m:t>0</m:t>
+                                </m:r>
+                              </m:e>
+                              <m:e>
+                                <m:r>
+                                  <a:rPr kumimoji="1" lang="en-US" altLang="ja-JP" b="0" i="1" smtClean="0">
+                                    <a:latin typeface="Cambria Math" panose="02040503050406030204" pitchFamily="18" charset="0"/>
+                                  </a:rPr>
+                                  <m:t>0</m:t>
+                                </m:r>
+                              </m:e>
+                              <m:e>
+                                <m:r>
+                                  <a:rPr kumimoji="1" lang="en-US" altLang="ja-JP" b="0" i="1" smtClean="0">
+                                    <a:latin typeface="Cambria Math" panose="02040503050406030204" pitchFamily="18" charset="0"/>
+                                  </a:rPr>
+                                  <m:t>1</m:t>
+                                </m:r>
+                              </m:e>
+                            </m:mr>
+                          </m:m>
+                        </m:e>
+                      </m:d>
+                      <m:sSup>
+                        <m:sSupPr>
+                          <m:ctrlPr>
+                            <a:rPr kumimoji="1" lang="en-US" altLang="ja-JP" b="0" i="1" smtClean="0">
+                              <a:latin typeface="Cambria Math" panose="02040503050406030204" pitchFamily="18" charset="0"/>
+                            </a:rPr>
+                          </m:ctrlPr>
+                        </m:sSupPr>
+                        <m:e>
+                          <m:d>
+                            <m:dPr>
+                              <m:ctrlPr>
+                                <a:rPr kumimoji="1" lang="en-US" altLang="ja-JP" b="0" i="1" smtClean="0">
+                                  <a:latin typeface="Cambria Math" panose="02040503050406030204" pitchFamily="18" charset="0"/>
+                                </a:rPr>
+                              </m:ctrlPr>
+                            </m:dPr>
+                            <m:e>
+                              <m:r>
+                                <a:rPr kumimoji="1" lang="en-US" altLang="ja-JP" b="0" i="1" smtClean="0">
+                                  <a:latin typeface="Cambria Math" panose="02040503050406030204" pitchFamily="18" charset="0"/>
+                                </a:rPr>
+                                <m:t>𝑠</m:t>
+                              </m:r>
+                              <m:d>
+                                <m:dPr>
+                                  <m:begChr m:val="["/>
+                                  <m:endChr m:val="]"/>
+                                  <m:ctrlPr>
+                                    <a:rPr kumimoji="1" lang="en-US" altLang="ja-JP" b="0" i="1" smtClean="0">
+                                      <a:latin typeface="Cambria Math" panose="02040503050406030204" pitchFamily="18" charset="0"/>
+                                    </a:rPr>
+                                  </m:ctrlPr>
+                                </m:dPr>
+                                <m:e>
+                                  <m:m>
+                                    <m:mPr>
+                                      <m:plcHide m:val="on"/>
+                                      <m:mcs>
+                                        <m:mc>
+                                          <m:mcPr>
+                                            <m:count m:val="3"/>
+                                            <m:mcJc m:val="center"/>
+                                          </m:mcPr>
+                                        </m:mc>
+                                      </m:mcs>
+                                      <m:ctrlPr>
+                                        <a:rPr kumimoji="1" lang="en-US" altLang="ja-JP" b="0" i="1" smtClean="0">
+                                          <a:latin typeface="Cambria Math" panose="02040503050406030204" pitchFamily="18" charset="0"/>
+                                        </a:rPr>
+                                      </m:ctrlPr>
+                                    </m:mPr>
+                                    <m:mr>
+                                      <m:e>
+                                        <m:r>
+                                          <a:rPr kumimoji="1" lang="en-US" altLang="ja-JP" b="0" i="1" smtClean="0">
+                                            <a:latin typeface="Cambria Math" panose="02040503050406030204" pitchFamily="18" charset="0"/>
+                                          </a:rPr>
+                                          <m:t>1</m:t>
+                                        </m:r>
+                                      </m:e>
+                                      <m:e>
+                                        <m:r>
+                                          <a:rPr kumimoji="1" lang="en-US" altLang="ja-JP" b="0" i="1" smtClean="0">
+                                            <a:latin typeface="Cambria Math" panose="02040503050406030204" pitchFamily="18" charset="0"/>
+                                          </a:rPr>
+                                          <m:t>0</m:t>
+                                        </m:r>
+                                      </m:e>
+                                      <m:e>
+                                        <m:r>
+                                          <a:rPr kumimoji="1" lang="en-US" altLang="ja-JP" b="0" i="1" smtClean="0">
+                                            <a:latin typeface="Cambria Math" panose="02040503050406030204" pitchFamily="18" charset="0"/>
+                                          </a:rPr>
+                                          <m:t>0</m:t>
+                                        </m:r>
+                                      </m:e>
+                                    </m:mr>
+                                    <m:mr>
+                                      <m:e>
+                                        <m:r>
+                                          <a:rPr kumimoji="1" lang="en-US" altLang="ja-JP" b="0" i="1" smtClean="0">
+                                            <a:latin typeface="Cambria Math" panose="02040503050406030204" pitchFamily="18" charset="0"/>
+                                          </a:rPr>
+                                          <m:t>0</m:t>
+                                        </m:r>
+                                      </m:e>
+                                      <m:e>
+                                        <m:r>
+                                          <a:rPr kumimoji="1" lang="en-US" altLang="ja-JP" b="0" i="1" smtClean="0">
+                                            <a:latin typeface="Cambria Math" panose="02040503050406030204" pitchFamily="18" charset="0"/>
+                                          </a:rPr>
+                                          <m:t>1</m:t>
+                                        </m:r>
+                                      </m:e>
+                                      <m:e>
+                                        <m:r>
+                                          <a:rPr kumimoji="1" lang="en-US" altLang="ja-JP" b="0" i="1" smtClean="0">
+                                            <a:latin typeface="Cambria Math" panose="02040503050406030204" pitchFamily="18" charset="0"/>
+                                          </a:rPr>
+                                          <m:t>0</m:t>
+                                        </m:r>
+                                      </m:e>
+                                    </m:mr>
+                                    <m:mr>
+                                      <m:e>
+                                        <m:r>
+                                          <a:rPr kumimoji="1" lang="en-US" altLang="ja-JP" b="0" i="1" smtClean="0">
+                                            <a:latin typeface="Cambria Math" panose="02040503050406030204" pitchFamily="18" charset="0"/>
+                                          </a:rPr>
+                                          <m:t>0</m:t>
+                                        </m:r>
+                                      </m:e>
+                                      <m:e>
+                                        <m:r>
+                                          <a:rPr kumimoji="1" lang="en-US" altLang="ja-JP" b="0" i="1" smtClean="0">
+                                            <a:latin typeface="Cambria Math" panose="02040503050406030204" pitchFamily="18" charset="0"/>
+                                          </a:rPr>
+                                          <m:t>0</m:t>
+                                        </m:r>
+                                      </m:e>
+                                      <m:e>
+                                        <m:r>
+                                          <a:rPr kumimoji="1" lang="en-US" altLang="ja-JP" b="0" i="1" smtClean="0">
+                                            <a:latin typeface="Cambria Math" panose="02040503050406030204" pitchFamily="18" charset="0"/>
+                                          </a:rPr>
+                                          <m:t>1</m:t>
+                                        </m:r>
+                                      </m:e>
+                                    </m:mr>
+                                  </m:m>
+                                </m:e>
+                              </m:d>
+                              <m:r>
+                                <a:rPr kumimoji="1" lang="en-US" altLang="ja-JP" b="0" i="1" smtClean="0">
+                                  <a:latin typeface="Cambria Math" panose="02040503050406030204" pitchFamily="18" charset="0"/>
+                                </a:rPr>
+                                <m:t>−</m:t>
+                              </m:r>
+                              <m:d>
+                                <m:dPr>
+                                  <m:begChr m:val="["/>
+                                  <m:endChr m:val="]"/>
+                                  <m:ctrlPr>
+                                    <a:rPr kumimoji="1" lang="en-US" altLang="ja-JP" b="0" i="1" smtClean="0">
+                                      <a:latin typeface="Cambria Math" panose="02040503050406030204" pitchFamily="18" charset="0"/>
+                                    </a:rPr>
+                                  </m:ctrlPr>
+                                </m:dPr>
+                                <m:e>
+                                  <m:m>
+                                    <m:mPr>
+                                      <m:plcHide m:val="on"/>
+                                      <m:mcs>
+                                        <m:mc>
+                                          <m:mcPr>
+                                            <m:count m:val="3"/>
+                                            <m:mcJc m:val="center"/>
+                                          </m:mcPr>
+                                        </m:mc>
+                                      </m:mcs>
+                                      <m:ctrlPr>
+                                        <a:rPr kumimoji="1" lang="en-US" altLang="ja-JP" b="0" i="1" smtClean="0">
+                                          <a:latin typeface="Cambria Math" panose="02040503050406030204" pitchFamily="18" charset="0"/>
+                                        </a:rPr>
+                                      </m:ctrlPr>
+                                    </m:mPr>
+                                    <m:mr>
+                                      <m:e>
+                                        <m:r>
+                                          <a:rPr kumimoji="1" lang="en-US" altLang="ja-JP" b="0" i="1" smtClean="0">
+                                            <a:latin typeface="Cambria Math" panose="02040503050406030204" pitchFamily="18" charset="0"/>
+                                          </a:rPr>
+                                          <m:t>1</m:t>
+                                        </m:r>
+                                      </m:e>
+                                      <m:e>
+                                        <m:r>
+                                          <a:rPr kumimoji="1" lang="en-US" altLang="ja-JP" b="0" i="1" smtClean="0">
+                                            <a:latin typeface="Cambria Math" panose="02040503050406030204" pitchFamily="18" charset="0"/>
+                                          </a:rPr>
+                                          <m:t>0</m:t>
+                                        </m:r>
+                                      </m:e>
+                                      <m:e>
+                                        <m:r>
+                                          <a:rPr kumimoji="1" lang="en-US" altLang="ja-JP" b="0" i="1" smtClean="0">
+                                            <a:latin typeface="Cambria Math" panose="02040503050406030204" pitchFamily="18" charset="0"/>
+                                          </a:rPr>
+                                          <m:t>0</m:t>
+                                        </m:r>
+                                      </m:e>
+                                    </m:mr>
+                                    <m:mr>
+                                      <m:e>
+                                        <m:r>
+                                          <a:rPr kumimoji="1" lang="en-US" altLang="ja-JP" b="0" i="1" smtClean="0">
+                                            <a:latin typeface="Cambria Math" panose="02040503050406030204" pitchFamily="18" charset="0"/>
+                                          </a:rPr>
+                                          <m:t>0</m:t>
+                                        </m:r>
+                                      </m:e>
+                                      <m:e>
+                                        <m:r>
+                                          <a:rPr kumimoji="1" lang="en-US" altLang="ja-JP" b="0" i="1" smtClean="0">
+                                            <a:latin typeface="Cambria Math" panose="02040503050406030204" pitchFamily="18" charset="0"/>
+                                          </a:rPr>
+                                          <m:t>1</m:t>
+                                        </m:r>
+                                      </m:e>
+                                      <m:e>
+                                        <m:r>
+                                          <a:rPr kumimoji="1" lang="en-US" altLang="ja-JP" b="0" i="1" smtClean="0">
+                                            <a:latin typeface="Cambria Math" panose="02040503050406030204" pitchFamily="18" charset="0"/>
+                                          </a:rPr>
+                                          <m:t>0</m:t>
+                                        </m:r>
+                                      </m:e>
+                                    </m:mr>
+                                    <m:mr>
+                                      <m:e>
+                                        <m:r>
+                                          <a:rPr kumimoji="1" lang="en-US" altLang="ja-JP" b="0" i="1" smtClean="0">
+                                            <a:latin typeface="Cambria Math" panose="02040503050406030204" pitchFamily="18" charset="0"/>
+                                          </a:rPr>
+                                          <m:t>0</m:t>
+                                        </m:r>
+                                      </m:e>
+                                      <m:e>
+                                        <m:r>
+                                          <a:rPr kumimoji="1" lang="en-US" altLang="ja-JP" b="0" i="1" smtClean="0">
+                                            <a:latin typeface="Cambria Math" panose="02040503050406030204" pitchFamily="18" charset="0"/>
+                                          </a:rPr>
+                                          <m:t>0</m:t>
+                                        </m:r>
+                                      </m:e>
+                                      <m:e>
+                                        <m:r>
+                                          <a:rPr kumimoji="1" lang="en-US" altLang="ja-JP" b="0" i="1" smtClean="0">
+                                            <a:latin typeface="Cambria Math" panose="02040503050406030204" pitchFamily="18" charset="0"/>
+                                          </a:rPr>
+                                          <m:t>1</m:t>
+                                        </m:r>
+                                      </m:e>
+                                    </m:mr>
+                                  </m:m>
+                                </m:e>
+                              </m:d>
+                            </m:e>
+                          </m:d>
+                        </m:e>
+                        <m:sup>
+                          <m:r>
+                            <a:rPr kumimoji="1" lang="en-US" altLang="ja-JP" b="0" i="1" smtClean="0">
+                              <a:latin typeface="Cambria Math" panose="02040503050406030204" pitchFamily="18" charset="0"/>
+                            </a:rPr>
+                            <m:t>−1</m:t>
+                          </m:r>
+                        </m:sup>
+                      </m:sSup>
+                      <m:d>
+                        <m:dPr>
+                          <m:begChr m:val="["/>
+                          <m:endChr m:val="]"/>
+                          <m:ctrlPr>
+                            <a:rPr kumimoji="1" lang="en-US" altLang="ja-JP" b="0" i="1" smtClean="0">
+                              <a:latin typeface="Cambria Math" panose="02040503050406030204" pitchFamily="18" charset="0"/>
+                            </a:rPr>
+                          </m:ctrlPr>
+                        </m:dPr>
+                        <m:e>
+                          <m:m>
+                            <m:mPr>
+                              <m:mcs>
+                                <m:mc>
+                                  <m:mcPr>
+                                    <m:count m:val="2"/>
+                                    <m:mcJc m:val="center"/>
+                                  </m:mcPr>
+                                </m:mc>
+                              </m:mcs>
+                              <m:ctrlPr>
+                                <a:rPr kumimoji="1" lang="en-US" altLang="ja-JP" b="0" i="1" smtClean="0">
+                                  <a:latin typeface="Cambria Math" panose="02040503050406030204" pitchFamily="18" charset="0"/>
+                                </a:rPr>
+                              </m:ctrlPr>
+                            </m:mPr>
+                            <m:mr>
+                              <m:e>
+                                <m:r>
+                                  <m:rPr>
+                                    <m:brk m:alnAt="7"/>
+                                  </m:rPr>
+                                  <a:rPr kumimoji="1" lang="en-US" altLang="ja-JP" b="0" i="1" smtClean="0">
+                                    <a:latin typeface="Cambria Math" panose="02040503050406030204" pitchFamily="18" charset="0"/>
+                                  </a:rPr>
+                                  <m:t>0.05</m:t>
+                                </m:r>
+                              </m:e>
+                              <m:e>
+                                <m:r>
+                                  <a:rPr kumimoji="1" lang="en-US" altLang="ja-JP" b="0" i="1" smtClean="0">
+                                    <a:latin typeface="Cambria Math" panose="02040503050406030204" pitchFamily="18" charset="0"/>
+                                  </a:rPr>
+                                  <m:t>0</m:t>
+                                </m:r>
+                              </m:e>
+                            </m:mr>
+                            <m:mr>
+                              <m:e>
+                                <m:r>
+                                  <a:rPr kumimoji="1" lang="en-US" altLang="ja-JP" b="0" i="1" smtClean="0">
+                                    <a:latin typeface="Cambria Math" panose="02040503050406030204" pitchFamily="18" charset="0"/>
+                                  </a:rPr>
+                                  <m:t>0</m:t>
+                                </m:r>
+                              </m:e>
+                              <m:e>
+                                <m:r>
+                                  <a:rPr kumimoji="1" lang="en-US" altLang="ja-JP" b="0" i="1" smtClean="0">
+                                    <a:latin typeface="Cambria Math" panose="02040503050406030204" pitchFamily="18" charset="0"/>
+                                  </a:rPr>
+                                  <m:t>0</m:t>
+                                </m:r>
+                              </m:e>
+                            </m:mr>
+                            <m:mr>
+                              <m:e>
+                                <m:r>
+                                  <a:rPr kumimoji="1" lang="en-US" altLang="ja-JP" b="0" i="1" smtClean="0">
+                                    <a:latin typeface="Cambria Math" panose="02040503050406030204" pitchFamily="18" charset="0"/>
+                                  </a:rPr>
+                                  <m:t>0</m:t>
+                                </m:r>
+                              </m:e>
+                              <m:e>
+                                <m:r>
+                                  <a:rPr kumimoji="1" lang="en-US" altLang="ja-JP" b="0" i="1" smtClean="0">
+                                    <a:latin typeface="Cambria Math" panose="02040503050406030204" pitchFamily="18" charset="0"/>
+                                  </a:rPr>
+                                  <m:t>0.05</m:t>
+                                </m:r>
+                              </m:e>
+                            </m:mr>
+                          </m:m>
+                        </m:e>
+                      </m:d>
+                      <m:r>
+                        <a:rPr kumimoji="1" lang="en-US" altLang="ja-JP" b="0" i="1" smtClean="0">
+                          <a:latin typeface="Cambria Math" panose="02040503050406030204" pitchFamily="18" charset="0"/>
+                        </a:rPr>
+                        <m:t>+0</m:t>
+                      </m:r>
+                    </m:oMath>
+                  </m:oMathPara>
+                </a14:m>
+                <a:endParaRPr kumimoji="1" lang="en-US" altLang="ja-JP" b="0" i="1" dirty="0">
+                  <a:latin typeface="Cambria Math" panose="02040503050406030204" pitchFamily="18" charset="0"/>
+                </a:endParaRPr>
+              </a:p>
+              <a:p>
+                <a:pPr algn="ctr"/>
+                <a14:m>
+                  <m:oMathPara xmlns:m="http://schemas.openxmlformats.org/officeDocument/2006/math">
+                    <m:oMathParaPr>
+                      <m:jc m:val="centerGroup"/>
+                    </m:oMathParaPr>
+                    <m:oMath xmlns:m="http://schemas.openxmlformats.org/officeDocument/2006/math">
+                      <m:r>
+                        <a:rPr kumimoji="1" lang="en-US" altLang="ja-JP" b="0" i="1" smtClean="0">
+                          <a:latin typeface="Cambria Math" panose="02040503050406030204" pitchFamily="18" charset="0"/>
+                        </a:rPr>
+                        <m:t>=</m:t>
+                      </m:r>
+                      <m:d>
+                        <m:dPr>
+                          <m:begChr m:val="["/>
+                          <m:endChr m:val="]"/>
+                          <m:ctrlPr>
+                            <a:rPr kumimoji="1" lang="en-US" altLang="ja-JP" b="0" i="1" smtClean="0">
+                              <a:latin typeface="Cambria Math" panose="02040503050406030204" pitchFamily="18" charset="0"/>
+                            </a:rPr>
+                          </m:ctrlPr>
+                        </m:dPr>
+                        <m:e>
+                          <m:m>
+                            <m:mPr>
+                              <m:plcHide m:val="on"/>
+                              <m:mcs>
+                                <m:mc>
+                                  <m:mcPr>
+                                    <m:count m:val="3"/>
+                                    <m:mcJc m:val="center"/>
+                                  </m:mcPr>
+                                </m:mc>
+                              </m:mcs>
+                              <m:ctrlPr>
+                                <a:rPr kumimoji="1" lang="en-US" altLang="ja-JP" b="0" i="1" smtClean="0">
+                                  <a:latin typeface="Cambria Math" panose="02040503050406030204" pitchFamily="18" charset="0"/>
+                                </a:rPr>
+                              </m:ctrlPr>
+                            </m:mPr>
+                            <m:mr>
+                              <m:e>
+                                <m:r>
+                                  <a:rPr kumimoji="1" lang="en-US" altLang="ja-JP" b="0" i="1" smtClean="0">
+                                    <a:latin typeface="Cambria Math" panose="02040503050406030204" pitchFamily="18" charset="0"/>
+                                  </a:rPr>
+                                  <m:t>1</m:t>
+                                </m:r>
+                              </m:e>
+                              <m:e>
+                                <m:r>
+                                  <a:rPr kumimoji="1" lang="en-US" altLang="ja-JP" b="0" i="1" smtClean="0">
+                                    <a:latin typeface="Cambria Math" panose="02040503050406030204" pitchFamily="18" charset="0"/>
+                                  </a:rPr>
+                                  <m:t>0</m:t>
+                                </m:r>
+                              </m:e>
+                              <m:e>
+                                <m:r>
+                                  <a:rPr kumimoji="1" lang="en-US" altLang="ja-JP" b="0" i="1" smtClean="0">
+                                    <a:latin typeface="Cambria Math" panose="02040503050406030204" pitchFamily="18" charset="0"/>
+                                  </a:rPr>
+                                  <m:t>0</m:t>
+                                </m:r>
+                              </m:e>
+                            </m:mr>
+                            <m:mr>
+                              <m:e>
+                                <m:r>
+                                  <a:rPr kumimoji="1" lang="en-US" altLang="ja-JP" b="0" i="1" smtClean="0">
+                                    <a:latin typeface="Cambria Math" panose="02040503050406030204" pitchFamily="18" charset="0"/>
+                                  </a:rPr>
+                                  <m:t>0</m:t>
+                                </m:r>
+                              </m:e>
+                              <m:e>
+                                <m:r>
+                                  <a:rPr kumimoji="1" lang="en-US" altLang="ja-JP" b="0" i="1" smtClean="0">
+                                    <a:latin typeface="Cambria Math" panose="02040503050406030204" pitchFamily="18" charset="0"/>
+                                  </a:rPr>
+                                  <m:t>1</m:t>
+                                </m:r>
+                              </m:e>
+                              <m:e>
+                                <m:r>
+                                  <a:rPr kumimoji="1" lang="en-US" altLang="ja-JP" b="0" i="1" smtClean="0">
+                                    <a:latin typeface="Cambria Math" panose="02040503050406030204" pitchFamily="18" charset="0"/>
+                                  </a:rPr>
+                                  <m:t>0</m:t>
+                                </m:r>
+                              </m:e>
+                            </m:mr>
+                            <m:mr>
+                              <m:e>
+                                <m:r>
+                                  <a:rPr kumimoji="1" lang="en-US" altLang="ja-JP" b="0" i="1" smtClean="0">
+                                    <a:latin typeface="Cambria Math" panose="02040503050406030204" pitchFamily="18" charset="0"/>
+                                  </a:rPr>
+                                  <m:t>0</m:t>
+                                </m:r>
+                              </m:e>
+                              <m:e>
+                                <m:r>
+                                  <a:rPr kumimoji="1" lang="en-US" altLang="ja-JP" b="0" i="1" smtClean="0">
+                                    <a:latin typeface="Cambria Math" panose="02040503050406030204" pitchFamily="18" charset="0"/>
+                                  </a:rPr>
+                                  <m:t>0</m:t>
+                                </m:r>
+                              </m:e>
+                              <m:e>
+                                <m:r>
+                                  <a:rPr kumimoji="1" lang="en-US" altLang="ja-JP" b="0" i="1" smtClean="0">
+                                    <a:latin typeface="Cambria Math" panose="02040503050406030204" pitchFamily="18" charset="0"/>
+                                  </a:rPr>
+                                  <m:t>1</m:t>
+                                </m:r>
+                              </m:e>
+                            </m:mr>
+                          </m:m>
+                        </m:e>
+                      </m:d>
+                      <m:sSup>
+                        <m:sSupPr>
+                          <m:ctrlPr>
+                            <a:rPr kumimoji="1" lang="en-US" altLang="ja-JP" b="0" i="1" smtClean="0">
+                              <a:latin typeface="Cambria Math" panose="02040503050406030204" pitchFamily="18" charset="0"/>
+                            </a:rPr>
+                          </m:ctrlPr>
+                        </m:sSupPr>
+                        <m:e>
+                          <m:d>
+                            <m:dPr>
+                              <m:begChr m:val="["/>
+                              <m:endChr m:val="]"/>
+                              <m:ctrlPr>
+                                <a:rPr kumimoji="1" lang="en-US" altLang="ja-JP" b="0" i="1" smtClean="0">
+                                  <a:latin typeface="Cambria Math" panose="02040503050406030204" pitchFamily="18" charset="0"/>
+                                </a:rPr>
+                              </m:ctrlPr>
+                            </m:dPr>
+                            <m:e>
+                              <m:m>
+                                <m:mPr>
+                                  <m:plcHide m:val="on"/>
+                                  <m:mcs>
+                                    <m:mc>
+                                      <m:mcPr>
+                                        <m:count m:val="3"/>
+                                        <m:mcJc m:val="center"/>
+                                      </m:mcPr>
+                                    </m:mc>
+                                  </m:mcs>
+                                  <m:ctrlPr>
+                                    <a:rPr kumimoji="1" lang="en-US" altLang="ja-JP" b="0" i="1" smtClean="0">
+                                      <a:latin typeface="Cambria Math" panose="02040503050406030204" pitchFamily="18" charset="0"/>
+                                    </a:rPr>
+                                  </m:ctrlPr>
+                                </m:mPr>
+                                <m:mr>
+                                  <m:e>
+                                    <m:r>
+                                      <a:rPr kumimoji="1" lang="en-US" altLang="ja-JP" b="0" i="1" smtClean="0">
+                                        <a:latin typeface="Cambria Math" panose="02040503050406030204" pitchFamily="18" charset="0"/>
+                                      </a:rPr>
+                                      <m:t>𝑠</m:t>
+                                    </m:r>
+                                    <m:r>
+                                      <a:rPr kumimoji="1" lang="en-US" altLang="ja-JP" b="0" i="1" smtClean="0">
+                                        <a:latin typeface="Cambria Math" panose="02040503050406030204" pitchFamily="18" charset="0"/>
+                                      </a:rPr>
+                                      <m:t>−1</m:t>
+                                    </m:r>
+                                  </m:e>
+                                  <m:e>
+                                    <m:r>
+                                      <a:rPr kumimoji="1" lang="en-US" altLang="ja-JP" b="0" i="1" smtClean="0">
+                                        <a:latin typeface="Cambria Math" panose="02040503050406030204" pitchFamily="18" charset="0"/>
+                                      </a:rPr>
+                                      <m:t>0</m:t>
+                                    </m:r>
+                                  </m:e>
+                                  <m:e>
+                                    <m:r>
+                                      <a:rPr kumimoji="1" lang="en-US" altLang="ja-JP" b="0" i="1" smtClean="0">
+                                        <a:latin typeface="Cambria Math" panose="02040503050406030204" pitchFamily="18" charset="0"/>
+                                      </a:rPr>
+                                      <m:t>0</m:t>
+                                    </m:r>
+                                  </m:e>
+                                </m:mr>
+                                <m:mr>
+                                  <m:e>
+                                    <m:r>
+                                      <a:rPr kumimoji="1" lang="en-US" altLang="ja-JP" b="0" i="1" smtClean="0">
+                                        <a:latin typeface="Cambria Math" panose="02040503050406030204" pitchFamily="18" charset="0"/>
+                                      </a:rPr>
+                                      <m:t>0</m:t>
+                                    </m:r>
+                                  </m:e>
+                                  <m:e>
+                                    <m:r>
+                                      <a:rPr kumimoji="1" lang="en-US" altLang="ja-JP" b="0" i="1" smtClean="0">
+                                        <a:latin typeface="Cambria Math" panose="02040503050406030204" pitchFamily="18" charset="0"/>
+                                      </a:rPr>
+                                      <m:t>𝑠</m:t>
+                                    </m:r>
+                                    <m:r>
+                                      <a:rPr kumimoji="1" lang="en-US" altLang="ja-JP" b="0" i="1" smtClean="0">
+                                        <a:latin typeface="Cambria Math" panose="02040503050406030204" pitchFamily="18" charset="0"/>
+                                      </a:rPr>
+                                      <m:t>−1</m:t>
+                                    </m:r>
+                                  </m:e>
+                                  <m:e>
+                                    <m:r>
+                                      <a:rPr kumimoji="1" lang="en-US" altLang="ja-JP" b="0" i="1" smtClean="0">
+                                        <a:latin typeface="Cambria Math" panose="02040503050406030204" pitchFamily="18" charset="0"/>
+                                      </a:rPr>
+                                      <m:t>0</m:t>
+                                    </m:r>
+                                  </m:e>
+                                </m:mr>
+                                <m:mr>
+                                  <m:e>
+                                    <m:r>
+                                      <a:rPr kumimoji="1" lang="en-US" altLang="ja-JP" b="0" i="1" smtClean="0">
+                                        <a:latin typeface="Cambria Math" panose="02040503050406030204" pitchFamily="18" charset="0"/>
+                                      </a:rPr>
+                                      <m:t>0</m:t>
+                                    </m:r>
+                                  </m:e>
+                                  <m:e>
+                                    <m:r>
+                                      <a:rPr kumimoji="1" lang="en-US" altLang="ja-JP" b="0" i="1" smtClean="0">
+                                        <a:latin typeface="Cambria Math" panose="02040503050406030204" pitchFamily="18" charset="0"/>
+                                      </a:rPr>
+                                      <m:t>0</m:t>
+                                    </m:r>
+                                  </m:e>
+                                  <m:e>
+                                    <m:r>
+                                      <a:rPr kumimoji="1" lang="en-US" altLang="ja-JP" b="0" i="1" smtClean="0">
+                                        <a:latin typeface="Cambria Math" panose="02040503050406030204" pitchFamily="18" charset="0"/>
+                                      </a:rPr>
+                                      <m:t>𝑠</m:t>
+                                    </m:r>
+                                    <m:r>
+                                      <a:rPr kumimoji="1" lang="en-US" altLang="ja-JP" b="0" i="1" smtClean="0">
+                                        <a:latin typeface="Cambria Math" panose="02040503050406030204" pitchFamily="18" charset="0"/>
+                                      </a:rPr>
+                                      <m:t>−1</m:t>
+                                    </m:r>
+                                  </m:e>
+                                </m:mr>
+                              </m:m>
+                            </m:e>
+                          </m:d>
+                        </m:e>
+                        <m:sup>
+                          <m:r>
+                            <a:rPr kumimoji="1" lang="en-US" altLang="ja-JP" b="0" i="1" smtClean="0">
+                              <a:latin typeface="Cambria Math" panose="02040503050406030204" pitchFamily="18" charset="0"/>
+                            </a:rPr>
+                            <m:t>−1</m:t>
+                          </m:r>
+                        </m:sup>
+                      </m:sSup>
+                      <m:d>
+                        <m:dPr>
+                          <m:begChr m:val="["/>
+                          <m:endChr m:val="]"/>
+                          <m:ctrlPr>
+                            <a:rPr kumimoji="1" lang="en-US" altLang="ja-JP" b="0" i="1" smtClean="0">
+                              <a:latin typeface="Cambria Math" panose="02040503050406030204" pitchFamily="18" charset="0"/>
+                            </a:rPr>
+                          </m:ctrlPr>
+                        </m:dPr>
+                        <m:e>
+                          <m:m>
+                            <m:mPr>
+                              <m:mcs>
+                                <m:mc>
+                                  <m:mcPr>
+                                    <m:count m:val="2"/>
+                                    <m:mcJc m:val="center"/>
+                                  </m:mcPr>
+                                </m:mc>
+                              </m:mcs>
+                              <m:ctrlPr>
+                                <a:rPr kumimoji="1" lang="en-US" altLang="ja-JP" b="0" i="1" smtClean="0">
+                                  <a:latin typeface="Cambria Math" panose="02040503050406030204" pitchFamily="18" charset="0"/>
+                                </a:rPr>
+                              </m:ctrlPr>
+                            </m:mPr>
+                            <m:mr>
+                              <m:e>
+                                <m:r>
+                                  <m:rPr>
+                                    <m:brk m:alnAt="7"/>
+                                  </m:rPr>
+                                  <a:rPr kumimoji="1" lang="en-US" altLang="ja-JP" b="0" i="1" smtClean="0">
+                                    <a:latin typeface="Cambria Math" panose="02040503050406030204" pitchFamily="18" charset="0"/>
+                                  </a:rPr>
+                                  <m:t>0.05</m:t>
+                                </m:r>
+                              </m:e>
+                              <m:e>
+                                <m:r>
+                                  <a:rPr kumimoji="1" lang="en-US" altLang="ja-JP" b="0" i="1" smtClean="0">
+                                    <a:latin typeface="Cambria Math" panose="02040503050406030204" pitchFamily="18" charset="0"/>
+                                  </a:rPr>
+                                  <m:t>0</m:t>
+                                </m:r>
+                              </m:e>
+                            </m:mr>
+                            <m:mr>
+                              <m:e>
+                                <m:r>
+                                  <a:rPr kumimoji="1" lang="en-US" altLang="ja-JP" b="0" i="1" smtClean="0">
+                                    <a:latin typeface="Cambria Math" panose="02040503050406030204" pitchFamily="18" charset="0"/>
+                                  </a:rPr>
+                                  <m:t>0</m:t>
+                                </m:r>
+                              </m:e>
+                              <m:e>
+                                <m:r>
+                                  <a:rPr kumimoji="1" lang="en-US" altLang="ja-JP" b="0" i="1" smtClean="0">
+                                    <a:latin typeface="Cambria Math" panose="02040503050406030204" pitchFamily="18" charset="0"/>
+                                  </a:rPr>
+                                  <m:t>0</m:t>
+                                </m:r>
+                              </m:e>
+                            </m:mr>
+                            <m:mr>
+                              <m:e>
+                                <m:r>
+                                  <a:rPr kumimoji="1" lang="en-US" altLang="ja-JP" b="0" i="1" smtClean="0">
+                                    <a:latin typeface="Cambria Math" panose="02040503050406030204" pitchFamily="18" charset="0"/>
+                                  </a:rPr>
+                                  <m:t>0</m:t>
+                                </m:r>
+                              </m:e>
+                              <m:e>
+                                <m:r>
+                                  <a:rPr kumimoji="1" lang="en-US" altLang="ja-JP" b="0" i="1" smtClean="0">
+                                    <a:latin typeface="Cambria Math" panose="02040503050406030204" pitchFamily="18" charset="0"/>
+                                  </a:rPr>
+                                  <m:t>0.05</m:t>
+                                </m:r>
+                              </m:e>
+                            </m:mr>
+                          </m:m>
+                        </m:e>
+                      </m:d>
+                    </m:oMath>
+                  </m:oMathPara>
+                </a14:m>
+                <a:endParaRPr kumimoji="1" lang="en-US" altLang="ja-JP" b="0" i="1" dirty="0">
+                  <a:latin typeface="Cambria Math" panose="02040503050406030204" pitchFamily="18" charset="0"/>
+                </a:endParaRPr>
+              </a:p>
+              <a:p>
+                <a:pPr algn="ctr"/>
+                <a14:m>
+                  <m:oMathPara xmlns:m="http://schemas.openxmlformats.org/officeDocument/2006/math">
+                    <m:oMathParaPr>
+                      <m:jc m:val="centerGroup"/>
+                    </m:oMathParaPr>
+                    <m:oMath xmlns:m="http://schemas.openxmlformats.org/officeDocument/2006/math">
+                      <m:r>
+                        <a:rPr kumimoji="1" lang="en-US" altLang="ja-JP" b="0" i="1" smtClean="0">
+                          <a:latin typeface="Cambria Math" panose="02040503050406030204" pitchFamily="18" charset="0"/>
+                        </a:rPr>
+                        <m:t>=</m:t>
+                      </m:r>
+                      <m:d>
+                        <m:dPr>
+                          <m:begChr m:val="["/>
+                          <m:endChr m:val="]"/>
+                          <m:ctrlPr>
+                            <a:rPr lang="en-US" altLang="ja-JP" i="1">
+                              <a:latin typeface="Cambria Math" panose="02040503050406030204" pitchFamily="18" charset="0"/>
+                            </a:rPr>
+                          </m:ctrlPr>
+                        </m:dPr>
+                        <m:e>
+                          <m:m>
+                            <m:mPr>
+                              <m:plcHide m:val="on"/>
+                              <m:mcs>
+                                <m:mc>
+                                  <m:mcPr>
+                                    <m:count m:val="3"/>
+                                    <m:mcJc m:val="center"/>
+                                  </m:mcPr>
+                                </m:mc>
+                              </m:mcs>
+                              <m:ctrlPr>
+                                <a:rPr lang="en-US" altLang="ja-JP" i="1">
+                                  <a:latin typeface="Cambria Math" panose="02040503050406030204" pitchFamily="18" charset="0"/>
+                                </a:rPr>
+                              </m:ctrlPr>
+                            </m:mPr>
+                            <m:mr>
+                              <m:e>
+                                <m:r>
+                                  <a:rPr lang="en-US" altLang="ja-JP" i="1">
+                                    <a:latin typeface="Cambria Math" panose="02040503050406030204" pitchFamily="18" charset="0"/>
+                                  </a:rPr>
+                                  <m:t>1</m:t>
+                                </m:r>
+                              </m:e>
+                              <m:e>
+                                <m:r>
+                                  <a:rPr lang="en-US" altLang="ja-JP" i="1">
+                                    <a:latin typeface="Cambria Math" panose="02040503050406030204" pitchFamily="18" charset="0"/>
+                                  </a:rPr>
+                                  <m:t>0</m:t>
+                                </m:r>
+                              </m:e>
+                              <m:e>
+                                <m:r>
+                                  <a:rPr lang="en-US" altLang="ja-JP" i="1">
+                                    <a:latin typeface="Cambria Math" panose="02040503050406030204" pitchFamily="18" charset="0"/>
+                                  </a:rPr>
+                                  <m:t>0</m:t>
+                                </m:r>
+                              </m:e>
+                            </m:mr>
+                            <m:mr>
+                              <m:e>
+                                <m:r>
+                                  <a:rPr lang="en-US" altLang="ja-JP" i="1">
+                                    <a:latin typeface="Cambria Math" panose="02040503050406030204" pitchFamily="18" charset="0"/>
+                                  </a:rPr>
+                                  <m:t>0</m:t>
+                                </m:r>
+                              </m:e>
+                              <m:e>
+                                <m:r>
+                                  <a:rPr lang="en-US" altLang="ja-JP" i="1">
+                                    <a:latin typeface="Cambria Math" panose="02040503050406030204" pitchFamily="18" charset="0"/>
+                                  </a:rPr>
+                                  <m:t>1</m:t>
+                                </m:r>
+                              </m:e>
+                              <m:e>
+                                <m:r>
+                                  <a:rPr lang="en-US" altLang="ja-JP" i="1">
+                                    <a:latin typeface="Cambria Math" panose="02040503050406030204" pitchFamily="18" charset="0"/>
+                                  </a:rPr>
+                                  <m:t>0</m:t>
+                                </m:r>
+                              </m:e>
+                            </m:mr>
+                            <m:mr>
+                              <m:e>
+                                <m:r>
+                                  <a:rPr lang="en-US" altLang="ja-JP" i="1">
+                                    <a:latin typeface="Cambria Math" panose="02040503050406030204" pitchFamily="18" charset="0"/>
+                                  </a:rPr>
+                                  <m:t>0</m:t>
+                                </m:r>
+                              </m:e>
+                              <m:e>
+                                <m:r>
+                                  <a:rPr lang="en-US" altLang="ja-JP" i="1">
+                                    <a:latin typeface="Cambria Math" panose="02040503050406030204" pitchFamily="18" charset="0"/>
+                                  </a:rPr>
+                                  <m:t>0</m:t>
+                                </m:r>
+                              </m:e>
+                              <m:e>
+                                <m:r>
+                                  <a:rPr lang="en-US" altLang="ja-JP" i="1">
+                                    <a:latin typeface="Cambria Math" panose="02040503050406030204" pitchFamily="18" charset="0"/>
+                                  </a:rPr>
+                                  <m:t>1</m:t>
+                                </m:r>
+                              </m:e>
+                            </m:mr>
+                          </m:m>
+                        </m:e>
+                      </m:d>
+                      <m:d>
+                        <m:dPr>
+                          <m:begChr m:val="["/>
+                          <m:endChr m:val="]"/>
+                          <m:ctrlPr>
+                            <a:rPr lang="en-US" altLang="ja-JP" i="1" smtClean="0">
+                              <a:latin typeface="Cambria Math" panose="02040503050406030204" pitchFamily="18" charset="0"/>
+                            </a:rPr>
+                          </m:ctrlPr>
+                        </m:dPr>
+                        <m:e>
+                          <m:m>
+                            <m:mPr>
+                              <m:mcs>
+                                <m:mc>
+                                  <m:mcPr>
+                                    <m:count m:val="3"/>
+                                    <m:mcJc m:val="center"/>
+                                  </m:mcPr>
+                                </m:mc>
+                              </m:mcs>
+                              <m:ctrlPr>
+                                <a:rPr lang="en-US" altLang="ja-JP" i="1" smtClean="0">
+                                  <a:latin typeface="Cambria Math" panose="02040503050406030204" pitchFamily="18" charset="0"/>
+                                </a:rPr>
+                              </m:ctrlPr>
+                            </m:mPr>
+                            <m:mr>
+                              <m:e>
+                                <m:f>
+                                  <m:fPr>
+                                    <m:ctrlPr>
+                                      <a:rPr lang="en-US" altLang="ja-JP" i="1" smtClean="0">
+                                        <a:latin typeface="Cambria Math" panose="02040503050406030204" pitchFamily="18" charset="0"/>
+                                      </a:rPr>
+                                    </m:ctrlPr>
+                                  </m:fPr>
+                                  <m:num>
+                                    <m:r>
+                                      <a:rPr lang="en-US" altLang="ja-JP" b="0" i="1" smtClean="0">
+                                        <a:latin typeface="Cambria Math" panose="02040503050406030204" pitchFamily="18" charset="0"/>
+                                      </a:rPr>
+                                      <m:t>1</m:t>
+                                    </m:r>
+                                  </m:num>
+                                  <m:den>
+                                    <m:r>
+                                      <a:rPr lang="en-US" altLang="ja-JP" b="0" i="1" smtClean="0">
+                                        <a:latin typeface="Cambria Math" panose="02040503050406030204" pitchFamily="18" charset="0"/>
+                                      </a:rPr>
+                                      <m:t>𝑠</m:t>
+                                    </m:r>
+                                    <m:r>
+                                      <a:rPr lang="en-US" altLang="ja-JP" b="0" i="1" smtClean="0">
+                                        <a:latin typeface="Cambria Math" panose="02040503050406030204" pitchFamily="18" charset="0"/>
+                                      </a:rPr>
+                                      <m:t>−1</m:t>
+                                    </m:r>
+                                  </m:den>
+                                </m:f>
+                              </m:e>
+                              <m:e>
+                                <m:r>
+                                  <a:rPr lang="en-US" altLang="ja-JP" b="0" i="1" smtClean="0">
+                                    <a:latin typeface="Cambria Math" panose="02040503050406030204" pitchFamily="18" charset="0"/>
+                                  </a:rPr>
+                                  <m:t>0</m:t>
+                                </m:r>
+                              </m:e>
+                              <m:e>
+                                <m:r>
+                                  <a:rPr lang="en-US" altLang="ja-JP" b="0" i="1" smtClean="0">
+                                    <a:latin typeface="Cambria Math" panose="02040503050406030204" pitchFamily="18" charset="0"/>
+                                  </a:rPr>
+                                  <m:t>0</m:t>
+                                </m:r>
+                              </m:e>
+                            </m:mr>
+                            <m:mr>
+                              <m:e>
+                                <m:r>
+                                  <a:rPr lang="en-US" altLang="ja-JP" b="0" i="1" smtClean="0">
+                                    <a:latin typeface="Cambria Math" panose="02040503050406030204" pitchFamily="18" charset="0"/>
+                                  </a:rPr>
+                                  <m:t>0</m:t>
+                                </m:r>
+                              </m:e>
+                              <m:e>
+                                <m:f>
+                                  <m:fPr>
+                                    <m:ctrlPr>
+                                      <a:rPr lang="en-US" altLang="ja-JP" i="1" smtClean="0">
+                                        <a:latin typeface="Cambria Math" panose="02040503050406030204" pitchFamily="18" charset="0"/>
+                                      </a:rPr>
+                                    </m:ctrlPr>
+                                  </m:fPr>
+                                  <m:num>
+                                    <m:r>
+                                      <a:rPr lang="en-US" altLang="ja-JP" b="0" i="1" smtClean="0">
+                                        <a:latin typeface="Cambria Math" panose="02040503050406030204" pitchFamily="18" charset="0"/>
+                                      </a:rPr>
+                                      <m:t>1</m:t>
+                                    </m:r>
+                                  </m:num>
+                                  <m:den>
+                                    <m:r>
+                                      <a:rPr lang="en-US" altLang="ja-JP" b="0" i="1" smtClean="0">
+                                        <a:latin typeface="Cambria Math" panose="02040503050406030204" pitchFamily="18" charset="0"/>
+                                      </a:rPr>
+                                      <m:t>𝑠</m:t>
+                                    </m:r>
+                                    <m:r>
+                                      <a:rPr lang="en-US" altLang="ja-JP" b="0" i="1" smtClean="0">
+                                        <a:latin typeface="Cambria Math" panose="02040503050406030204" pitchFamily="18" charset="0"/>
+                                      </a:rPr>
+                                      <m:t>−1</m:t>
+                                    </m:r>
+                                  </m:den>
+                                </m:f>
+                              </m:e>
+                              <m:e>
+                                <m:r>
+                                  <a:rPr lang="en-US" altLang="ja-JP" b="0" i="1" smtClean="0">
+                                    <a:latin typeface="Cambria Math" panose="02040503050406030204" pitchFamily="18" charset="0"/>
+                                  </a:rPr>
+                                  <m:t>0</m:t>
+                                </m:r>
+                              </m:e>
+                            </m:mr>
+                            <m:mr>
+                              <m:e>
+                                <m:r>
+                                  <a:rPr lang="en-US" altLang="ja-JP" b="0" i="1" smtClean="0">
+                                    <a:latin typeface="Cambria Math" panose="02040503050406030204" pitchFamily="18" charset="0"/>
+                                  </a:rPr>
+                                  <m:t>0</m:t>
+                                </m:r>
+                              </m:e>
+                              <m:e>
+                                <m:r>
+                                  <a:rPr lang="en-US" altLang="ja-JP" b="0" i="1" smtClean="0">
+                                    <a:latin typeface="Cambria Math" panose="02040503050406030204" pitchFamily="18" charset="0"/>
+                                  </a:rPr>
+                                  <m:t>0</m:t>
+                                </m:r>
+                              </m:e>
+                              <m:e>
+                                <m:f>
+                                  <m:fPr>
+                                    <m:ctrlPr>
+                                      <a:rPr lang="en-US" altLang="ja-JP" i="1" smtClean="0">
+                                        <a:latin typeface="Cambria Math" panose="02040503050406030204" pitchFamily="18" charset="0"/>
+                                      </a:rPr>
+                                    </m:ctrlPr>
+                                  </m:fPr>
+                                  <m:num>
+                                    <m:r>
+                                      <a:rPr lang="en-US" altLang="ja-JP" b="0" i="1" smtClean="0">
+                                        <a:latin typeface="Cambria Math" panose="02040503050406030204" pitchFamily="18" charset="0"/>
+                                      </a:rPr>
+                                      <m:t>1</m:t>
+                                    </m:r>
+                                  </m:num>
+                                  <m:den>
+                                    <m:r>
+                                      <a:rPr lang="en-US" altLang="ja-JP" b="0" i="1" smtClean="0">
+                                        <a:latin typeface="Cambria Math" panose="02040503050406030204" pitchFamily="18" charset="0"/>
+                                      </a:rPr>
+                                      <m:t>𝑠</m:t>
+                                    </m:r>
+                                    <m:r>
+                                      <a:rPr lang="en-US" altLang="ja-JP" b="0" i="1" smtClean="0">
+                                        <a:latin typeface="Cambria Math" panose="02040503050406030204" pitchFamily="18" charset="0"/>
+                                      </a:rPr>
+                                      <m:t>−1</m:t>
+                                    </m:r>
+                                  </m:den>
+                                </m:f>
+                              </m:e>
+                            </m:mr>
+                          </m:m>
+                        </m:e>
+                      </m:d>
+                      <m:d>
+                        <m:dPr>
+                          <m:begChr m:val="["/>
+                          <m:endChr m:val="]"/>
+                          <m:ctrlPr>
+                            <a:rPr lang="en-US" altLang="ja-JP" i="1">
+                              <a:latin typeface="Cambria Math" panose="02040503050406030204" pitchFamily="18" charset="0"/>
+                            </a:rPr>
+                          </m:ctrlPr>
+                        </m:dPr>
+                        <m:e>
+                          <m:m>
+                            <m:mPr>
+                              <m:mcs>
+                                <m:mc>
+                                  <m:mcPr>
+                                    <m:count m:val="2"/>
+                                    <m:mcJc m:val="center"/>
+                                  </m:mcPr>
+                                </m:mc>
+                              </m:mcs>
+                              <m:ctrlPr>
+                                <a:rPr lang="en-US" altLang="ja-JP" i="1">
+                                  <a:latin typeface="Cambria Math" panose="02040503050406030204" pitchFamily="18" charset="0"/>
+                                </a:rPr>
+                              </m:ctrlPr>
+                            </m:mPr>
+                            <m:mr>
+                              <m:e>
+                                <m:r>
+                                  <m:rPr>
+                                    <m:brk m:alnAt="7"/>
+                                  </m:rPr>
+                                  <a:rPr lang="en-US" altLang="ja-JP" i="1">
+                                    <a:latin typeface="Cambria Math" panose="02040503050406030204" pitchFamily="18" charset="0"/>
+                                  </a:rPr>
+                                  <m:t>0</m:t>
+                                </m:r>
+                                <m:r>
+                                  <a:rPr lang="en-US" altLang="ja-JP" i="1">
+                                    <a:latin typeface="Cambria Math" panose="02040503050406030204" pitchFamily="18" charset="0"/>
+                                  </a:rPr>
+                                  <m:t>.05</m:t>
+                                </m:r>
+                              </m:e>
+                              <m:e>
+                                <m:r>
+                                  <a:rPr lang="en-US" altLang="ja-JP" i="1">
+                                    <a:latin typeface="Cambria Math" panose="02040503050406030204" pitchFamily="18" charset="0"/>
+                                  </a:rPr>
+                                  <m:t>0</m:t>
+                                </m:r>
+                              </m:e>
+                            </m:mr>
+                            <m:mr>
+                              <m:e>
+                                <m:r>
+                                  <a:rPr lang="en-US" altLang="ja-JP" i="1">
+                                    <a:latin typeface="Cambria Math" panose="02040503050406030204" pitchFamily="18" charset="0"/>
+                                  </a:rPr>
+                                  <m:t>0</m:t>
+                                </m:r>
+                              </m:e>
+                              <m:e>
+                                <m:r>
+                                  <a:rPr lang="en-US" altLang="ja-JP" i="1">
+                                    <a:latin typeface="Cambria Math" panose="02040503050406030204" pitchFamily="18" charset="0"/>
+                                  </a:rPr>
+                                  <m:t>0</m:t>
+                                </m:r>
+                              </m:e>
+                            </m:mr>
+                            <m:mr>
+                              <m:e>
+                                <m:r>
+                                  <a:rPr lang="en-US" altLang="ja-JP" i="1">
+                                    <a:latin typeface="Cambria Math" panose="02040503050406030204" pitchFamily="18" charset="0"/>
+                                  </a:rPr>
+                                  <m:t>0</m:t>
+                                </m:r>
+                              </m:e>
+                              <m:e>
+                                <m:r>
+                                  <a:rPr lang="en-US" altLang="ja-JP" i="1">
+                                    <a:latin typeface="Cambria Math" panose="02040503050406030204" pitchFamily="18" charset="0"/>
+                                  </a:rPr>
+                                  <m:t>0.05</m:t>
+                                </m:r>
+                              </m:e>
+                            </m:mr>
+                          </m:m>
+                        </m:e>
+                      </m:d>
+                    </m:oMath>
+                  </m:oMathPara>
+                </a14:m>
+                <a:endParaRPr lang="en-US" altLang="ja-JP" i="1" dirty="0">
+                  <a:latin typeface="Cambria Math" panose="02040503050406030204" pitchFamily="18" charset="0"/>
+                </a:endParaRPr>
+              </a:p>
+              <a:p>
+                <a:pPr algn="ctr"/>
+                <a14:m>
+                  <m:oMathPara xmlns:m="http://schemas.openxmlformats.org/officeDocument/2006/math">
+                    <m:oMathParaPr>
+                      <m:jc m:val="centerGroup"/>
+                    </m:oMathParaPr>
+                    <m:oMath xmlns:m="http://schemas.openxmlformats.org/officeDocument/2006/math">
+                      <m:r>
+                        <a:rPr lang="en-US" altLang="ja-JP" b="0" i="1" smtClean="0">
+                          <a:latin typeface="Cambria Math" panose="02040503050406030204" pitchFamily="18" charset="0"/>
+                        </a:rPr>
+                        <m:t>=</m:t>
+                      </m:r>
+                      <m:d>
+                        <m:dPr>
+                          <m:begChr m:val="["/>
+                          <m:endChr m:val="]"/>
+                          <m:ctrlPr>
+                            <a:rPr lang="en-US" altLang="ja-JP" b="0" i="1" smtClean="0">
+                              <a:latin typeface="Cambria Math" panose="02040503050406030204" pitchFamily="18" charset="0"/>
+                            </a:rPr>
+                          </m:ctrlPr>
+                        </m:dPr>
+                        <m:e>
+                          <m:m>
+                            <m:mPr>
+                              <m:mcs>
+                                <m:mc>
+                                  <m:mcPr>
+                                    <m:count m:val="2"/>
+                                    <m:mcJc m:val="center"/>
+                                  </m:mcPr>
+                                </m:mc>
+                              </m:mcs>
+                              <m:ctrlPr>
+                                <a:rPr lang="en-US" altLang="ja-JP" b="0" i="1" smtClean="0">
+                                  <a:latin typeface="Cambria Math" panose="02040503050406030204" pitchFamily="18" charset="0"/>
+                                </a:rPr>
+                              </m:ctrlPr>
+                            </m:mPr>
+                            <m:mr>
+                              <m:e>
+                                <m:f>
+                                  <m:fPr>
+                                    <m:ctrlPr>
+                                      <a:rPr lang="en-US" altLang="ja-JP" b="0" i="1" smtClean="0">
+                                        <a:latin typeface="Cambria Math" panose="02040503050406030204" pitchFamily="18" charset="0"/>
+                                      </a:rPr>
+                                    </m:ctrlPr>
+                                  </m:fPr>
+                                  <m:num>
+                                    <m:r>
+                                      <a:rPr lang="en-US" altLang="ja-JP" b="0" i="1" smtClean="0">
+                                        <a:latin typeface="Cambria Math" panose="02040503050406030204" pitchFamily="18" charset="0"/>
+                                      </a:rPr>
+                                      <m:t>0.05</m:t>
+                                    </m:r>
+                                  </m:num>
+                                  <m:den>
+                                    <m:r>
+                                      <a:rPr lang="en-US" altLang="ja-JP" b="0" i="1" smtClean="0">
+                                        <a:latin typeface="Cambria Math" panose="02040503050406030204" pitchFamily="18" charset="0"/>
+                                      </a:rPr>
+                                      <m:t>𝑠</m:t>
+                                    </m:r>
+                                    <m:r>
+                                      <a:rPr lang="en-US" altLang="ja-JP" b="0" i="1" smtClean="0">
+                                        <a:latin typeface="Cambria Math" panose="02040503050406030204" pitchFamily="18" charset="0"/>
+                                      </a:rPr>
+                                      <m:t>−1</m:t>
+                                    </m:r>
+                                  </m:den>
+                                </m:f>
+                              </m:e>
+                              <m:e>
+                                <m:r>
+                                  <a:rPr lang="en-US" altLang="ja-JP" b="0" i="1" smtClean="0">
+                                    <a:latin typeface="Cambria Math" panose="02040503050406030204" pitchFamily="18" charset="0"/>
+                                  </a:rPr>
+                                  <m:t>0</m:t>
+                                </m:r>
+                              </m:e>
+                            </m:mr>
+                            <m:mr>
+                              <m:e>
+                                <m:r>
+                                  <a:rPr lang="en-US" altLang="ja-JP" b="0" i="1" smtClean="0">
+                                    <a:latin typeface="Cambria Math" panose="02040503050406030204" pitchFamily="18" charset="0"/>
+                                  </a:rPr>
+                                  <m:t>0</m:t>
+                                </m:r>
+                              </m:e>
+                              <m:e>
+                                <m:r>
+                                  <a:rPr lang="en-US" altLang="ja-JP" b="0" i="1" smtClean="0">
+                                    <a:latin typeface="Cambria Math" panose="02040503050406030204" pitchFamily="18" charset="0"/>
+                                  </a:rPr>
+                                  <m:t>0</m:t>
+                                </m:r>
+                              </m:e>
+                            </m:mr>
+                            <m:mr>
+                              <m:e>
+                                <m:r>
+                                  <a:rPr lang="en-US" altLang="ja-JP" b="0" i="1" smtClean="0">
+                                    <a:latin typeface="Cambria Math" panose="02040503050406030204" pitchFamily="18" charset="0"/>
+                                  </a:rPr>
+                                  <m:t>0</m:t>
+                                </m:r>
+                              </m:e>
+                              <m:e>
+                                <m:f>
+                                  <m:fPr>
+                                    <m:ctrlPr>
+                                      <a:rPr lang="en-US" altLang="ja-JP" b="0" i="1" smtClean="0">
+                                        <a:latin typeface="Cambria Math" panose="02040503050406030204" pitchFamily="18" charset="0"/>
+                                      </a:rPr>
+                                    </m:ctrlPr>
+                                  </m:fPr>
+                                  <m:num>
+                                    <m:r>
+                                      <a:rPr lang="en-US" altLang="ja-JP" b="0" i="1" smtClean="0">
+                                        <a:latin typeface="Cambria Math" panose="02040503050406030204" pitchFamily="18" charset="0"/>
+                                      </a:rPr>
+                                      <m:t>0.05</m:t>
+                                    </m:r>
+                                  </m:num>
+                                  <m:den>
+                                    <m:r>
+                                      <a:rPr lang="en-US" altLang="ja-JP" b="0" i="1" smtClean="0">
+                                        <a:latin typeface="Cambria Math" panose="02040503050406030204" pitchFamily="18" charset="0"/>
+                                      </a:rPr>
+                                      <m:t>𝑠</m:t>
+                                    </m:r>
+                                    <m:r>
+                                      <a:rPr lang="en-US" altLang="ja-JP" b="0" i="1" smtClean="0">
+                                        <a:latin typeface="Cambria Math" panose="02040503050406030204" pitchFamily="18" charset="0"/>
+                                      </a:rPr>
+                                      <m:t>−1</m:t>
+                                    </m:r>
+                                  </m:den>
+                                </m:f>
+                              </m:e>
+                            </m:mr>
+                          </m:m>
+                        </m:e>
+                      </m:d>
+                    </m:oMath>
+                  </m:oMathPara>
+                </a14:m>
+                <a:endParaRPr kumimoji="1" lang="en-US" altLang="ja-JP" b="0" dirty="0"/>
+              </a:p>
+              <a:p>
+                <a:pPr algn="ctr"/>
+                <a:endParaRPr kumimoji="1" lang="ja-JP" altLang="en-US" dirty="0"/>
+              </a:p>
+            </p:txBody>
+          </p:sp>
+        </mc:Choice>
+        <mc:Fallback>
+          <p:sp>
+            <p:nvSpPr>
+              <p:cNvPr id="9" name="テキスト ボックス 8">
+                <a:extLst>
+                  <a:ext uri="{FF2B5EF4-FFF2-40B4-BE49-F238E27FC236}">
+                    <a16:creationId xmlns:a16="http://schemas.microsoft.com/office/drawing/2014/main" id="{69D568AD-0A5D-4F7F-824E-F7C524BCEB1A}"/>
+                  </a:ext>
+                </a:extLst>
+              </p:cNvPr>
+              <p:cNvSpPr txBox="1">
+                <a:spLocks noRot="1" noChangeAspect="1" noMove="1" noResize="1" noEditPoints="1" noAdjustHandles="1" noChangeArrowheads="1" noChangeShapeType="1" noTextEdit="1"/>
+              </p:cNvSpPr>
+              <p:nvPr/>
+            </p:nvSpPr>
+            <p:spPr>
+              <a:xfrm>
+                <a:off x="5678648" y="260826"/>
+                <a:ext cx="6263188" cy="5544018"/>
+              </a:xfrm>
+              <a:prstGeom prst="rect">
+                <a:avLst/>
+              </a:prstGeom>
+              <a:blipFill>
+                <a:blip r:embed="rId6"/>
+                <a:stretch>
+                  <a:fillRect/>
+                </a:stretch>
+              </a:blipFill>
+            </p:spPr>
+            <p:txBody>
+              <a:bodyPr/>
+              <a:lstStyle/>
+              <a:p>
+                <a:r>
+                  <a:rPr lang="ja-JP" altLang="en-US">
+                    <a:noFill/>
+                  </a:rPr>
+                  <a:t> </a:t>
+                </a:r>
+              </a:p>
+            </p:txBody>
+          </p:sp>
+        </mc:Fallback>
+      </mc:AlternateContent>
     </p:spTree>
     <p:extLst>
       <p:ext uri="{BB962C8B-B14F-4D97-AF65-F5344CB8AC3E}">
         <p14:creationId xmlns:p14="http://schemas.microsoft.com/office/powerpoint/2010/main" val="461297746"/>
+      </p:ext>
+    </p:extLst>
+  </p:cSld>
+  <p:clrMapOvr>
+    <a:masterClrMapping/>
+  </p:clrMapOvr>
+</p:sld>
+</file>
+
+<file path=ppt/slides/slide4.xml><?xml version="1.0" encoding="utf-8"?>
+<p:sld xmlns:a="http://schemas.openxmlformats.org/drawingml/2006/main" xmlns:r="http://schemas.openxmlformats.org/officeDocument/2006/relationships" xmlns:p="http://schemas.openxmlformats.org/presentationml/2006/main">
+  <p:cSld>
+    <p:spTree>
+      <p:nvGrpSpPr>
+        <p:cNvPr id="1" name=""/>
+        <p:cNvGrpSpPr/>
+        <p:nvPr/>
+      </p:nvGrpSpPr>
+      <p:grpSpPr>
+        <a:xfrm>
+          <a:off x="0" y="0"/>
+          <a:ext cx="0" cy="0"/>
+          <a:chOff x="0" y="0"/>
+          <a:chExt cx="0" cy="0"/>
+        </a:xfrm>
+      </p:grpSpPr>
+      <mc:AlternateContent xmlns:mc="http://schemas.openxmlformats.org/markup-compatibility/2006">
+        <mc:Choice xmlns:a14="http://schemas.microsoft.com/office/drawing/2010/main" Requires="a14">
+          <p:sp>
+            <p:nvSpPr>
+              <p:cNvPr id="2" name="テキスト ボックス 1">
+                <a:extLst>
+                  <a:ext uri="{FF2B5EF4-FFF2-40B4-BE49-F238E27FC236}">
+                    <a16:creationId xmlns:a16="http://schemas.microsoft.com/office/drawing/2014/main" id="{06FE44CB-33A7-4095-A672-577309591D46}"/>
+                  </a:ext>
+                </a:extLst>
+              </p:cNvPr>
+              <p:cNvSpPr txBox="1"/>
+              <p:nvPr/>
+            </p:nvSpPr>
+            <p:spPr>
+              <a:xfrm>
+                <a:off x="266255" y="520565"/>
+                <a:ext cx="7300780" cy="2635722"/>
+              </a:xfrm>
+              <a:prstGeom prst="rect">
+                <a:avLst/>
+              </a:prstGeom>
+              <a:noFill/>
+            </p:spPr>
+            <p:txBody>
+              <a:bodyPr wrap="none" rtlCol="0">
+                <a:spAutoFit/>
+              </a:bodyPr>
+              <a:lstStyle/>
+              <a:p>
+                <a:pPr algn="ctr"/>
+                <a14:m>
+                  <m:oMathPara xmlns:m="http://schemas.openxmlformats.org/officeDocument/2006/math">
+                    <m:oMathParaPr>
+                      <m:jc m:val="centerGroup"/>
+                    </m:oMathParaPr>
+                    <m:oMath xmlns:m="http://schemas.openxmlformats.org/officeDocument/2006/math">
+                      <m:f>
+                        <m:fPr>
+                          <m:ctrlPr>
+                            <a:rPr kumimoji="1" lang="en-US" altLang="ja-JP" i="1" smtClean="0">
+                              <a:latin typeface="Cambria Math" panose="02040503050406030204" pitchFamily="18" charset="0"/>
+                            </a:rPr>
+                          </m:ctrlPr>
+                        </m:fPr>
+                        <m:num>
+                          <m:r>
+                            <a:rPr kumimoji="1" lang="en-US" altLang="ja-JP" b="0" i="1" smtClean="0">
+                              <a:latin typeface="Cambria Math" panose="02040503050406030204" pitchFamily="18" charset="0"/>
+                            </a:rPr>
+                            <m:t>1</m:t>
+                          </m:r>
+                        </m:num>
+                        <m:den>
+                          <m:r>
+                            <a:rPr kumimoji="1" lang="en-US" altLang="ja-JP" b="0" i="1" smtClean="0">
+                              <a:latin typeface="Cambria Math" panose="02040503050406030204" pitchFamily="18" charset="0"/>
+                            </a:rPr>
+                            <m:t>(</m:t>
+                          </m:r>
+                          <m:r>
+                            <a:rPr kumimoji="1" lang="en-US" altLang="ja-JP" b="0" i="1" smtClean="0">
+                              <a:latin typeface="Cambria Math" panose="02040503050406030204" pitchFamily="18" charset="0"/>
+                            </a:rPr>
+                            <m:t>𝑠</m:t>
+                          </m:r>
+                          <m:r>
+                            <a:rPr kumimoji="1" lang="en-US" altLang="ja-JP" b="0" i="1" smtClean="0">
+                              <a:latin typeface="Cambria Math" panose="02040503050406030204" pitchFamily="18" charset="0"/>
+                            </a:rPr>
+                            <m:t>−1)(</m:t>
+                          </m:r>
+                          <m:r>
+                            <a:rPr kumimoji="1" lang="en-US" altLang="ja-JP" b="0" i="1" smtClean="0">
+                              <a:latin typeface="Cambria Math" panose="02040503050406030204" pitchFamily="18" charset="0"/>
+                            </a:rPr>
+                            <m:t>𝑠</m:t>
+                          </m:r>
+                          <m:r>
+                            <a:rPr kumimoji="1" lang="en-US" altLang="ja-JP" b="0" i="1" smtClean="0">
+                              <a:latin typeface="Cambria Math" panose="02040503050406030204" pitchFamily="18" charset="0"/>
+                            </a:rPr>
+                            <m:t>−1)(</m:t>
+                          </m:r>
+                          <m:r>
+                            <a:rPr kumimoji="1" lang="en-US" altLang="ja-JP" b="0" i="1" smtClean="0">
+                              <a:latin typeface="Cambria Math" panose="02040503050406030204" pitchFamily="18" charset="0"/>
+                            </a:rPr>
+                            <m:t>𝑠</m:t>
+                          </m:r>
+                          <m:r>
+                            <a:rPr kumimoji="1" lang="en-US" altLang="ja-JP" b="0" i="1" smtClean="0">
+                              <a:latin typeface="Cambria Math" panose="02040503050406030204" pitchFamily="18" charset="0"/>
+                            </a:rPr>
+                            <m:t>−1)</m:t>
+                          </m:r>
+                        </m:den>
+                      </m:f>
+                      <m:d>
+                        <m:dPr>
+                          <m:begChr m:val="["/>
+                          <m:endChr m:val="]"/>
+                          <m:ctrlPr>
+                            <a:rPr kumimoji="1" lang="en-US" altLang="ja-JP" i="1" smtClean="0">
+                              <a:latin typeface="Cambria Math" panose="02040503050406030204" pitchFamily="18" charset="0"/>
+                            </a:rPr>
+                          </m:ctrlPr>
+                        </m:dPr>
+                        <m:e>
+                          <m:m>
+                            <m:mPr>
+                              <m:mcs>
+                                <m:mc>
+                                  <m:mcPr>
+                                    <m:count m:val="3"/>
+                                    <m:mcJc m:val="center"/>
+                                  </m:mcPr>
+                                </m:mc>
+                              </m:mcs>
+                              <m:ctrlPr>
+                                <a:rPr kumimoji="1" lang="en-US" altLang="ja-JP" i="1" smtClean="0">
+                                  <a:latin typeface="Cambria Math" panose="02040503050406030204" pitchFamily="18" charset="0"/>
+                                </a:rPr>
+                              </m:ctrlPr>
+                            </m:mPr>
+                            <m:mr>
+                              <m:e>
+                                <m:r>
+                                  <m:rPr>
+                                    <m:brk m:alnAt="7"/>
+                                  </m:rPr>
+                                  <a:rPr kumimoji="1" lang="en-US" altLang="ja-JP" b="0" i="1" smtClean="0">
+                                    <a:latin typeface="Cambria Math" panose="02040503050406030204" pitchFamily="18" charset="0"/>
+                                  </a:rPr>
+                                  <m:t>(</m:t>
+                                </m:r>
+                                <m:r>
+                                  <a:rPr kumimoji="1" lang="en-US" altLang="ja-JP" b="0" i="1" smtClean="0">
+                                    <a:latin typeface="Cambria Math" panose="02040503050406030204" pitchFamily="18" charset="0"/>
+                                  </a:rPr>
+                                  <m:t>𝑠</m:t>
+                                </m:r>
+                                <m:r>
+                                  <a:rPr kumimoji="1" lang="en-US" altLang="ja-JP" b="0" i="1" smtClean="0">
+                                    <a:latin typeface="Cambria Math" panose="02040503050406030204" pitchFamily="18" charset="0"/>
+                                  </a:rPr>
+                                  <m:t>−1)(</m:t>
+                                </m:r>
+                                <m:r>
+                                  <a:rPr kumimoji="1" lang="en-US" altLang="ja-JP" b="0" i="1" smtClean="0">
+                                    <a:latin typeface="Cambria Math" panose="02040503050406030204" pitchFamily="18" charset="0"/>
+                                  </a:rPr>
+                                  <m:t>𝑠</m:t>
+                                </m:r>
+                                <m:r>
+                                  <a:rPr kumimoji="1" lang="en-US" altLang="ja-JP" b="0" i="1" smtClean="0">
+                                    <a:latin typeface="Cambria Math" panose="02040503050406030204" pitchFamily="18" charset="0"/>
+                                  </a:rPr>
+                                  <m:t>−1)</m:t>
+                                </m:r>
+                              </m:e>
+                              <m:e>
+                                <m:r>
+                                  <a:rPr kumimoji="1" lang="en-US" altLang="ja-JP" b="0" i="1" smtClean="0">
+                                    <a:latin typeface="Cambria Math" panose="02040503050406030204" pitchFamily="18" charset="0"/>
+                                  </a:rPr>
+                                  <m:t>0</m:t>
+                                </m:r>
+                              </m:e>
+                              <m:e>
+                                <m:r>
+                                  <a:rPr kumimoji="1" lang="en-US" altLang="ja-JP" b="0" i="1" smtClean="0">
+                                    <a:latin typeface="Cambria Math" panose="02040503050406030204" pitchFamily="18" charset="0"/>
+                                  </a:rPr>
+                                  <m:t>0</m:t>
+                                </m:r>
+                              </m:e>
+                            </m:mr>
+                            <m:mr>
+                              <m:e>
+                                <m:r>
+                                  <a:rPr kumimoji="1" lang="en-US" altLang="ja-JP" b="0" i="1" smtClean="0">
+                                    <a:latin typeface="Cambria Math" panose="02040503050406030204" pitchFamily="18" charset="0"/>
+                                  </a:rPr>
+                                  <m:t>0</m:t>
+                                </m:r>
+                              </m:e>
+                              <m:e>
+                                <m:r>
+                                  <m:rPr>
+                                    <m:brk m:alnAt="7"/>
+                                  </m:rPr>
+                                  <a:rPr lang="en-US" altLang="ja-JP" i="1">
+                                    <a:latin typeface="Cambria Math" panose="02040503050406030204" pitchFamily="18" charset="0"/>
+                                  </a:rPr>
+                                  <m:t>(</m:t>
+                                </m:r>
+                                <m:r>
+                                  <a:rPr lang="en-US" altLang="ja-JP" i="1">
+                                    <a:latin typeface="Cambria Math" panose="02040503050406030204" pitchFamily="18" charset="0"/>
+                                  </a:rPr>
+                                  <m:t>𝑠</m:t>
+                                </m:r>
+                                <m:r>
+                                  <a:rPr lang="en-US" altLang="ja-JP" i="1">
+                                    <a:latin typeface="Cambria Math" panose="02040503050406030204" pitchFamily="18" charset="0"/>
+                                  </a:rPr>
+                                  <m:t>−1)(</m:t>
+                                </m:r>
+                                <m:r>
+                                  <a:rPr lang="en-US" altLang="ja-JP" i="1">
+                                    <a:latin typeface="Cambria Math" panose="02040503050406030204" pitchFamily="18" charset="0"/>
+                                  </a:rPr>
+                                  <m:t>𝑠</m:t>
+                                </m:r>
+                                <m:r>
+                                  <a:rPr lang="en-US" altLang="ja-JP" i="1">
+                                    <a:latin typeface="Cambria Math" panose="02040503050406030204" pitchFamily="18" charset="0"/>
+                                  </a:rPr>
+                                  <m:t>−1)</m:t>
+                                </m:r>
+                              </m:e>
+                              <m:e>
+                                <m:r>
+                                  <a:rPr kumimoji="1" lang="en-US" altLang="ja-JP" b="0" i="1" smtClean="0">
+                                    <a:latin typeface="Cambria Math" panose="02040503050406030204" pitchFamily="18" charset="0"/>
+                                  </a:rPr>
+                                  <m:t>0</m:t>
+                                </m:r>
+                              </m:e>
+                            </m:mr>
+                            <m:mr>
+                              <m:e>
+                                <m:r>
+                                  <a:rPr kumimoji="1" lang="en-US" altLang="ja-JP" b="0" i="1" smtClean="0">
+                                    <a:latin typeface="Cambria Math" panose="02040503050406030204" pitchFamily="18" charset="0"/>
+                                  </a:rPr>
+                                  <m:t>0</m:t>
+                                </m:r>
+                              </m:e>
+                              <m:e>
+                                <m:r>
+                                  <a:rPr kumimoji="1" lang="en-US" altLang="ja-JP" b="0" i="1" smtClean="0">
+                                    <a:latin typeface="Cambria Math" panose="02040503050406030204" pitchFamily="18" charset="0"/>
+                                  </a:rPr>
+                                  <m:t>0</m:t>
+                                </m:r>
+                              </m:e>
+                              <m:e>
+                                <m:r>
+                                  <m:rPr>
+                                    <m:brk m:alnAt="7"/>
+                                  </m:rPr>
+                                  <a:rPr lang="en-US" altLang="ja-JP" i="1">
+                                    <a:latin typeface="Cambria Math" panose="02040503050406030204" pitchFamily="18" charset="0"/>
+                                  </a:rPr>
+                                  <m:t>(</m:t>
+                                </m:r>
+                                <m:r>
+                                  <a:rPr lang="en-US" altLang="ja-JP" i="1">
+                                    <a:latin typeface="Cambria Math" panose="02040503050406030204" pitchFamily="18" charset="0"/>
+                                  </a:rPr>
+                                  <m:t>𝑠</m:t>
+                                </m:r>
+                                <m:r>
+                                  <a:rPr lang="en-US" altLang="ja-JP" i="1">
+                                    <a:latin typeface="Cambria Math" panose="02040503050406030204" pitchFamily="18" charset="0"/>
+                                  </a:rPr>
+                                  <m:t>−1)(</m:t>
+                                </m:r>
+                                <m:r>
+                                  <a:rPr lang="en-US" altLang="ja-JP" i="1">
+                                    <a:latin typeface="Cambria Math" panose="02040503050406030204" pitchFamily="18" charset="0"/>
+                                  </a:rPr>
+                                  <m:t>𝑠</m:t>
+                                </m:r>
+                                <m:r>
+                                  <a:rPr lang="en-US" altLang="ja-JP" i="1">
+                                    <a:latin typeface="Cambria Math" panose="02040503050406030204" pitchFamily="18" charset="0"/>
+                                  </a:rPr>
+                                  <m:t>−1)</m:t>
+                                </m:r>
+                              </m:e>
+                            </m:mr>
+                          </m:m>
+                        </m:e>
+                      </m:d>
+                    </m:oMath>
+                  </m:oMathPara>
+                </a14:m>
+                <a:endParaRPr kumimoji="1" lang="en-US" altLang="ja-JP" i="1" dirty="0">
+                  <a:latin typeface="Cambria Math" panose="02040503050406030204" pitchFamily="18" charset="0"/>
+                </a:endParaRPr>
+              </a:p>
+              <a:p>
+                <a:pPr algn="ctr"/>
+                <a14:m>
+                  <m:oMathPara xmlns:m="http://schemas.openxmlformats.org/officeDocument/2006/math">
+                    <m:oMathParaPr>
+                      <m:jc m:val="centerGroup"/>
+                    </m:oMathParaPr>
+                    <m:oMath xmlns:m="http://schemas.openxmlformats.org/officeDocument/2006/math">
+                      <m:r>
+                        <a:rPr kumimoji="1" lang="en-US" altLang="ja-JP" b="0" i="1" smtClean="0">
+                          <a:latin typeface="Cambria Math" panose="02040503050406030204" pitchFamily="18" charset="0"/>
+                        </a:rPr>
+                        <m:t>=</m:t>
+                      </m:r>
+                      <m:d>
+                        <m:dPr>
+                          <m:begChr m:val="["/>
+                          <m:endChr m:val="]"/>
+                          <m:ctrlPr>
+                            <a:rPr kumimoji="1" lang="en-US" altLang="ja-JP" b="0" i="1" smtClean="0">
+                              <a:latin typeface="Cambria Math" panose="02040503050406030204" pitchFamily="18" charset="0"/>
+                            </a:rPr>
+                          </m:ctrlPr>
+                        </m:dPr>
+                        <m:e>
+                          <m:m>
+                            <m:mPr>
+                              <m:mcs>
+                                <m:mc>
+                                  <m:mcPr>
+                                    <m:count m:val="3"/>
+                                    <m:mcJc m:val="center"/>
+                                  </m:mcPr>
+                                </m:mc>
+                              </m:mcs>
+                              <m:ctrlPr>
+                                <a:rPr kumimoji="1" lang="en-US" altLang="ja-JP" b="0" i="1" smtClean="0">
+                                  <a:latin typeface="Cambria Math" panose="02040503050406030204" pitchFamily="18" charset="0"/>
+                                </a:rPr>
+                              </m:ctrlPr>
+                            </m:mPr>
+                            <m:mr>
+                              <m:e>
+                                <m:f>
+                                  <m:fPr>
+                                    <m:ctrlPr>
+                                      <a:rPr kumimoji="1" lang="en-US" altLang="ja-JP" b="0" i="1" smtClean="0">
+                                        <a:latin typeface="Cambria Math" panose="02040503050406030204" pitchFamily="18" charset="0"/>
+                                      </a:rPr>
+                                    </m:ctrlPr>
+                                  </m:fPr>
+                                  <m:num>
+                                    <m:r>
+                                      <a:rPr kumimoji="1" lang="en-US" altLang="ja-JP" b="0" i="1" smtClean="0">
+                                        <a:latin typeface="Cambria Math" panose="02040503050406030204" pitchFamily="18" charset="0"/>
+                                      </a:rPr>
+                                      <m:t>1</m:t>
+                                    </m:r>
+                                  </m:num>
+                                  <m:den>
+                                    <m:r>
+                                      <a:rPr kumimoji="1" lang="en-US" altLang="ja-JP" b="0" i="1" smtClean="0">
+                                        <a:latin typeface="Cambria Math" panose="02040503050406030204" pitchFamily="18" charset="0"/>
+                                      </a:rPr>
+                                      <m:t>𝑠</m:t>
+                                    </m:r>
+                                    <m:r>
+                                      <a:rPr kumimoji="1" lang="en-US" altLang="ja-JP" b="0" i="1" smtClean="0">
+                                        <a:latin typeface="Cambria Math" panose="02040503050406030204" pitchFamily="18" charset="0"/>
+                                      </a:rPr>
+                                      <m:t>−1</m:t>
+                                    </m:r>
+                                  </m:den>
+                                </m:f>
+                              </m:e>
+                              <m:e>
+                                <m:r>
+                                  <a:rPr kumimoji="1" lang="en-US" altLang="ja-JP" b="0" i="1" smtClean="0">
+                                    <a:latin typeface="Cambria Math" panose="02040503050406030204" pitchFamily="18" charset="0"/>
+                                  </a:rPr>
+                                  <m:t>0</m:t>
+                                </m:r>
+                              </m:e>
+                              <m:e>
+                                <m:r>
+                                  <a:rPr kumimoji="1" lang="en-US" altLang="ja-JP" b="0" i="1" smtClean="0">
+                                    <a:latin typeface="Cambria Math" panose="02040503050406030204" pitchFamily="18" charset="0"/>
+                                  </a:rPr>
+                                  <m:t>0</m:t>
+                                </m:r>
+                              </m:e>
+                            </m:mr>
+                            <m:mr>
+                              <m:e>
+                                <m:r>
+                                  <a:rPr kumimoji="1" lang="en-US" altLang="ja-JP" b="0" i="1" smtClean="0">
+                                    <a:latin typeface="Cambria Math" panose="02040503050406030204" pitchFamily="18" charset="0"/>
+                                  </a:rPr>
+                                  <m:t>0</m:t>
+                                </m:r>
+                              </m:e>
+                              <m:e>
+                                <m:f>
+                                  <m:fPr>
+                                    <m:ctrlPr>
+                                      <a:rPr kumimoji="1" lang="en-US" altLang="ja-JP" b="0" i="1" smtClean="0">
+                                        <a:latin typeface="Cambria Math" panose="02040503050406030204" pitchFamily="18" charset="0"/>
+                                      </a:rPr>
+                                    </m:ctrlPr>
+                                  </m:fPr>
+                                  <m:num>
+                                    <m:r>
+                                      <a:rPr kumimoji="1" lang="en-US" altLang="ja-JP" b="0" i="1" smtClean="0">
+                                        <a:latin typeface="Cambria Math" panose="02040503050406030204" pitchFamily="18" charset="0"/>
+                                      </a:rPr>
+                                      <m:t>1</m:t>
+                                    </m:r>
+                                  </m:num>
+                                  <m:den>
+                                    <m:r>
+                                      <a:rPr kumimoji="1" lang="en-US" altLang="ja-JP" b="0" i="1" smtClean="0">
+                                        <a:latin typeface="Cambria Math" panose="02040503050406030204" pitchFamily="18" charset="0"/>
+                                      </a:rPr>
+                                      <m:t>𝑠</m:t>
+                                    </m:r>
+                                    <m:r>
+                                      <a:rPr kumimoji="1" lang="en-US" altLang="ja-JP" b="0" i="1" smtClean="0">
+                                        <a:latin typeface="Cambria Math" panose="02040503050406030204" pitchFamily="18" charset="0"/>
+                                      </a:rPr>
+                                      <m:t>−1</m:t>
+                                    </m:r>
+                                  </m:den>
+                                </m:f>
+                              </m:e>
+                              <m:e>
+                                <m:r>
+                                  <a:rPr kumimoji="1" lang="en-US" altLang="ja-JP" b="0" i="1" smtClean="0">
+                                    <a:latin typeface="Cambria Math" panose="02040503050406030204" pitchFamily="18" charset="0"/>
+                                  </a:rPr>
+                                  <m:t>0</m:t>
+                                </m:r>
+                              </m:e>
+                            </m:mr>
+                            <m:mr>
+                              <m:e>
+                                <m:r>
+                                  <a:rPr kumimoji="1" lang="en-US" altLang="ja-JP" b="0" i="1" smtClean="0">
+                                    <a:latin typeface="Cambria Math" panose="02040503050406030204" pitchFamily="18" charset="0"/>
+                                  </a:rPr>
+                                  <m:t>0</m:t>
+                                </m:r>
+                              </m:e>
+                              <m:e>
+                                <m:r>
+                                  <a:rPr kumimoji="1" lang="en-US" altLang="ja-JP" b="0" i="1" smtClean="0">
+                                    <a:latin typeface="Cambria Math" panose="02040503050406030204" pitchFamily="18" charset="0"/>
+                                  </a:rPr>
+                                  <m:t>0</m:t>
+                                </m:r>
+                              </m:e>
+                              <m:e>
+                                <m:f>
+                                  <m:fPr>
+                                    <m:ctrlPr>
+                                      <a:rPr kumimoji="1" lang="en-US" altLang="ja-JP" b="0" i="1" smtClean="0">
+                                        <a:latin typeface="Cambria Math" panose="02040503050406030204" pitchFamily="18" charset="0"/>
+                                      </a:rPr>
+                                    </m:ctrlPr>
+                                  </m:fPr>
+                                  <m:num>
+                                    <m:r>
+                                      <a:rPr kumimoji="1" lang="en-US" altLang="ja-JP" b="0" i="1" smtClean="0">
+                                        <a:latin typeface="Cambria Math" panose="02040503050406030204" pitchFamily="18" charset="0"/>
+                                      </a:rPr>
+                                      <m:t>1</m:t>
+                                    </m:r>
+                                  </m:num>
+                                  <m:den>
+                                    <m:r>
+                                      <a:rPr kumimoji="1" lang="en-US" altLang="ja-JP" b="0" i="1" smtClean="0">
+                                        <a:latin typeface="Cambria Math" panose="02040503050406030204" pitchFamily="18" charset="0"/>
+                                      </a:rPr>
+                                      <m:t>𝑠</m:t>
+                                    </m:r>
+                                    <m:r>
+                                      <a:rPr kumimoji="1" lang="en-US" altLang="ja-JP" b="0" i="1" smtClean="0">
+                                        <a:latin typeface="Cambria Math" panose="02040503050406030204" pitchFamily="18" charset="0"/>
+                                      </a:rPr>
+                                      <m:t>−1</m:t>
+                                    </m:r>
+                                  </m:den>
+                                </m:f>
+                              </m:e>
+                            </m:mr>
+                          </m:m>
+                        </m:e>
+                      </m:d>
+                    </m:oMath>
+                  </m:oMathPara>
+                </a14:m>
+                <a:endParaRPr kumimoji="1" lang="ja-JP" altLang="en-US" dirty="0"/>
+              </a:p>
+            </p:txBody>
+          </p:sp>
+        </mc:Choice>
+        <mc:Fallback>
+          <p:sp>
+            <p:nvSpPr>
+              <p:cNvPr id="2" name="テキスト ボックス 1">
+                <a:extLst>
+                  <a:ext uri="{FF2B5EF4-FFF2-40B4-BE49-F238E27FC236}">
+                    <a16:creationId xmlns:a16="http://schemas.microsoft.com/office/drawing/2014/main" id="{06FE44CB-33A7-4095-A672-577309591D46}"/>
+                  </a:ext>
+                </a:extLst>
+              </p:cNvPr>
+              <p:cNvSpPr txBox="1">
+                <a:spLocks noRot="1" noChangeAspect="1" noMove="1" noResize="1" noEditPoints="1" noAdjustHandles="1" noChangeArrowheads="1" noChangeShapeType="1" noTextEdit="1"/>
+              </p:cNvSpPr>
+              <p:nvPr/>
+            </p:nvSpPr>
+            <p:spPr>
+              <a:xfrm>
+                <a:off x="266255" y="520565"/>
+                <a:ext cx="7300780" cy="2635722"/>
+              </a:xfrm>
+              <a:prstGeom prst="rect">
+                <a:avLst/>
+              </a:prstGeom>
+              <a:blipFill>
+                <a:blip r:embed="rId2"/>
+                <a:stretch>
+                  <a:fillRect/>
+                </a:stretch>
+              </a:blipFill>
+            </p:spPr>
+            <p:txBody>
+              <a:bodyPr/>
+              <a:lstStyle/>
+              <a:p>
+                <a:r>
+                  <a:rPr lang="ja-JP" altLang="en-US">
+                    <a:noFill/>
+                  </a:rPr>
+                  <a:t> </a:t>
+                </a:r>
+              </a:p>
+            </p:txBody>
+          </p:sp>
+        </mc:Fallback>
+      </mc:AlternateContent>
+    </p:spTree>
+    <p:extLst>
+      <p:ext uri="{BB962C8B-B14F-4D97-AF65-F5344CB8AC3E}">
+        <p14:creationId xmlns:p14="http://schemas.microsoft.com/office/powerpoint/2010/main" val="1036808431"/>
       </p:ext>
     </p:extLst>
   </p:cSld>

</xml_diff>